<commit_message>
[DOCS] Deleted internet picture for arch; modified motivation slide
</commit_message>
<xml_diff>
--- a/system-design/TechShoppers - System Architecture.pptx
+++ b/system-design/TechShoppers - System Architecture.pptx
@@ -7,14 +7,13 @@
   <p:sldIdLst>
     <p:sldId id="256" r:id="rId2"/>
     <p:sldId id="257" r:id="rId3"/>
-    <p:sldId id="259" r:id="rId4"/>
-    <p:sldId id="260" r:id="rId5"/>
-    <p:sldId id="261" r:id="rId6"/>
-    <p:sldId id="262" r:id="rId7"/>
-    <p:sldId id="263" r:id="rId8"/>
-    <p:sldId id="264" r:id="rId9"/>
-    <p:sldId id="265" r:id="rId10"/>
-    <p:sldId id="258" r:id="rId11"/>
+    <p:sldId id="260" r:id="rId4"/>
+    <p:sldId id="261" r:id="rId5"/>
+    <p:sldId id="262" r:id="rId6"/>
+    <p:sldId id="263" r:id="rId7"/>
+    <p:sldId id="264" r:id="rId8"/>
+    <p:sldId id="265" r:id="rId9"/>
+    <p:sldId id="258" r:id="rId10"/>
   </p:sldIdLst>
   <p:sldSz cx="9144000" cy="6858000" type="screen4x3"/>
   <p:notesSz cx="6858000" cy="9144000"/>
@@ -305,7 +304,7 @@
             <a:fld id="{1D8BD707-D9CF-40AE-B4C6-C98DA3205C09}" type="datetimeFigureOut">
               <a:rPr lang="en-US" smtClean="0"/>
               <a:pPr/>
-              <a:t>1/4/2024</a:t>
+              <a:t>1/13/2024</a:t>
             </a:fld>
             <a:endParaRPr lang="en-US"/>
           </a:p>
@@ -507,7 +506,7 @@
             <a:fld id="{1D8BD707-D9CF-40AE-B4C6-C98DA3205C09}" type="datetimeFigureOut">
               <a:rPr lang="en-US" smtClean="0"/>
               <a:pPr/>
-              <a:t>1/4/2024</a:t>
+              <a:t>1/13/2024</a:t>
             </a:fld>
             <a:endParaRPr lang="en-US"/>
           </a:p>
@@ -684,7 +683,7 @@
             <a:fld id="{1D8BD707-D9CF-40AE-B4C6-C98DA3205C09}" type="datetimeFigureOut">
               <a:rPr lang="en-US" smtClean="0"/>
               <a:pPr/>
-              <a:t>1/4/2024</a:t>
+              <a:t>1/13/2024</a:t>
             </a:fld>
             <a:endParaRPr lang="en-US"/>
           </a:p>
@@ -851,7 +850,7 @@
             <a:fld id="{1D8BD707-D9CF-40AE-B4C6-C98DA3205C09}" type="datetimeFigureOut">
               <a:rPr lang="en-US" smtClean="0"/>
               <a:pPr/>
-              <a:t>1/4/2024</a:t>
+              <a:t>1/13/2024</a:t>
             </a:fld>
             <a:endParaRPr lang="en-US"/>
           </a:p>
@@ -1101,7 +1100,7 @@
             <a:fld id="{1D8BD707-D9CF-40AE-B4C6-C98DA3205C09}" type="datetimeFigureOut">
               <a:rPr lang="en-US" smtClean="0"/>
               <a:pPr/>
-              <a:t>1/4/2024</a:t>
+              <a:t>1/13/2024</a:t>
             </a:fld>
             <a:endParaRPr lang="en-US"/>
           </a:p>
@@ -1421,7 +1420,7 @@
             <a:fld id="{1D8BD707-D9CF-40AE-B4C6-C98DA3205C09}" type="datetimeFigureOut">
               <a:rPr lang="en-US" smtClean="0"/>
               <a:pPr/>
-              <a:t>1/4/2024</a:t>
+              <a:t>1/13/2024</a:t>
             </a:fld>
             <a:endParaRPr lang="en-US"/>
           </a:p>
@@ -1889,7 +1888,7 @@
             <a:fld id="{1D8BD707-D9CF-40AE-B4C6-C98DA3205C09}" type="datetimeFigureOut">
               <a:rPr lang="en-US" smtClean="0"/>
               <a:pPr/>
-              <a:t>1/4/2024</a:t>
+              <a:t>1/13/2024</a:t>
             </a:fld>
             <a:endParaRPr lang="en-US"/>
           </a:p>
@@ -2039,7 +2038,7 @@
             <a:fld id="{1D8BD707-D9CF-40AE-B4C6-C98DA3205C09}" type="datetimeFigureOut">
               <a:rPr lang="en-US" smtClean="0"/>
               <a:pPr/>
-              <a:t>1/4/2024</a:t>
+              <a:t>1/13/2024</a:t>
             </a:fld>
             <a:endParaRPr lang="en-US"/>
           </a:p>
@@ -2131,7 +2130,7 @@
             <a:fld id="{1D8BD707-D9CF-40AE-B4C6-C98DA3205C09}" type="datetimeFigureOut">
               <a:rPr lang="en-US" smtClean="0"/>
               <a:pPr/>
-              <a:t>1/4/2024</a:t>
+              <a:t>1/13/2024</a:t>
             </a:fld>
             <a:endParaRPr lang="en-US"/>
           </a:p>
@@ -2407,7 +2406,7 @@
             <a:fld id="{1D8BD707-D9CF-40AE-B4C6-C98DA3205C09}" type="datetimeFigureOut">
               <a:rPr lang="en-US" smtClean="0"/>
               <a:pPr/>
-              <a:t>1/4/2024</a:t>
+              <a:t>1/13/2024</a:t>
             </a:fld>
             <a:endParaRPr lang="en-US"/>
           </a:p>
@@ -2714,7 +2713,7 @@
             <a:fld id="{1D8BD707-D9CF-40AE-B4C6-C98DA3205C09}" type="datetimeFigureOut">
               <a:rPr lang="en-US" smtClean="0"/>
               <a:pPr/>
-              <a:t>1/4/2024</a:t>
+              <a:t>1/13/2024</a:t>
             </a:fld>
             <a:endParaRPr lang="en-US"/>
           </a:p>
@@ -3014,7 +3013,7 @@
             <a:fld id="{1D8BD707-D9CF-40AE-B4C6-C98DA3205C09}" type="datetimeFigureOut">
               <a:rPr lang="en-US" smtClean="0"/>
               <a:pPr/>
-              <a:t>1/4/2024</a:t>
+              <a:t>1/13/2024</a:t>
             </a:fld>
             <a:endParaRPr lang="en-US"/>
           </a:p>
@@ -3575,7 +3574,1214 @@
 </p:sld>
 </file>
 
-<file path=ppt/slides/slide10.xml><?xml version="1.0" encoding="utf-8"?>
+<file path=ppt/slides/slide2.xml><?xml version="1.0" encoding="utf-8"?>
+<p:sld xmlns:a="http://schemas.openxmlformats.org/drawingml/2006/main" xmlns:r="http://schemas.openxmlformats.org/officeDocument/2006/relationships" xmlns:p="http://schemas.openxmlformats.org/presentationml/2006/main">
+  <p:cSld>
+    <p:spTree>
+      <p:nvGrpSpPr>
+        <p:cNvPr id="1" name=""/>
+        <p:cNvGrpSpPr/>
+        <p:nvPr/>
+      </p:nvGrpSpPr>
+      <p:grpSpPr>
+        <a:xfrm>
+          <a:off x="0" y="0"/>
+          <a:ext cx="0" cy="0"/>
+          <a:chOff x="0" y="0"/>
+          <a:chExt cx="0" cy="0"/>
+        </a:xfrm>
+      </p:grpSpPr>
+      <p:sp>
+        <p:nvSpPr>
+          <p:cNvPr id="2" name="Title 1"/>
+          <p:cNvSpPr>
+            <a:spLocks noGrp="1"/>
+          </p:cNvSpPr>
+          <p:nvPr>
+            <p:ph type="title"/>
+          </p:nvPr>
+        </p:nvSpPr>
+        <p:spPr/>
+        <p:txBody>
+          <a:bodyPr/>
+          <a:lstStyle/>
+          <a:p>
+            <a:r>
+              <a:rPr lang="en-US" dirty="0" smtClean="0"/>
+              <a:t>Choice of an Architecture</a:t>
+            </a:r>
+            <a:endParaRPr lang="en-US" dirty="0"/>
+          </a:p>
+        </p:txBody>
+      </p:sp>
+      <p:sp>
+        <p:nvSpPr>
+          <p:cNvPr id="3" name="Content Placeholder 2"/>
+          <p:cNvSpPr>
+            <a:spLocks noGrp="1"/>
+          </p:cNvSpPr>
+          <p:nvPr>
+            <p:ph idx="1"/>
+          </p:nvPr>
+        </p:nvSpPr>
+        <p:spPr/>
+        <p:txBody>
+          <a:bodyPr/>
+          <a:lstStyle/>
+          <a:p>
+            <a:pPr>
+              <a:lnSpc>
+                <a:spcPct val="150000"/>
+              </a:lnSpc>
+            </a:pPr>
+            <a:r>
+              <a:rPr lang="en-US" dirty="0"/>
+              <a:t>We will use the Model-View-Controller (MVC) architecture to design and develop this application</a:t>
+            </a:r>
+            <a:r>
+              <a:rPr lang="en-US" dirty="0" smtClean="0"/>
+              <a:t>.</a:t>
+            </a:r>
+          </a:p>
+          <a:p>
+            <a:pPr>
+              <a:lnSpc>
+                <a:spcPct val="150000"/>
+              </a:lnSpc>
+            </a:pPr>
+            <a:r>
+              <a:rPr lang="en-US" dirty="0"/>
+              <a:t>Components of </a:t>
+            </a:r>
+            <a:r>
+              <a:rPr lang="en-US" dirty="0" smtClean="0"/>
+              <a:t>MVC</a:t>
+            </a:r>
+          </a:p>
+          <a:p>
+            <a:pPr lvl="1">
+              <a:lnSpc>
+                <a:spcPct val="150000"/>
+              </a:lnSpc>
+            </a:pPr>
+            <a:r>
+              <a:rPr lang="en-US" b="1" dirty="0" smtClean="0"/>
+              <a:t>Model</a:t>
+            </a:r>
+            <a:r>
+              <a:rPr lang="en-US" dirty="0" smtClean="0"/>
+              <a:t> </a:t>
+            </a:r>
+            <a:r>
+              <a:rPr lang="en-US" dirty="0"/>
+              <a:t>- Represents the application data and business </a:t>
+            </a:r>
+            <a:r>
+              <a:rPr lang="en-US" dirty="0" smtClean="0"/>
+              <a:t>logic</a:t>
+            </a:r>
+          </a:p>
+          <a:p>
+            <a:pPr lvl="1">
+              <a:lnSpc>
+                <a:spcPct val="150000"/>
+              </a:lnSpc>
+            </a:pPr>
+            <a:r>
+              <a:rPr lang="en-US" b="1" dirty="0" smtClean="0"/>
+              <a:t>View</a:t>
+            </a:r>
+            <a:r>
+              <a:rPr lang="en-US" dirty="0" smtClean="0"/>
+              <a:t> </a:t>
+            </a:r>
+            <a:r>
+              <a:rPr lang="en-US" dirty="0"/>
+              <a:t>- User interface which displays the model </a:t>
+            </a:r>
+            <a:r>
+              <a:rPr lang="en-US" dirty="0" smtClean="0"/>
+              <a:t>data</a:t>
+            </a:r>
+          </a:p>
+          <a:p>
+            <a:pPr lvl="1">
+              <a:lnSpc>
+                <a:spcPct val="150000"/>
+              </a:lnSpc>
+            </a:pPr>
+            <a:r>
+              <a:rPr lang="en-US" b="1" dirty="0" smtClean="0"/>
+              <a:t>Controller</a:t>
+            </a:r>
+            <a:r>
+              <a:rPr lang="en-US" dirty="0" smtClean="0"/>
+              <a:t> </a:t>
+            </a:r>
+            <a:r>
+              <a:rPr lang="en-US" dirty="0"/>
+              <a:t>- Mediates input/output between the model </a:t>
+            </a:r>
+            <a:r>
+              <a:rPr lang="en-US" dirty="0" smtClean="0"/>
+              <a:t>and view</a:t>
+            </a:r>
+            <a:endParaRPr lang="en-US" dirty="0"/>
+          </a:p>
+        </p:txBody>
+      </p:sp>
+    </p:spTree>
+    <p:extLst>
+      <p:ext uri="{BB962C8B-B14F-4D97-AF65-F5344CB8AC3E}">
+        <p14:creationId xmlns:p14="http://schemas.microsoft.com/office/powerpoint/2010/main" val="933500077"/>
+      </p:ext>
+    </p:extLst>
+  </p:cSld>
+  <p:clrMapOvr>
+    <a:masterClrMapping/>
+  </p:clrMapOvr>
+</p:sld>
+</file>
+
+<file path=ppt/slides/slide3.xml><?xml version="1.0" encoding="utf-8"?>
+<p:sld xmlns:a="http://schemas.openxmlformats.org/drawingml/2006/main" xmlns:r="http://schemas.openxmlformats.org/officeDocument/2006/relationships" xmlns:p="http://schemas.openxmlformats.org/presentationml/2006/main">
+  <p:cSld>
+    <p:spTree>
+      <p:nvGrpSpPr>
+        <p:cNvPr id="1" name=""/>
+        <p:cNvGrpSpPr/>
+        <p:nvPr/>
+      </p:nvGrpSpPr>
+      <p:grpSpPr>
+        <a:xfrm>
+          <a:off x="0" y="0"/>
+          <a:ext cx="0" cy="0"/>
+          <a:chOff x="0" y="0"/>
+          <a:chExt cx="0" cy="0"/>
+        </a:xfrm>
+      </p:grpSpPr>
+      <p:sp>
+        <p:nvSpPr>
+          <p:cNvPr id="2" name="Title 1"/>
+          <p:cNvSpPr>
+            <a:spLocks noGrp="1"/>
+          </p:cNvSpPr>
+          <p:nvPr>
+            <p:ph type="title"/>
+          </p:nvPr>
+        </p:nvSpPr>
+        <p:spPr/>
+        <p:txBody>
+          <a:bodyPr>
+            <a:normAutofit fontScale="90000"/>
+          </a:bodyPr>
+          <a:lstStyle/>
+          <a:p>
+            <a:r>
+              <a:rPr lang="en-US" dirty="0" smtClean="0"/>
+              <a:t>Data and Control Flow in </a:t>
+            </a:r>
+            <a:r>
+              <a:rPr lang="en-US" dirty="0" err="1" smtClean="0"/>
+              <a:t>TechShoppers</a:t>
+            </a:r>
+            <a:endParaRPr lang="en-US" dirty="0"/>
+          </a:p>
+        </p:txBody>
+      </p:sp>
+      <p:pic>
+        <p:nvPicPr>
+          <p:cNvPr id="2050" name="Picture 2"/>
+          <p:cNvPicPr>
+            <a:picLocks noGrp="1" noChangeAspect="1" noChangeArrowheads="1"/>
+          </p:cNvPicPr>
+          <p:nvPr>
+            <p:ph idx="1"/>
+          </p:nvPr>
+        </p:nvPicPr>
+        <p:blipFill>
+          <a:blip r:embed="rId2">
+            <a:extLst>
+              <a:ext uri="{28A0092B-C50C-407E-A947-70E740481C1C}">
+                <a14:useLocalDpi xmlns:a14="http://schemas.microsoft.com/office/drawing/2010/main" val="0"/>
+              </a:ext>
+            </a:extLst>
+          </a:blip>
+          <a:srcRect/>
+          <a:stretch>
+            <a:fillRect/>
+          </a:stretch>
+        </p:blipFill>
+        <p:spPr bwMode="auto">
+          <a:xfrm>
+            <a:off x="457200" y="1794164"/>
+            <a:ext cx="8229600" cy="4488872"/>
+          </a:xfrm>
+          <a:prstGeom prst="rect">
+            <a:avLst/>
+          </a:prstGeom>
+          <a:noFill/>
+          <a:ln>
+            <a:noFill/>
+          </a:ln>
+          <a:effectLst/>
+          <a:extLst>
+            <a:ext uri="{909E8E84-426E-40DD-AFC4-6F175D3DCCD1}">
+              <a14:hiddenFill xmlns:a14="http://schemas.microsoft.com/office/drawing/2010/main">
+                <a:solidFill>
+                  <a:schemeClr val="accent1"/>
+                </a:solidFill>
+              </a14:hiddenFill>
+            </a:ext>
+            <a:ext uri="{91240B29-F687-4F45-9708-019B960494DF}">
+              <a14:hiddenLine xmlns:a14="http://schemas.microsoft.com/office/drawing/2010/main" w="9525">
+                <a:solidFill>
+                  <a:schemeClr val="tx1"/>
+                </a:solidFill>
+                <a:miter lim="800000"/>
+                <a:headEnd/>
+                <a:tailEnd/>
+              </a14:hiddenLine>
+            </a:ext>
+            <a:ext uri="{AF507438-7753-43E0-B8FC-AC1667EBCBE1}">
+              <a14:hiddenEffects xmlns:a14="http://schemas.microsoft.com/office/drawing/2010/main">
+                <a:effectLst>
+                  <a:outerShdw dist="35921" dir="2700000" algn="ctr" rotWithShape="0">
+                    <a:schemeClr val="bg2"/>
+                  </a:outerShdw>
+                </a:effectLst>
+              </a14:hiddenEffects>
+            </a:ext>
+          </a:extLst>
+        </p:spPr>
+      </p:pic>
+    </p:spTree>
+    <p:extLst>
+      <p:ext uri="{BB962C8B-B14F-4D97-AF65-F5344CB8AC3E}">
+        <p14:creationId xmlns:p14="http://schemas.microsoft.com/office/powerpoint/2010/main" val="1674924528"/>
+      </p:ext>
+    </p:extLst>
+  </p:cSld>
+  <p:clrMapOvr>
+    <a:masterClrMapping/>
+  </p:clrMapOvr>
+</p:sld>
+</file>
+
+<file path=ppt/slides/slide4.xml><?xml version="1.0" encoding="utf-8"?>
+<p:sld xmlns:a="http://schemas.openxmlformats.org/drawingml/2006/main" xmlns:r="http://schemas.openxmlformats.org/officeDocument/2006/relationships" xmlns:p="http://schemas.openxmlformats.org/presentationml/2006/main">
+  <p:cSld>
+    <p:spTree>
+      <p:nvGrpSpPr>
+        <p:cNvPr id="1" name=""/>
+        <p:cNvGrpSpPr/>
+        <p:nvPr/>
+      </p:nvGrpSpPr>
+      <p:grpSpPr>
+        <a:xfrm>
+          <a:off x="0" y="0"/>
+          <a:ext cx="0" cy="0"/>
+          <a:chOff x="0" y="0"/>
+          <a:chExt cx="0" cy="0"/>
+        </a:xfrm>
+      </p:grpSpPr>
+      <p:sp>
+        <p:nvSpPr>
+          <p:cNvPr id="2" name="Title 1"/>
+          <p:cNvSpPr>
+            <a:spLocks noGrp="1"/>
+          </p:cNvSpPr>
+          <p:nvPr>
+            <p:ph type="title"/>
+          </p:nvPr>
+        </p:nvSpPr>
+        <p:spPr/>
+        <p:txBody>
+          <a:bodyPr/>
+          <a:lstStyle/>
+          <a:p>
+            <a:r>
+              <a:rPr lang="en-US" dirty="0" smtClean="0"/>
+              <a:t>Motivation</a:t>
+            </a:r>
+            <a:endParaRPr lang="en-US" dirty="0"/>
+          </a:p>
+        </p:txBody>
+      </p:sp>
+      <p:sp>
+        <p:nvSpPr>
+          <p:cNvPr id="3" name="Content Placeholder 2"/>
+          <p:cNvSpPr>
+            <a:spLocks noGrp="1"/>
+          </p:cNvSpPr>
+          <p:nvPr>
+            <p:ph idx="1"/>
+          </p:nvPr>
+        </p:nvSpPr>
+        <p:spPr/>
+        <p:txBody>
+          <a:bodyPr/>
+          <a:lstStyle/>
+          <a:p>
+            <a:pPr>
+              <a:lnSpc>
+                <a:spcPct val="150000"/>
+              </a:lnSpc>
+            </a:pPr>
+            <a:r>
+              <a:rPr lang="en-US" dirty="0"/>
+              <a:t>MVC enforces a clear </a:t>
+            </a:r>
+            <a:r>
+              <a:rPr lang="en-US" dirty="0">
+                <a:solidFill>
+                  <a:srgbClr val="FF0000"/>
+                </a:solidFill>
+              </a:rPr>
+              <a:t>separation</a:t>
+            </a:r>
+            <a:r>
+              <a:rPr lang="en-US" dirty="0"/>
+              <a:t> between the model, view, and controller </a:t>
+            </a:r>
+            <a:r>
+              <a:rPr lang="en-US" dirty="0" smtClean="0"/>
+              <a:t>components, that makes </a:t>
+            </a:r>
+            <a:r>
+              <a:rPr lang="en-US" dirty="0"/>
+              <a:t>the codebase </a:t>
+            </a:r>
+            <a:r>
+              <a:rPr lang="en-US" dirty="0" smtClean="0">
+                <a:solidFill>
+                  <a:srgbClr val="FF0000"/>
+                </a:solidFill>
+              </a:rPr>
+              <a:t>modular</a:t>
+            </a:r>
+            <a:r>
+              <a:rPr lang="en-US" dirty="0" smtClean="0"/>
+              <a:t>.</a:t>
+            </a:r>
+            <a:endParaRPr lang="en-US" dirty="0" smtClean="0"/>
+          </a:p>
+          <a:p>
+            <a:pPr>
+              <a:lnSpc>
+                <a:spcPct val="150000"/>
+              </a:lnSpc>
+            </a:pPr>
+            <a:r>
+              <a:rPr lang="en-US" dirty="0"/>
+              <a:t>Allows </a:t>
+            </a:r>
+            <a:r>
+              <a:rPr lang="en-US" dirty="0">
+                <a:solidFill>
+                  <a:srgbClr val="FF0000"/>
+                </a:solidFill>
+              </a:rPr>
+              <a:t>easy </a:t>
+            </a:r>
+            <a:r>
+              <a:rPr lang="en-US" dirty="0" smtClean="0">
+                <a:solidFill>
+                  <a:srgbClr val="FF0000"/>
+                </a:solidFill>
+              </a:rPr>
+              <a:t>maintenance, development </a:t>
+            </a:r>
+            <a:r>
+              <a:rPr lang="en-US" dirty="0">
+                <a:solidFill>
+                  <a:srgbClr val="FF0000"/>
+                </a:solidFill>
+              </a:rPr>
+              <a:t>and </a:t>
+            </a:r>
+            <a:r>
+              <a:rPr lang="en-US" dirty="0" smtClean="0">
+                <a:solidFill>
+                  <a:srgbClr val="FF0000"/>
+                </a:solidFill>
+              </a:rPr>
+              <a:t>testing</a:t>
+            </a:r>
+            <a:r>
+              <a:rPr lang="en-US" dirty="0" smtClean="0"/>
+              <a:t> </a:t>
+            </a:r>
+            <a:r>
+              <a:rPr lang="en-US" dirty="0"/>
+              <a:t>of </a:t>
+            </a:r>
+            <a:r>
+              <a:rPr lang="en-US" dirty="0" smtClean="0"/>
+              <a:t>the components.</a:t>
+            </a:r>
+            <a:endParaRPr lang="en-US" dirty="0" smtClean="0"/>
+          </a:p>
+        </p:txBody>
+      </p:sp>
+    </p:spTree>
+    <p:extLst>
+      <p:ext uri="{BB962C8B-B14F-4D97-AF65-F5344CB8AC3E}">
+        <p14:creationId xmlns:p14="http://schemas.microsoft.com/office/powerpoint/2010/main" val="4178865089"/>
+      </p:ext>
+    </p:extLst>
+  </p:cSld>
+  <p:clrMapOvr>
+    <a:masterClrMapping/>
+  </p:clrMapOvr>
+</p:sld>
+</file>
+
+<file path=ppt/slides/slide5.xml><?xml version="1.0" encoding="utf-8"?>
+<p:sld xmlns:a="http://schemas.openxmlformats.org/drawingml/2006/main" xmlns:r="http://schemas.openxmlformats.org/officeDocument/2006/relationships" xmlns:p="http://schemas.openxmlformats.org/presentationml/2006/main">
+  <p:cSld>
+    <p:spTree>
+      <p:nvGrpSpPr>
+        <p:cNvPr id="1" name=""/>
+        <p:cNvGrpSpPr/>
+        <p:nvPr/>
+      </p:nvGrpSpPr>
+      <p:grpSpPr>
+        <a:xfrm>
+          <a:off x="0" y="0"/>
+          <a:ext cx="0" cy="0"/>
+          <a:chOff x="0" y="0"/>
+          <a:chExt cx="0" cy="0"/>
+        </a:xfrm>
+      </p:grpSpPr>
+      <p:sp>
+        <p:nvSpPr>
+          <p:cNvPr id="2" name="Title 1"/>
+          <p:cNvSpPr>
+            <a:spLocks noGrp="1"/>
+          </p:cNvSpPr>
+          <p:nvPr>
+            <p:ph type="title"/>
+          </p:nvPr>
+        </p:nvSpPr>
+        <p:spPr/>
+        <p:txBody>
+          <a:bodyPr/>
+          <a:lstStyle/>
+          <a:p>
+            <a:r>
+              <a:rPr lang="en-US" dirty="0" smtClean="0"/>
+              <a:t>Model Details</a:t>
+            </a:r>
+            <a:endParaRPr lang="en-US" dirty="0"/>
+          </a:p>
+        </p:txBody>
+      </p:sp>
+      <p:sp>
+        <p:nvSpPr>
+          <p:cNvPr id="3" name="Content Placeholder 2"/>
+          <p:cNvSpPr>
+            <a:spLocks noGrp="1"/>
+          </p:cNvSpPr>
+          <p:nvPr>
+            <p:ph idx="1"/>
+          </p:nvPr>
+        </p:nvSpPr>
+        <p:spPr/>
+        <p:txBody>
+          <a:bodyPr/>
+          <a:lstStyle/>
+          <a:p>
+            <a:pPr>
+              <a:lnSpc>
+                <a:spcPct val="150000"/>
+              </a:lnSpc>
+            </a:pPr>
+            <a:r>
+              <a:rPr lang="en-US" dirty="0"/>
+              <a:t>Database </a:t>
+            </a:r>
+            <a:r>
+              <a:rPr lang="en-US" dirty="0" smtClean="0"/>
+              <a:t>models and Schema </a:t>
+            </a:r>
+            <a:r>
+              <a:rPr lang="en-US" dirty="0"/>
+              <a:t>for products, prices, websites etc</a:t>
+            </a:r>
+            <a:r>
+              <a:rPr lang="en-US" dirty="0" smtClean="0"/>
+              <a:t>.</a:t>
+            </a:r>
+          </a:p>
+          <a:p>
+            <a:pPr>
+              <a:lnSpc>
+                <a:spcPct val="150000"/>
+              </a:lnSpc>
+            </a:pPr>
+            <a:r>
+              <a:rPr lang="en-US" dirty="0"/>
+              <a:t>Services to fetch data from retailers' </a:t>
+            </a:r>
+            <a:r>
+              <a:rPr lang="en-US" dirty="0" smtClean="0"/>
+              <a:t>APIs</a:t>
+            </a:r>
+          </a:p>
+          <a:p>
+            <a:pPr>
+              <a:lnSpc>
+                <a:spcPct val="150000"/>
+              </a:lnSpc>
+            </a:pPr>
+            <a:r>
+              <a:rPr lang="en-US" dirty="0"/>
+              <a:t>Contains business logic to retrieve and manipulate data</a:t>
+            </a:r>
+            <a:endParaRPr lang="en-US" dirty="0" smtClean="0"/>
+          </a:p>
+          <a:p>
+            <a:pPr>
+              <a:lnSpc>
+                <a:spcPct val="150000"/>
+              </a:lnSpc>
+            </a:pPr>
+            <a:r>
+              <a:rPr lang="en-US" b="1" dirty="0" smtClean="0"/>
+              <a:t>Database:</a:t>
+            </a:r>
+            <a:r>
+              <a:rPr lang="en-US" dirty="0" smtClean="0"/>
+              <a:t> </a:t>
+            </a:r>
+            <a:r>
+              <a:rPr lang="en-US" dirty="0" err="1" smtClean="0">
+                <a:solidFill>
+                  <a:srgbClr val="FF0000"/>
+                </a:solidFill>
+              </a:rPr>
+              <a:t>MongoDB</a:t>
+            </a:r>
+            <a:r>
+              <a:rPr lang="en-US" dirty="0" smtClean="0">
+                <a:solidFill>
+                  <a:srgbClr val="FF0000"/>
+                </a:solidFill>
+              </a:rPr>
+              <a:t> with Mongoose</a:t>
+            </a:r>
+            <a:endParaRPr lang="en-US" dirty="0">
+              <a:solidFill>
+                <a:srgbClr val="FF0000"/>
+              </a:solidFill>
+            </a:endParaRPr>
+          </a:p>
+        </p:txBody>
+      </p:sp>
+    </p:spTree>
+    <p:extLst>
+      <p:ext uri="{BB962C8B-B14F-4D97-AF65-F5344CB8AC3E}">
+        <p14:creationId xmlns:p14="http://schemas.microsoft.com/office/powerpoint/2010/main" val="1120551015"/>
+      </p:ext>
+    </p:extLst>
+  </p:cSld>
+  <p:clrMapOvr>
+    <a:masterClrMapping/>
+  </p:clrMapOvr>
+</p:sld>
+</file>
+
+<file path=ppt/slides/slide6.xml><?xml version="1.0" encoding="utf-8"?>
+<p:sld xmlns:a="http://schemas.openxmlformats.org/drawingml/2006/main" xmlns:r="http://schemas.openxmlformats.org/officeDocument/2006/relationships" xmlns:p="http://schemas.openxmlformats.org/presentationml/2006/main">
+  <p:cSld>
+    <p:spTree>
+      <p:nvGrpSpPr>
+        <p:cNvPr id="1" name=""/>
+        <p:cNvGrpSpPr/>
+        <p:nvPr/>
+      </p:nvGrpSpPr>
+      <p:grpSpPr>
+        <a:xfrm>
+          <a:off x="0" y="0"/>
+          <a:ext cx="0" cy="0"/>
+          <a:chOff x="0" y="0"/>
+          <a:chExt cx="0" cy="0"/>
+        </a:xfrm>
+      </p:grpSpPr>
+      <p:sp>
+        <p:nvSpPr>
+          <p:cNvPr id="2" name="Title 1"/>
+          <p:cNvSpPr>
+            <a:spLocks noGrp="1"/>
+          </p:cNvSpPr>
+          <p:nvPr>
+            <p:ph type="title"/>
+          </p:nvPr>
+        </p:nvSpPr>
+        <p:spPr/>
+        <p:txBody>
+          <a:bodyPr/>
+          <a:lstStyle/>
+          <a:p>
+            <a:r>
+              <a:rPr lang="en-US" dirty="0" smtClean="0"/>
+              <a:t>View Details</a:t>
+            </a:r>
+            <a:endParaRPr lang="en-US" dirty="0"/>
+          </a:p>
+        </p:txBody>
+      </p:sp>
+      <p:sp>
+        <p:nvSpPr>
+          <p:cNvPr id="3" name="Content Placeholder 2"/>
+          <p:cNvSpPr>
+            <a:spLocks noGrp="1"/>
+          </p:cNvSpPr>
+          <p:nvPr>
+            <p:ph idx="1"/>
+          </p:nvPr>
+        </p:nvSpPr>
+        <p:spPr/>
+        <p:txBody>
+          <a:bodyPr>
+            <a:normAutofit/>
+          </a:bodyPr>
+          <a:lstStyle/>
+          <a:p>
+            <a:pPr>
+              <a:lnSpc>
+                <a:spcPct val="150000"/>
+              </a:lnSpc>
+            </a:pPr>
+            <a:r>
+              <a:rPr lang="fr-FR" dirty="0"/>
+              <a:t>User interface components - HTML, CSS, </a:t>
+            </a:r>
+            <a:r>
+              <a:rPr lang="fr-FR" dirty="0" smtClean="0"/>
+              <a:t>JavaScript</a:t>
+            </a:r>
+          </a:p>
+          <a:p>
+            <a:pPr>
+              <a:lnSpc>
+                <a:spcPct val="150000"/>
+              </a:lnSpc>
+            </a:pPr>
+            <a:r>
+              <a:rPr lang="en-US" dirty="0"/>
+              <a:t>Displays model data to the </a:t>
+            </a:r>
+            <a:r>
+              <a:rPr lang="en-US" dirty="0" smtClean="0"/>
+              <a:t>user.</a:t>
+            </a:r>
+          </a:p>
+          <a:p>
+            <a:pPr>
+              <a:lnSpc>
+                <a:spcPct val="150000"/>
+              </a:lnSpc>
+            </a:pPr>
+            <a:r>
+              <a:rPr lang="en-US" dirty="0"/>
+              <a:t>Gets data from and passes data to the </a:t>
+            </a:r>
+            <a:r>
+              <a:rPr lang="en-US" dirty="0" smtClean="0"/>
+              <a:t>controller.</a:t>
+            </a:r>
+          </a:p>
+          <a:p>
+            <a:pPr>
+              <a:lnSpc>
+                <a:spcPct val="150000"/>
+              </a:lnSpc>
+            </a:pPr>
+            <a:r>
+              <a:rPr lang="en-US" b="1" dirty="0" smtClean="0"/>
+              <a:t>Framework:</a:t>
+            </a:r>
+            <a:r>
+              <a:rPr lang="en-US" dirty="0" smtClean="0"/>
+              <a:t> </a:t>
+            </a:r>
+            <a:r>
+              <a:rPr lang="en-US" dirty="0" smtClean="0">
+                <a:solidFill>
+                  <a:srgbClr val="FF0000"/>
+                </a:solidFill>
+              </a:rPr>
+              <a:t>React</a:t>
+            </a:r>
+          </a:p>
+          <a:p>
+            <a:pPr>
+              <a:lnSpc>
+                <a:spcPct val="150000"/>
+              </a:lnSpc>
+            </a:pPr>
+            <a:r>
+              <a:rPr lang="en-US" dirty="0"/>
+              <a:t>A</a:t>
+            </a:r>
+            <a:r>
+              <a:rPr lang="en-US" dirty="0" smtClean="0"/>
+              <a:t>spects </a:t>
+            </a:r>
+            <a:r>
+              <a:rPr lang="en-US" dirty="0"/>
+              <a:t>of the Controller can also be </a:t>
+            </a:r>
+            <a:r>
+              <a:rPr lang="en-US" dirty="0" smtClean="0"/>
+              <a:t>implemented by using React hooks like </a:t>
+            </a:r>
+            <a:r>
+              <a:rPr lang="en-US" b="1" dirty="0" err="1" smtClean="0"/>
+              <a:t>useState</a:t>
+            </a:r>
+            <a:r>
+              <a:rPr lang="en-US" dirty="0"/>
+              <a:t>, </a:t>
+            </a:r>
+            <a:r>
+              <a:rPr lang="en-US" b="1" dirty="0" err="1"/>
+              <a:t>useEffect</a:t>
+            </a:r>
+            <a:r>
+              <a:rPr lang="en-US" dirty="0"/>
+              <a:t>, and </a:t>
+            </a:r>
+            <a:r>
+              <a:rPr lang="en-US" b="1" dirty="0" err="1"/>
+              <a:t>useContext</a:t>
+            </a:r>
+            <a:r>
+              <a:rPr lang="en-US" dirty="0"/>
+              <a:t> to </a:t>
+            </a:r>
+            <a:r>
+              <a:rPr lang="en-US" dirty="0" smtClean="0">
+                <a:solidFill>
+                  <a:srgbClr val="FF0000"/>
+                </a:solidFill>
+              </a:rPr>
+              <a:t>handle user interactions</a:t>
+            </a:r>
+            <a:r>
+              <a:rPr lang="en-US" dirty="0" smtClean="0"/>
+              <a:t>, </a:t>
+            </a:r>
+            <a:r>
+              <a:rPr lang="en-US" dirty="0" smtClean="0">
+                <a:solidFill>
+                  <a:srgbClr val="FF0000"/>
+                </a:solidFill>
+              </a:rPr>
+              <a:t>send </a:t>
+            </a:r>
+            <a:r>
+              <a:rPr lang="en-US" dirty="0">
+                <a:solidFill>
+                  <a:srgbClr val="FF0000"/>
+                </a:solidFill>
+              </a:rPr>
+              <a:t>requests to backend </a:t>
+            </a:r>
+            <a:r>
+              <a:rPr lang="en-US" dirty="0" smtClean="0">
+                <a:solidFill>
+                  <a:srgbClr val="FF0000"/>
+                </a:solidFill>
+              </a:rPr>
+              <a:t>controllers</a:t>
+            </a:r>
+            <a:r>
+              <a:rPr lang="en-US" dirty="0" smtClean="0"/>
+              <a:t>, and </a:t>
+            </a:r>
+            <a:r>
+              <a:rPr lang="en-US" dirty="0" smtClean="0">
+                <a:solidFill>
+                  <a:srgbClr val="FF0000"/>
+                </a:solidFill>
+              </a:rPr>
+              <a:t>manage </a:t>
+            </a:r>
+            <a:r>
+              <a:rPr lang="en-US" dirty="0">
+                <a:solidFill>
+                  <a:srgbClr val="FF0000"/>
+                </a:solidFill>
+              </a:rPr>
+              <a:t>the application </a:t>
+            </a:r>
+            <a:r>
+              <a:rPr lang="en-US" dirty="0" smtClean="0">
+                <a:solidFill>
+                  <a:srgbClr val="FF0000"/>
+                </a:solidFill>
+              </a:rPr>
+              <a:t>state</a:t>
+            </a:r>
+            <a:r>
+              <a:rPr lang="en-US" dirty="0" smtClean="0"/>
+              <a:t>.</a:t>
+            </a:r>
+          </a:p>
+        </p:txBody>
+      </p:sp>
+    </p:spTree>
+    <p:extLst>
+      <p:ext uri="{BB962C8B-B14F-4D97-AF65-F5344CB8AC3E}">
+        <p14:creationId xmlns:p14="http://schemas.microsoft.com/office/powerpoint/2010/main" val="635947297"/>
+      </p:ext>
+    </p:extLst>
+  </p:cSld>
+  <p:clrMapOvr>
+    <a:masterClrMapping/>
+  </p:clrMapOvr>
+</p:sld>
+</file>
+
+<file path=ppt/slides/slide7.xml><?xml version="1.0" encoding="utf-8"?>
+<p:sld xmlns:a="http://schemas.openxmlformats.org/drawingml/2006/main" xmlns:r="http://schemas.openxmlformats.org/officeDocument/2006/relationships" xmlns:p="http://schemas.openxmlformats.org/presentationml/2006/main">
+  <p:cSld>
+    <p:spTree>
+      <p:nvGrpSpPr>
+        <p:cNvPr id="1" name=""/>
+        <p:cNvGrpSpPr/>
+        <p:nvPr/>
+      </p:nvGrpSpPr>
+      <p:grpSpPr>
+        <a:xfrm>
+          <a:off x="0" y="0"/>
+          <a:ext cx="0" cy="0"/>
+          <a:chOff x="0" y="0"/>
+          <a:chExt cx="0" cy="0"/>
+        </a:xfrm>
+      </p:grpSpPr>
+      <p:sp>
+        <p:nvSpPr>
+          <p:cNvPr id="2" name="Title 1"/>
+          <p:cNvSpPr>
+            <a:spLocks noGrp="1"/>
+          </p:cNvSpPr>
+          <p:nvPr>
+            <p:ph type="title"/>
+          </p:nvPr>
+        </p:nvSpPr>
+        <p:spPr/>
+        <p:txBody>
+          <a:bodyPr/>
+          <a:lstStyle/>
+          <a:p>
+            <a:r>
+              <a:rPr lang="en-US" dirty="0" smtClean="0"/>
+              <a:t>Controller Details</a:t>
+            </a:r>
+            <a:endParaRPr lang="en-US" dirty="0"/>
+          </a:p>
+        </p:txBody>
+      </p:sp>
+      <p:sp>
+        <p:nvSpPr>
+          <p:cNvPr id="3" name="Content Placeholder 2"/>
+          <p:cNvSpPr>
+            <a:spLocks noGrp="1"/>
+          </p:cNvSpPr>
+          <p:nvPr>
+            <p:ph idx="1"/>
+          </p:nvPr>
+        </p:nvSpPr>
+        <p:spPr/>
+        <p:txBody>
+          <a:bodyPr>
+            <a:normAutofit fontScale="92500" lnSpcReduction="10000"/>
+          </a:bodyPr>
+          <a:lstStyle/>
+          <a:p>
+            <a:pPr>
+              <a:lnSpc>
+                <a:spcPct val="150000"/>
+              </a:lnSpc>
+            </a:pPr>
+            <a:r>
+              <a:rPr lang="en-US" dirty="0"/>
+              <a:t>Mediates between model and </a:t>
+            </a:r>
+            <a:r>
+              <a:rPr lang="en-US" dirty="0" smtClean="0"/>
+              <a:t>view</a:t>
+            </a:r>
+          </a:p>
+          <a:p>
+            <a:pPr>
+              <a:lnSpc>
+                <a:spcPct val="150000"/>
+              </a:lnSpc>
+            </a:pPr>
+            <a:r>
+              <a:rPr lang="en-US" dirty="0"/>
+              <a:t>Gets data from model and passes to </a:t>
+            </a:r>
+            <a:r>
+              <a:rPr lang="en-US" dirty="0" smtClean="0"/>
+              <a:t>view and vice versa</a:t>
+            </a:r>
+          </a:p>
+          <a:p>
+            <a:pPr>
+              <a:lnSpc>
+                <a:spcPct val="150000"/>
+              </a:lnSpc>
+            </a:pPr>
+            <a:r>
+              <a:rPr lang="en-US" dirty="0"/>
+              <a:t>Updates model data if </a:t>
+            </a:r>
+            <a:r>
+              <a:rPr lang="en-US" dirty="0" smtClean="0"/>
+              <a:t>needed</a:t>
+            </a:r>
+          </a:p>
+          <a:p>
+            <a:pPr>
+              <a:lnSpc>
+                <a:spcPct val="150000"/>
+              </a:lnSpc>
+            </a:pPr>
+            <a:r>
+              <a:rPr lang="en-US" b="1" dirty="0" smtClean="0"/>
+              <a:t>Framework:</a:t>
+            </a:r>
+            <a:r>
+              <a:rPr lang="en-US" dirty="0" smtClean="0"/>
+              <a:t> </a:t>
+            </a:r>
+            <a:r>
+              <a:rPr lang="en-US" dirty="0" smtClean="0">
+                <a:solidFill>
+                  <a:srgbClr val="FF0000"/>
+                </a:solidFill>
+              </a:rPr>
+              <a:t>Express.js</a:t>
+            </a:r>
+          </a:p>
+          <a:p>
+            <a:pPr>
+              <a:lnSpc>
+                <a:spcPct val="150000"/>
+              </a:lnSpc>
+            </a:pPr>
+            <a:r>
+              <a:rPr lang="en-US" dirty="0">
+                <a:solidFill>
+                  <a:srgbClr val="FF0000"/>
+                </a:solidFill>
+              </a:rPr>
+              <a:t>H</a:t>
+            </a:r>
+            <a:r>
+              <a:rPr lang="en-US" dirty="0" smtClean="0">
+                <a:solidFill>
+                  <a:srgbClr val="FF0000"/>
+                </a:solidFill>
+              </a:rPr>
+              <a:t>andle HTTP requests </a:t>
+            </a:r>
+            <a:r>
+              <a:rPr lang="en-US" dirty="0" smtClean="0"/>
+              <a:t>from frontend (</a:t>
+            </a:r>
+            <a:r>
+              <a:rPr lang="en-US" dirty="0" err="1" smtClean="0"/>
+              <a:t>Axios</a:t>
+            </a:r>
+            <a:r>
+              <a:rPr lang="en-US" dirty="0" smtClean="0"/>
+              <a:t> or fetch API)</a:t>
+            </a:r>
+          </a:p>
+          <a:p>
+            <a:pPr>
+              <a:lnSpc>
+                <a:spcPct val="150000"/>
+              </a:lnSpc>
+            </a:pPr>
+            <a:r>
+              <a:rPr lang="en-US" dirty="0" smtClean="0"/>
+              <a:t>Use </a:t>
+            </a:r>
+            <a:r>
+              <a:rPr lang="en-US" dirty="0"/>
+              <a:t>Express.js to define </a:t>
+            </a:r>
+            <a:r>
+              <a:rPr lang="en-US" b="1" dirty="0"/>
+              <a:t>route handlers (controllers)</a:t>
+            </a:r>
+            <a:r>
+              <a:rPr lang="en-US" dirty="0"/>
+              <a:t> that interact with the Mongoose model to fetch or modify data and then </a:t>
+            </a:r>
+            <a:r>
+              <a:rPr lang="en-US" dirty="0">
+                <a:solidFill>
+                  <a:srgbClr val="FF0000"/>
+                </a:solidFill>
+              </a:rPr>
+              <a:t>send </a:t>
+            </a:r>
+            <a:r>
+              <a:rPr lang="en-US" dirty="0" smtClean="0">
+                <a:solidFill>
+                  <a:srgbClr val="FF0000"/>
+                </a:solidFill>
+              </a:rPr>
+              <a:t>responses/views</a:t>
+            </a:r>
+            <a:r>
+              <a:rPr lang="en-US" dirty="0">
+                <a:solidFill>
+                  <a:srgbClr val="FF0000"/>
+                </a:solidFill>
+              </a:rPr>
+              <a:t> </a:t>
+            </a:r>
+            <a:r>
+              <a:rPr lang="en-US" dirty="0" smtClean="0">
+                <a:solidFill>
+                  <a:srgbClr val="FF0000"/>
+                </a:solidFill>
+              </a:rPr>
+              <a:t>(</a:t>
+            </a:r>
+            <a:r>
+              <a:rPr lang="en-US" dirty="0">
+                <a:solidFill>
+                  <a:srgbClr val="FF0000"/>
+                </a:solidFill>
+              </a:rPr>
+              <a:t>JSON data, status codes</a:t>
+            </a:r>
+            <a:r>
+              <a:rPr lang="en-US" dirty="0" smtClean="0">
+                <a:solidFill>
+                  <a:srgbClr val="FF0000"/>
+                </a:solidFill>
+              </a:rPr>
+              <a:t>)</a:t>
+            </a:r>
+            <a:r>
+              <a:rPr lang="en-US" dirty="0" smtClean="0"/>
+              <a:t> </a:t>
+            </a:r>
+            <a:r>
+              <a:rPr lang="en-US" dirty="0"/>
+              <a:t>back to the </a:t>
+            </a:r>
+            <a:r>
+              <a:rPr lang="en-US" dirty="0" smtClean="0"/>
+              <a:t>client</a:t>
+            </a:r>
+            <a:r>
+              <a:rPr lang="en-US" dirty="0"/>
+              <a:t>.</a:t>
+            </a:r>
+            <a:endParaRPr lang="en-US" dirty="0" smtClean="0"/>
+          </a:p>
+        </p:txBody>
+      </p:sp>
+    </p:spTree>
+    <p:extLst>
+      <p:ext uri="{BB962C8B-B14F-4D97-AF65-F5344CB8AC3E}">
+        <p14:creationId xmlns:p14="http://schemas.microsoft.com/office/powerpoint/2010/main" val="2932344949"/>
+      </p:ext>
+    </p:extLst>
+  </p:cSld>
+  <p:clrMapOvr>
+    <a:masterClrMapping/>
+  </p:clrMapOvr>
+</p:sld>
+</file>
+
+<file path=ppt/slides/slide8.xml><?xml version="1.0" encoding="utf-8"?>
+<p:sld xmlns:a="http://schemas.openxmlformats.org/drawingml/2006/main" xmlns:r="http://schemas.openxmlformats.org/officeDocument/2006/relationships" xmlns:p="http://schemas.openxmlformats.org/presentationml/2006/main">
+  <p:cSld>
+    <p:spTree>
+      <p:nvGrpSpPr>
+        <p:cNvPr id="1" name=""/>
+        <p:cNvGrpSpPr/>
+        <p:nvPr/>
+      </p:nvGrpSpPr>
+      <p:grpSpPr>
+        <a:xfrm>
+          <a:off x="0" y="0"/>
+          <a:ext cx="0" cy="0"/>
+          <a:chOff x="0" y="0"/>
+          <a:chExt cx="0" cy="0"/>
+        </a:xfrm>
+      </p:grpSpPr>
+      <p:pic>
+        <p:nvPicPr>
+          <p:cNvPr id="4" name="Picture 2" descr="C:\Users\HP\AppData\Local\Microsoft\Windows\INetCache\IE\4FA5Y4LK\thank-you-1428147_960_720[1].png"/>
+          <p:cNvPicPr>
+            <a:picLocks noGrp="1" noChangeAspect="1" noChangeArrowheads="1"/>
+          </p:cNvPicPr>
+          <p:nvPr>
+            <p:ph idx="1"/>
+          </p:nvPr>
+        </p:nvPicPr>
+        <p:blipFill>
+          <a:blip r:embed="rId2">
+            <a:extLst>
+              <a:ext uri="{28A0092B-C50C-407E-A947-70E740481C1C}">
+                <a14:useLocalDpi xmlns:a14="http://schemas.microsoft.com/office/drawing/2010/main" val="0"/>
+              </a:ext>
+            </a:extLst>
+          </a:blip>
+          <a:srcRect/>
+          <a:stretch>
+            <a:fillRect/>
+          </a:stretch>
+        </p:blipFill>
+        <p:spPr bwMode="auto">
+          <a:xfrm>
+            <a:off x="2209800" y="1066800"/>
+            <a:ext cx="4707466" cy="4876800"/>
+          </a:xfrm>
+          <a:prstGeom prst="rect">
+            <a:avLst/>
+          </a:prstGeom>
+          <a:noFill/>
+          <a:extLst>
+            <a:ext uri="{909E8E84-426E-40DD-AFC4-6F175D3DCCD1}">
+              <a14:hiddenFill xmlns:a14="http://schemas.microsoft.com/office/drawing/2010/main">
+                <a:solidFill>
+                  <a:srgbClr val="FFFFFF"/>
+                </a:solidFill>
+              </a14:hiddenFill>
+            </a:ext>
+          </a:extLst>
+        </p:spPr>
+      </p:pic>
+    </p:spTree>
+    <p:extLst>
+      <p:ext uri="{BB962C8B-B14F-4D97-AF65-F5344CB8AC3E}">
+        <p14:creationId xmlns:p14="http://schemas.microsoft.com/office/powerpoint/2010/main" val="1122042934"/>
+      </p:ext>
+    </p:extLst>
+  </p:cSld>
+  <p:clrMapOvr>
+    <a:masterClrMapping/>
+  </p:clrMapOvr>
+</p:sld>
+</file>
+
+<file path=ppt/slides/slide9.xml><?xml version="1.0" encoding="utf-8"?>
 <p:sld xmlns:a="http://schemas.openxmlformats.org/drawingml/2006/main" xmlns:r="http://schemas.openxmlformats.org/officeDocument/2006/relationships" xmlns:p="http://schemas.openxmlformats.org/presentationml/2006/main">
   <p:cSld>
     <p:spTree>
@@ -4721,7 +5927,7 @@
               <a:buNone/>
             </a:pPr>
             <a:r>
-              <a:rPr lang="en" dirty="0">
+              <a:rPr lang="en" dirty="0" smtClean="0">
                 <a:ln>
                   <a:solidFill>
                     <a:schemeClr val="tx1"/>
@@ -5185,1298 +6391,6 @@
     <p:extLst>
       <p:ext uri="{BB962C8B-B14F-4D97-AF65-F5344CB8AC3E}">
         <p14:creationId xmlns:p14="http://schemas.microsoft.com/office/powerpoint/2010/main" val="2794924764"/>
-      </p:ext>
-    </p:extLst>
-  </p:cSld>
-  <p:clrMapOvr>
-    <a:masterClrMapping/>
-  </p:clrMapOvr>
-</p:sld>
-</file>
-
-<file path=ppt/slides/slide2.xml><?xml version="1.0" encoding="utf-8"?>
-<p:sld xmlns:a="http://schemas.openxmlformats.org/drawingml/2006/main" xmlns:r="http://schemas.openxmlformats.org/officeDocument/2006/relationships" xmlns:p="http://schemas.openxmlformats.org/presentationml/2006/main">
-  <p:cSld>
-    <p:spTree>
-      <p:nvGrpSpPr>
-        <p:cNvPr id="1" name=""/>
-        <p:cNvGrpSpPr/>
-        <p:nvPr/>
-      </p:nvGrpSpPr>
-      <p:grpSpPr>
-        <a:xfrm>
-          <a:off x="0" y="0"/>
-          <a:ext cx="0" cy="0"/>
-          <a:chOff x="0" y="0"/>
-          <a:chExt cx="0" cy="0"/>
-        </a:xfrm>
-      </p:grpSpPr>
-      <p:sp>
-        <p:nvSpPr>
-          <p:cNvPr id="2" name="Title 1"/>
-          <p:cNvSpPr>
-            <a:spLocks noGrp="1"/>
-          </p:cNvSpPr>
-          <p:nvPr>
-            <p:ph type="title"/>
-          </p:nvPr>
-        </p:nvSpPr>
-        <p:spPr/>
-        <p:txBody>
-          <a:bodyPr/>
-          <a:lstStyle/>
-          <a:p>
-            <a:r>
-              <a:rPr lang="en-US" dirty="0" smtClean="0"/>
-              <a:t>Choice of an Architecture</a:t>
-            </a:r>
-            <a:endParaRPr lang="en-US" dirty="0"/>
-          </a:p>
-        </p:txBody>
-      </p:sp>
-      <p:sp>
-        <p:nvSpPr>
-          <p:cNvPr id="3" name="Content Placeholder 2"/>
-          <p:cNvSpPr>
-            <a:spLocks noGrp="1"/>
-          </p:cNvSpPr>
-          <p:nvPr>
-            <p:ph idx="1"/>
-          </p:nvPr>
-        </p:nvSpPr>
-        <p:spPr/>
-        <p:txBody>
-          <a:bodyPr/>
-          <a:lstStyle/>
-          <a:p>
-            <a:pPr>
-              <a:lnSpc>
-                <a:spcPct val="150000"/>
-              </a:lnSpc>
-            </a:pPr>
-            <a:r>
-              <a:rPr lang="en-US" dirty="0"/>
-              <a:t>We will use the Model-View-Controller (MVC) architecture to design and develop this application</a:t>
-            </a:r>
-            <a:r>
-              <a:rPr lang="en-US" dirty="0" smtClean="0"/>
-              <a:t>.</a:t>
-            </a:r>
-          </a:p>
-          <a:p>
-            <a:pPr>
-              <a:lnSpc>
-                <a:spcPct val="150000"/>
-              </a:lnSpc>
-            </a:pPr>
-            <a:r>
-              <a:rPr lang="en-US" dirty="0"/>
-              <a:t>Components of </a:t>
-            </a:r>
-            <a:r>
-              <a:rPr lang="en-US" dirty="0" smtClean="0"/>
-              <a:t>MVC</a:t>
-            </a:r>
-          </a:p>
-          <a:p>
-            <a:pPr lvl="1">
-              <a:lnSpc>
-                <a:spcPct val="150000"/>
-              </a:lnSpc>
-            </a:pPr>
-            <a:r>
-              <a:rPr lang="en-US" b="1" dirty="0" smtClean="0"/>
-              <a:t>Model</a:t>
-            </a:r>
-            <a:r>
-              <a:rPr lang="en-US" dirty="0" smtClean="0"/>
-              <a:t> </a:t>
-            </a:r>
-            <a:r>
-              <a:rPr lang="en-US" dirty="0"/>
-              <a:t>- Represents the application data and business </a:t>
-            </a:r>
-            <a:r>
-              <a:rPr lang="en-US" dirty="0" smtClean="0"/>
-              <a:t>logic</a:t>
-            </a:r>
-          </a:p>
-          <a:p>
-            <a:pPr lvl="1">
-              <a:lnSpc>
-                <a:spcPct val="150000"/>
-              </a:lnSpc>
-            </a:pPr>
-            <a:r>
-              <a:rPr lang="en-US" b="1" dirty="0" smtClean="0"/>
-              <a:t>View</a:t>
-            </a:r>
-            <a:r>
-              <a:rPr lang="en-US" dirty="0" smtClean="0"/>
-              <a:t> </a:t>
-            </a:r>
-            <a:r>
-              <a:rPr lang="en-US" dirty="0"/>
-              <a:t>- User interface which displays the model </a:t>
-            </a:r>
-            <a:r>
-              <a:rPr lang="en-US" dirty="0" smtClean="0"/>
-              <a:t>data</a:t>
-            </a:r>
-          </a:p>
-          <a:p>
-            <a:pPr lvl="1">
-              <a:lnSpc>
-                <a:spcPct val="150000"/>
-              </a:lnSpc>
-            </a:pPr>
-            <a:r>
-              <a:rPr lang="en-US" b="1" dirty="0" smtClean="0"/>
-              <a:t>Controller</a:t>
-            </a:r>
-            <a:r>
-              <a:rPr lang="en-US" dirty="0" smtClean="0"/>
-              <a:t> </a:t>
-            </a:r>
-            <a:r>
-              <a:rPr lang="en-US" dirty="0"/>
-              <a:t>- Mediates input/output between the model </a:t>
-            </a:r>
-            <a:r>
-              <a:rPr lang="en-US" dirty="0" smtClean="0"/>
-              <a:t>and view</a:t>
-            </a:r>
-            <a:endParaRPr lang="en-US" dirty="0"/>
-          </a:p>
-        </p:txBody>
-      </p:sp>
-    </p:spTree>
-    <p:extLst>
-      <p:ext uri="{BB962C8B-B14F-4D97-AF65-F5344CB8AC3E}">
-        <p14:creationId xmlns:p14="http://schemas.microsoft.com/office/powerpoint/2010/main" val="933500077"/>
-      </p:ext>
-    </p:extLst>
-  </p:cSld>
-  <p:clrMapOvr>
-    <a:masterClrMapping/>
-  </p:clrMapOvr>
-</p:sld>
-</file>
-
-<file path=ppt/slides/slide3.xml><?xml version="1.0" encoding="utf-8"?>
-<p:sld xmlns:a="http://schemas.openxmlformats.org/drawingml/2006/main" xmlns:r="http://schemas.openxmlformats.org/officeDocument/2006/relationships" xmlns:p="http://schemas.openxmlformats.org/presentationml/2006/main">
-  <p:cSld>
-    <p:spTree>
-      <p:nvGrpSpPr>
-        <p:cNvPr id="1" name=""/>
-        <p:cNvGrpSpPr/>
-        <p:nvPr/>
-      </p:nvGrpSpPr>
-      <p:grpSpPr>
-        <a:xfrm>
-          <a:off x="0" y="0"/>
-          <a:ext cx="0" cy="0"/>
-          <a:chOff x="0" y="0"/>
-          <a:chExt cx="0" cy="0"/>
-        </a:xfrm>
-      </p:grpSpPr>
-      <p:sp>
-        <p:nvSpPr>
-          <p:cNvPr id="2" name="Title 1"/>
-          <p:cNvSpPr>
-            <a:spLocks noGrp="1"/>
-          </p:cNvSpPr>
-          <p:nvPr>
-            <p:ph type="title"/>
-          </p:nvPr>
-        </p:nvSpPr>
-        <p:spPr/>
-        <p:txBody>
-          <a:bodyPr/>
-          <a:lstStyle/>
-          <a:p>
-            <a:r>
-              <a:rPr lang="en-US" dirty="0" smtClean="0"/>
-              <a:t>Data and Control Flow of MVC</a:t>
-            </a:r>
-            <a:endParaRPr lang="en-US" dirty="0"/>
-          </a:p>
-        </p:txBody>
-      </p:sp>
-      <p:pic>
-        <p:nvPicPr>
-          <p:cNvPr id="1028" name="Picture 4"/>
-          <p:cNvPicPr>
-            <a:picLocks noGrp="1" noChangeAspect="1" noChangeArrowheads="1"/>
-          </p:cNvPicPr>
-          <p:nvPr>
-            <p:ph idx="1"/>
-          </p:nvPr>
-        </p:nvPicPr>
-        <p:blipFill>
-          <a:blip r:embed="rId2">
-            <a:extLst>
-              <a:ext uri="{28A0092B-C50C-407E-A947-70E740481C1C}">
-                <a14:useLocalDpi xmlns:a14="http://schemas.microsoft.com/office/drawing/2010/main" val="0"/>
-              </a:ext>
-            </a:extLst>
-          </a:blip>
-          <a:srcRect/>
-          <a:stretch>
-            <a:fillRect/>
-          </a:stretch>
-        </p:blipFill>
-        <p:spPr bwMode="auto">
-          <a:xfrm>
-            <a:off x="533400" y="1600200"/>
-            <a:ext cx="8077200" cy="4876800"/>
-          </a:xfrm>
-          <a:prstGeom prst="rect">
-            <a:avLst/>
-          </a:prstGeom>
-          <a:noFill/>
-          <a:ln>
-            <a:noFill/>
-          </a:ln>
-          <a:effectLst/>
-          <a:extLst>
-            <a:ext uri="{909E8E84-426E-40DD-AFC4-6F175D3DCCD1}">
-              <a14:hiddenFill xmlns:a14="http://schemas.microsoft.com/office/drawing/2010/main">
-                <a:solidFill>
-                  <a:schemeClr val="accent1"/>
-                </a:solidFill>
-              </a14:hiddenFill>
-            </a:ext>
-            <a:ext uri="{91240B29-F687-4F45-9708-019B960494DF}">
-              <a14:hiddenLine xmlns:a14="http://schemas.microsoft.com/office/drawing/2010/main" w="9525">
-                <a:solidFill>
-                  <a:schemeClr val="tx1"/>
-                </a:solidFill>
-                <a:miter lim="800000"/>
-                <a:headEnd/>
-                <a:tailEnd/>
-              </a14:hiddenLine>
-            </a:ext>
-            <a:ext uri="{AF507438-7753-43E0-B8FC-AC1667EBCBE1}">
-              <a14:hiddenEffects xmlns:a14="http://schemas.microsoft.com/office/drawing/2010/main">
-                <a:effectLst>
-                  <a:outerShdw dist="35921" dir="2700000" algn="ctr" rotWithShape="0">
-                    <a:schemeClr val="bg2"/>
-                  </a:outerShdw>
-                </a:effectLst>
-              </a14:hiddenEffects>
-            </a:ext>
-          </a:extLst>
-        </p:spPr>
-      </p:pic>
-    </p:spTree>
-    <p:extLst>
-      <p:ext uri="{BB962C8B-B14F-4D97-AF65-F5344CB8AC3E}">
-        <p14:creationId xmlns:p14="http://schemas.microsoft.com/office/powerpoint/2010/main" val="4131341984"/>
-      </p:ext>
-    </p:extLst>
-  </p:cSld>
-  <p:clrMapOvr>
-    <a:masterClrMapping/>
-  </p:clrMapOvr>
-</p:sld>
-</file>
-
-<file path=ppt/slides/slide4.xml><?xml version="1.0" encoding="utf-8"?>
-<p:sld xmlns:a="http://schemas.openxmlformats.org/drawingml/2006/main" xmlns:r="http://schemas.openxmlformats.org/officeDocument/2006/relationships" xmlns:p="http://schemas.openxmlformats.org/presentationml/2006/main">
-  <p:cSld>
-    <p:spTree>
-      <p:nvGrpSpPr>
-        <p:cNvPr id="1" name=""/>
-        <p:cNvGrpSpPr/>
-        <p:nvPr/>
-      </p:nvGrpSpPr>
-      <p:grpSpPr>
-        <a:xfrm>
-          <a:off x="0" y="0"/>
-          <a:ext cx="0" cy="0"/>
-          <a:chOff x="0" y="0"/>
-          <a:chExt cx="0" cy="0"/>
-        </a:xfrm>
-      </p:grpSpPr>
-      <p:sp>
-        <p:nvSpPr>
-          <p:cNvPr id="2" name="Title 1"/>
-          <p:cNvSpPr>
-            <a:spLocks noGrp="1"/>
-          </p:cNvSpPr>
-          <p:nvPr>
-            <p:ph type="title"/>
-          </p:nvPr>
-        </p:nvSpPr>
-        <p:spPr/>
-        <p:txBody>
-          <a:bodyPr/>
-          <a:lstStyle/>
-          <a:p>
-            <a:r>
-              <a:rPr lang="en-US" dirty="0" smtClean="0"/>
-              <a:t>MVC in </a:t>
-            </a:r>
-            <a:r>
-              <a:rPr lang="en-US" dirty="0" err="1" smtClean="0"/>
-              <a:t>TechShoppers</a:t>
-            </a:r>
-            <a:endParaRPr lang="en-US" dirty="0"/>
-          </a:p>
-        </p:txBody>
-      </p:sp>
-      <p:pic>
-        <p:nvPicPr>
-          <p:cNvPr id="2050" name="Picture 2"/>
-          <p:cNvPicPr>
-            <a:picLocks noGrp="1" noChangeAspect="1" noChangeArrowheads="1"/>
-          </p:cNvPicPr>
-          <p:nvPr>
-            <p:ph idx="1"/>
-          </p:nvPr>
-        </p:nvPicPr>
-        <p:blipFill>
-          <a:blip r:embed="rId2">
-            <a:extLst>
-              <a:ext uri="{28A0092B-C50C-407E-A947-70E740481C1C}">
-                <a14:useLocalDpi xmlns:a14="http://schemas.microsoft.com/office/drawing/2010/main" val="0"/>
-              </a:ext>
-            </a:extLst>
-          </a:blip>
-          <a:srcRect/>
-          <a:stretch>
-            <a:fillRect/>
-          </a:stretch>
-        </p:blipFill>
-        <p:spPr bwMode="auto">
-          <a:xfrm>
-            <a:off x="457200" y="1794164"/>
-            <a:ext cx="8229600" cy="4488872"/>
-          </a:xfrm>
-          <a:prstGeom prst="rect">
-            <a:avLst/>
-          </a:prstGeom>
-          <a:noFill/>
-          <a:ln>
-            <a:noFill/>
-          </a:ln>
-          <a:effectLst/>
-          <a:extLst>
-            <a:ext uri="{909E8E84-426E-40DD-AFC4-6F175D3DCCD1}">
-              <a14:hiddenFill xmlns:a14="http://schemas.microsoft.com/office/drawing/2010/main">
-                <a:solidFill>
-                  <a:schemeClr val="accent1"/>
-                </a:solidFill>
-              </a14:hiddenFill>
-            </a:ext>
-            <a:ext uri="{91240B29-F687-4F45-9708-019B960494DF}">
-              <a14:hiddenLine xmlns:a14="http://schemas.microsoft.com/office/drawing/2010/main" w="9525">
-                <a:solidFill>
-                  <a:schemeClr val="tx1"/>
-                </a:solidFill>
-                <a:miter lim="800000"/>
-                <a:headEnd/>
-                <a:tailEnd/>
-              </a14:hiddenLine>
-            </a:ext>
-            <a:ext uri="{AF507438-7753-43E0-B8FC-AC1667EBCBE1}">
-              <a14:hiddenEffects xmlns:a14="http://schemas.microsoft.com/office/drawing/2010/main">
-                <a:effectLst>
-                  <a:outerShdw dist="35921" dir="2700000" algn="ctr" rotWithShape="0">
-                    <a:schemeClr val="bg2"/>
-                  </a:outerShdw>
-                </a:effectLst>
-              </a14:hiddenEffects>
-            </a:ext>
-          </a:extLst>
-        </p:spPr>
-      </p:pic>
-    </p:spTree>
-    <p:extLst>
-      <p:ext uri="{BB962C8B-B14F-4D97-AF65-F5344CB8AC3E}">
-        <p14:creationId xmlns:p14="http://schemas.microsoft.com/office/powerpoint/2010/main" val="1674924528"/>
-      </p:ext>
-    </p:extLst>
-  </p:cSld>
-  <p:clrMapOvr>
-    <a:masterClrMapping/>
-  </p:clrMapOvr>
-</p:sld>
-</file>
-
-<file path=ppt/slides/slide5.xml><?xml version="1.0" encoding="utf-8"?>
-<p:sld xmlns:a="http://schemas.openxmlformats.org/drawingml/2006/main" xmlns:r="http://schemas.openxmlformats.org/officeDocument/2006/relationships" xmlns:p="http://schemas.openxmlformats.org/presentationml/2006/main">
-  <p:cSld>
-    <p:spTree>
-      <p:nvGrpSpPr>
-        <p:cNvPr id="1" name=""/>
-        <p:cNvGrpSpPr/>
-        <p:nvPr/>
-      </p:nvGrpSpPr>
-      <p:grpSpPr>
-        <a:xfrm>
-          <a:off x="0" y="0"/>
-          <a:ext cx="0" cy="0"/>
-          <a:chOff x="0" y="0"/>
-          <a:chExt cx="0" cy="0"/>
-        </a:xfrm>
-      </p:grpSpPr>
-      <p:sp>
-        <p:nvSpPr>
-          <p:cNvPr id="2" name="Title 1"/>
-          <p:cNvSpPr>
-            <a:spLocks noGrp="1"/>
-          </p:cNvSpPr>
-          <p:nvPr>
-            <p:ph type="title"/>
-          </p:nvPr>
-        </p:nvSpPr>
-        <p:spPr/>
-        <p:txBody>
-          <a:bodyPr/>
-          <a:lstStyle/>
-          <a:p>
-            <a:r>
-              <a:rPr lang="en-US" dirty="0" smtClean="0"/>
-              <a:t>Motivation for Choosing MVC</a:t>
-            </a:r>
-            <a:endParaRPr lang="en-US" dirty="0"/>
-          </a:p>
-        </p:txBody>
-      </p:sp>
-      <p:sp>
-        <p:nvSpPr>
-          <p:cNvPr id="3" name="Content Placeholder 2"/>
-          <p:cNvSpPr>
-            <a:spLocks noGrp="1"/>
-          </p:cNvSpPr>
-          <p:nvPr>
-            <p:ph idx="1"/>
-          </p:nvPr>
-        </p:nvSpPr>
-        <p:spPr/>
-        <p:txBody>
-          <a:bodyPr/>
-          <a:lstStyle/>
-          <a:p>
-            <a:pPr>
-              <a:lnSpc>
-                <a:spcPct val="150000"/>
-              </a:lnSpc>
-            </a:pPr>
-            <a:r>
-              <a:rPr lang="en-US" dirty="0"/>
-              <a:t>Separates application's data layer from presentation </a:t>
-            </a:r>
-            <a:r>
-              <a:rPr lang="en-US" dirty="0" smtClean="0"/>
-              <a:t>layer</a:t>
-            </a:r>
-          </a:p>
-          <a:p>
-            <a:pPr>
-              <a:lnSpc>
-                <a:spcPct val="150000"/>
-              </a:lnSpc>
-            </a:pPr>
-            <a:r>
-              <a:rPr lang="en-US" dirty="0"/>
-              <a:t>Promotes loose coupling between </a:t>
-            </a:r>
-            <a:r>
-              <a:rPr lang="en-US" dirty="0" smtClean="0"/>
-              <a:t>components</a:t>
-            </a:r>
-          </a:p>
-          <a:p>
-            <a:pPr>
-              <a:lnSpc>
-                <a:spcPct val="150000"/>
-              </a:lnSpc>
-            </a:pPr>
-            <a:r>
-              <a:rPr lang="en-US" dirty="0"/>
-              <a:t>Allows easy maintenance and scaling of the </a:t>
-            </a:r>
-            <a:r>
-              <a:rPr lang="en-US" dirty="0" smtClean="0"/>
-              <a:t>application</a:t>
-            </a:r>
-          </a:p>
-          <a:p>
-            <a:pPr>
-              <a:lnSpc>
-                <a:spcPct val="150000"/>
-              </a:lnSpc>
-            </a:pPr>
-            <a:r>
-              <a:rPr lang="en-US" dirty="0"/>
-              <a:t>Supports </a:t>
-            </a:r>
-            <a:r>
-              <a:rPr lang="en-US" b="1" dirty="0"/>
-              <a:t>separation of concerns</a:t>
-            </a:r>
-            <a:r>
-              <a:rPr lang="en-US" dirty="0"/>
-              <a:t> and </a:t>
-            </a:r>
-            <a:r>
-              <a:rPr lang="en-US" b="1" dirty="0"/>
-              <a:t>single responsibility principle</a:t>
-            </a:r>
-          </a:p>
-        </p:txBody>
-      </p:sp>
-    </p:spTree>
-    <p:extLst>
-      <p:ext uri="{BB962C8B-B14F-4D97-AF65-F5344CB8AC3E}">
-        <p14:creationId xmlns:p14="http://schemas.microsoft.com/office/powerpoint/2010/main" val="4178865089"/>
-      </p:ext>
-    </p:extLst>
-  </p:cSld>
-  <p:clrMapOvr>
-    <a:masterClrMapping/>
-  </p:clrMapOvr>
-</p:sld>
-</file>
-
-<file path=ppt/slides/slide6.xml><?xml version="1.0" encoding="utf-8"?>
-<p:sld xmlns:a="http://schemas.openxmlformats.org/drawingml/2006/main" xmlns:r="http://schemas.openxmlformats.org/officeDocument/2006/relationships" xmlns:p="http://schemas.openxmlformats.org/presentationml/2006/main">
-  <p:cSld>
-    <p:spTree>
-      <p:nvGrpSpPr>
-        <p:cNvPr id="1" name=""/>
-        <p:cNvGrpSpPr/>
-        <p:nvPr/>
-      </p:nvGrpSpPr>
-      <p:grpSpPr>
-        <a:xfrm>
-          <a:off x="0" y="0"/>
-          <a:ext cx="0" cy="0"/>
-          <a:chOff x="0" y="0"/>
-          <a:chExt cx="0" cy="0"/>
-        </a:xfrm>
-      </p:grpSpPr>
-      <p:sp>
-        <p:nvSpPr>
-          <p:cNvPr id="2" name="Title 1"/>
-          <p:cNvSpPr>
-            <a:spLocks noGrp="1"/>
-          </p:cNvSpPr>
-          <p:nvPr>
-            <p:ph type="title"/>
-          </p:nvPr>
-        </p:nvSpPr>
-        <p:spPr/>
-        <p:txBody>
-          <a:bodyPr/>
-          <a:lstStyle/>
-          <a:p>
-            <a:r>
-              <a:rPr lang="en-US" dirty="0" smtClean="0"/>
-              <a:t>Model Details</a:t>
-            </a:r>
-            <a:endParaRPr lang="en-US" dirty="0"/>
-          </a:p>
-        </p:txBody>
-      </p:sp>
-      <p:sp>
-        <p:nvSpPr>
-          <p:cNvPr id="3" name="Content Placeholder 2"/>
-          <p:cNvSpPr>
-            <a:spLocks noGrp="1"/>
-          </p:cNvSpPr>
-          <p:nvPr>
-            <p:ph idx="1"/>
-          </p:nvPr>
-        </p:nvSpPr>
-        <p:spPr/>
-        <p:txBody>
-          <a:bodyPr/>
-          <a:lstStyle/>
-          <a:p>
-            <a:pPr>
-              <a:lnSpc>
-                <a:spcPct val="150000"/>
-              </a:lnSpc>
-            </a:pPr>
-            <a:r>
-              <a:rPr lang="en-US" dirty="0"/>
-              <a:t>Database </a:t>
-            </a:r>
-            <a:r>
-              <a:rPr lang="en-US" dirty="0" smtClean="0"/>
-              <a:t>models and Schema </a:t>
-            </a:r>
-            <a:r>
-              <a:rPr lang="en-US" dirty="0"/>
-              <a:t>for products, prices, websites etc</a:t>
-            </a:r>
-            <a:r>
-              <a:rPr lang="en-US" dirty="0" smtClean="0"/>
-              <a:t>.</a:t>
-            </a:r>
-          </a:p>
-          <a:p>
-            <a:pPr>
-              <a:lnSpc>
-                <a:spcPct val="150000"/>
-              </a:lnSpc>
-            </a:pPr>
-            <a:r>
-              <a:rPr lang="en-US" dirty="0"/>
-              <a:t>Services to fetch data from retailers' </a:t>
-            </a:r>
-            <a:r>
-              <a:rPr lang="en-US" dirty="0" smtClean="0"/>
-              <a:t>APIs</a:t>
-            </a:r>
-          </a:p>
-          <a:p>
-            <a:pPr>
-              <a:lnSpc>
-                <a:spcPct val="150000"/>
-              </a:lnSpc>
-            </a:pPr>
-            <a:r>
-              <a:rPr lang="en-US" dirty="0"/>
-              <a:t>Contains business logic to retrieve and manipulate data</a:t>
-            </a:r>
-            <a:endParaRPr lang="en-US" dirty="0" smtClean="0"/>
-          </a:p>
-          <a:p>
-            <a:pPr>
-              <a:lnSpc>
-                <a:spcPct val="150000"/>
-              </a:lnSpc>
-            </a:pPr>
-            <a:r>
-              <a:rPr lang="en-US" b="1" dirty="0" smtClean="0"/>
-              <a:t>Database:</a:t>
-            </a:r>
-            <a:r>
-              <a:rPr lang="en-US" dirty="0" smtClean="0"/>
-              <a:t> </a:t>
-            </a:r>
-            <a:r>
-              <a:rPr lang="en-US" dirty="0" err="1" smtClean="0">
-                <a:solidFill>
-                  <a:srgbClr val="FF0000"/>
-                </a:solidFill>
-              </a:rPr>
-              <a:t>MongoDB</a:t>
-            </a:r>
-            <a:r>
-              <a:rPr lang="en-US" dirty="0" smtClean="0">
-                <a:solidFill>
-                  <a:srgbClr val="FF0000"/>
-                </a:solidFill>
-              </a:rPr>
-              <a:t> with Mongoose</a:t>
-            </a:r>
-            <a:endParaRPr lang="en-US" dirty="0">
-              <a:solidFill>
-                <a:srgbClr val="FF0000"/>
-              </a:solidFill>
-            </a:endParaRPr>
-          </a:p>
-        </p:txBody>
-      </p:sp>
-    </p:spTree>
-    <p:extLst>
-      <p:ext uri="{BB962C8B-B14F-4D97-AF65-F5344CB8AC3E}">
-        <p14:creationId xmlns:p14="http://schemas.microsoft.com/office/powerpoint/2010/main" val="1120551015"/>
-      </p:ext>
-    </p:extLst>
-  </p:cSld>
-  <p:clrMapOvr>
-    <a:masterClrMapping/>
-  </p:clrMapOvr>
-</p:sld>
-</file>
-
-<file path=ppt/slides/slide7.xml><?xml version="1.0" encoding="utf-8"?>
-<p:sld xmlns:a="http://schemas.openxmlformats.org/drawingml/2006/main" xmlns:r="http://schemas.openxmlformats.org/officeDocument/2006/relationships" xmlns:p="http://schemas.openxmlformats.org/presentationml/2006/main">
-  <p:cSld>
-    <p:spTree>
-      <p:nvGrpSpPr>
-        <p:cNvPr id="1" name=""/>
-        <p:cNvGrpSpPr/>
-        <p:nvPr/>
-      </p:nvGrpSpPr>
-      <p:grpSpPr>
-        <a:xfrm>
-          <a:off x="0" y="0"/>
-          <a:ext cx="0" cy="0"/>
-          <a:chOff x="0" y="0"/>
-          <a:chExt cx="0" cy="0"/>
-        </a:xfrm>
-      </p:grpSpPr>
-      <p:sp>
-        <p:nvSpPr>
-          <p:cNvPr id="2" name="Title 1"/>
-          <p:cNvSpPr>
-            <a:spLocks noGrp="1"/>
-          </p:cNvSpPr>
-          <p:nvPr>
-            <p:ph type="title"/>
-          </p:nvPr>
-        </p:nvSpPr>
-        <p:spPr/>
-        <p:txBody>
-          <a:bodyPr/>
-          <a:lstStyle/>
-          <a:p>
-            <a:r>
-              <a:rPr lang="en-US" dirty="0" smtClean="0"/>
-              <a:t>View Details</a:t>
-            </a:r>
-            <a:endParaRPr lang="en-US" dirty="0"/>
-          </a:p>
-        </p:txBody>
-      </p:sp>
-      <p:sp>
-        <p:nvSpPr>
-          <p:cNvPr id="3" name="Content Placeholder 2"/>
-          <p:cNvSpPr>
-            <a:spLocks noGrp="1"/>
-          </p:cNvSpPr>
-          <p:nvPr>
-            <p:ph idx="1"/>
-          </p:nvPr>
-        </p:nvSpPr>
-        <p:spPr/>
-        <p:txBody>
-          <a:bodyPr>
-            <a:normAutofit/>
-          </a:bodyPr>
-          <a:lstStyle/>
-          <a:p>
-            <a:pPr>
-              <a:lnSpc>
-                <a:spcPct val="150000"/>
-              </a:lnSpc>
-            </a:pPr>
-            <a:r>
-              <a:rPr lang="fr-FR" dirty="0"/>
-              <a:t>User interface components - HTML, CSS, </a:t>
-            </a:r>
-            <a:r>
-              <a:rPr lang="fr-FR" dirty="0" smtClean="0"/>
-              <a:t>JavaScript</a:t>
-            </a:r>
-          </a:p>
-          <a:p>
-            <a:pPr>
-              <a:lnSpc>
-                <a:spcPct val="150000"/>
-              </a:lnSpc>
-            </a:pPr>
-            <a:r>
-              <a:rPr lang="en-US" dirty="0"/>
-              <a:t>Displays model data to the </a:t>
-            </a:r>
-            <a:r>
-              <a:rPr lang="en-US" dirty="0" smtClean="0"/>
-              <a:t>user.</a:t>
-            </a:r>
-          </a:p>
-          <a:p>
-            <a:pPr>
-              <a:lnSpc>
-                <a:spcPct val="150000"/>
-              </a:lnSpc>
-            </a:pPr>
-            <a:r>
-              <a:rPr lang="en-US" dirty="0"/>
-              <a:t>Gets data from and passes data to the </a:t>
-            </a:r>
-            <a:r>
-              <a:rPr lang="en-US" dirty="0" smtClean="0"/>
-              <a:t>controller.</a:t>
-            </a:r>
-          </a:p>
-          <a:p>
-            <a:pPr>
-              <a:lnSpc>
-                <a:spcPct val="150000"/>
-              </a:lnSpc>
-            </a:pPr>
-            <a:r>
-              <a:rPr lang="en-US" b="1" dirty="0" smtClean="0"/>
-              <a:t>Framework:</a:t>
-            </a:r>
-            <a:r>
-              <a:rPr lang="en-US" dirty="0" smtClean="0"/>
-              <a:t> </a:t>
-            </a:r>
-            <a:r>
-              <a:rPr lang="en-US" dirty="0" smtClean="0">
-                <a:solidFill>
-                  <a:srgbClr val="FF0000"/>
-                </a:solidFill>
-              </a:rPr>
-              <a:t>React</a:t>
-            </a:r>
-          </a:p>
-          <a:p>
-            <a:pPr>
-              <a:lnSpc>
-                <a:spcPct val="150000"/>
-              </a:lnSpc>
-            </a:pPr>
-            <a:r>
-              <a:rPr lang="en-US" dirty="0"/>
-              <a:t>A</a:t>
-            </a:r>
-            <a:r>
-              <a:rPr lang="en-US" dirty="0" smtClean="0"/>
-              <a:t>spects </a:t>
-            </a:r>
-            <a:r>
-              <a:rPr lang="en-US" dirty="0"/>
-              <a:t>of the Controller can also be </a:t>
-            </a:r>
-            <a:r>
-              <a:rPr lang="en-US" dirty="0" smtClean="0"/>
-              <a:t>implemented by using React hooks like </a:t>
-            </a:r>
-            <a:r>
-              <a:rPr lang="en-US" b="1" dirty="0" err="1" smtClean="0"/>
-              <a:t>useState</a:t>
-            </a:r>
-            <a:r>
-              <a:rPr lang="en-US" dirty="0"/>
-              <a:t>, </a:t>
-            </a:r>
-            <a:r>
-              <a:rPr lang="en-US" b="1" dirty="0" err="1"/>
-              <a:t>useEffect</a:t>
-            </a:r>
-            <a:r>
-              <a:rPr lang="en-US" dirty="0"/>
-              <a:t>, and </a:t>
-            </a:r>
-            <a:r>
-              <a:rPr lang="en-US" b="1" dirty="0" err="1"/>
-              <a:t>useContext</a:t>
-            </a:r>
-            <a:r>
-              <a:rPr lang="en-US" dirty="0"/>
-              <a:t> to </a:t>
-            </a:r>
-            <a:r>
-              <a:rPr lang="en-US" dirty="0" smtClean="0">
-                <a:solidFill>
-                  <a:srgbClr val="FF0000"/>
-                </a:solidFill>
-              </a:rPr>
-              <a:t>handle user interactions</a:t>
-            </a:r>
-            <a:r>
-              <a:rPr lang="en-US" dirty="0" smtClean="0"/>
-              <a:t>, </a:t>
-            </a:r>
-            <a:r>
-              <a:rPr lang="en-US" dirty="0" smtClean="0">
-                <a:solidFill>
-                  <a:srgbClr val="FF0000"/>
-                </a:solidFill>
-              </a:rPr>
-              <a:t>send </a:t>
-            </a:r>
-            <a:r>
-              <a:rPr lang="en-US" dirty="0">
-                <a:solidFill>
-                  <a:srgbClr val="FF0000"/>
-                </a:solidFill>
-              </a:rPr>
-              <a:t>requests to backend </a:t>
-            </a:r>
-            <a:r>
-              <a:rPr lang="en-US" dirty="0" smtClean="0">
-                <a:solidFill>
-                  <a:srgbClr val="FF0000"/>
-                </a:solidFill>
-              </a:rPr>
-              <a:t>controllers</a:t>
-            </a:r>
-            <a:r>
-              <a:rPr lang="en-US" dirty="0" smtClean="0"/>
-              <a:t>, and </a:t>
-            </a:r>
-            <a:r>
-              <a:rPr lang="en-US" dirty="0" smtClean="0">
-                <a:solidFill>
-                  <a:srgbClr val="FF0000"/>
-                </a:solidFill>
-              </a:rPr>
-              <a:t>manage </a:t>
-            </a:r>
-            <a:r>
-              <a:rPr lang="en-US" dirty="0">
-                <a:solidFill>
-                  <a:srgbClr val="FF0000"/>
-                </a:solidFill>
-              </a:rPr>
-              <a:t>the application </a:t>
-            </a:r>
-            <a:r>
-              <a:rPr lang="en-US" dirty="0" smtClean="0">
-                <a:solidFill>
-                  <a:srgbClr val="FF0000"/>
-                </a:solidFill>
-              </a:rPr>
-              <a:t>state</a:t>
-            </a:r>
-            <a:r>
-              <a:rPr lang="en-US" dirty="0" smtClean="0"/>
-              <a:t>.</a:t>
-            </a:r>
-          </a:p>
-        </p:txBody>
-      </p:sp>
-    </p:spTree>
-    <p:extLst>
-      <p:ext uri="{BB962C8B-B14F-4D97-AF65-F5344CB8AC3E}">
-        <p14:creationId xmlns:p14="http://schemas.microsoft.com/office/powerpoint/2010/main" val="635947297"/>
-      </p:ext>
-    </p:extLst>
-  </p:cSld>
-  <p:clrMapOvr>
-    <a:masterClrMapping/>
-  </p:clrMapOvr>
-</p:sld>
-</file>
-
-<file path=ppt/slides/slide8.xml><?xml version="1.0" encoding="utf-8"?>
-<p:sld xmlns:a="http://schemas.openxmlformats.org/drawingml/2006/main" xmlns:r="http://schemas.openxmlformats.org/officeDocument/2006/relationships" xmlns:p="http://schemas.openxmlformats.org/presentationml/2006/main">
-  <p:cSld>
-    <p:spTree>
-      <p:nvGrpSpPr>
-        <p:cNvPr id="1" name=""/>
-        <p:cNvGrpSpPr/>
-        <p:nvPr/>
-      </p:nvGrpSpPr>
-      <p:grpSpPr>
-        <a:xfrm>
-          <a:off x="0" y="0"/>
-          <a:ext cx="0" cy="0"/>
-          <a:chOff x="0" y="0"/>
-          <a:chExt cx="0" cy="0"/>
-        </a:xfrm>
-      </p:grpSpPr>
-      <p:sp>
-        <p:nvSpPr>
-          <p:cNvPr id="2" name="Title 1"/>
-          <p:cNvSpPr>
-            <a:spLocks noGrp="1"/>
-          </p:cNvSpPr>
-          <p:nvPr>
-            <p:ph type="title"/>
-          </p:nvPr>
-        </p:nvSpPr>
-        <p:spPr/>
-        <p:txBody>
-          <a:bodyPr/>
-          <a:lstStyle/>
-          <a:p>
-            <a:r>
-              <a:rPr lang="en-US" dirty="0" smtClean="0"/>
-              <a:t>Controller Details</a:t>
-            </a:r>
-            <a:endParaRPr lang="en-US" dirty="0"/>
-          </a:p>
-        </p:txBody>
-      </p:sp>
-      <p:sp>
-        <p:nvSpPr>
-          <p:cNvPr id="3" name="Content Placeholder 2"/>
-          <p:cNvSpPr>
-            <a:spLocks noGrp="1"/>
-          </p:cNvSpPr>
-          <p:nvPr>
-            <p:ph idx="1"/>
-          </p:nvPr>
-        </p:nvSpPr>
-        <p:spPr/>
-        <p:txBody>
-          <a:bodyPr>
-            <a:normAutofit fontScale="92500" lnSpcReduction="10000"/>
-          </a:bodyPr>
-          <a:lstStyle/>
-          <a:p>
-            <a:pPr>
-              <a:lnSpc>
-                <a:spcPct val="150000"/>
-              </a:lnSpc>
-            </a:pPr>
-            <a:r>
-              <a:rPr lang="en-US" dirty="0"/>
-              <a:t>Mediates between model and </a:t>
-            </a:r>
-            <a:r>
-              <a:rPr lang="en-US" dirty="0" smtClean="0"/>
-              <a:t>view</a:t>
-            </a:r>
-          </a:p>
-          <a:p>
-            <a:pPr>
-              <a:lnSpc>
-                <a:spcPct val="150000"/>
-              </a:lnSpc>
-            </a:pPr>
-            <a:r>
-              <a:rPr lang="en-US" dirty="0"/>
-              <a:t>Gets data from model and passes to </a:t>
-            </a:r>
-            <a:r>
-              <a:rPr lang="en-US" dirty="0" smtClean="0"/>
-              <a:t>view and vice versa</a:t>
-            </a:r>
-          </a:p>
-          <a:p>
-            <a:pPr>
-              <a:lnSpc>
-                <a:spcPct val="150000"/>
-              </a:lnSpc>
-            </a:pPr>
-            <a:r>
-              <a:rPr lang="en-US" dirty="0"/>
-              <a:t>Updates model data if </a:t>
-            </a:r>
-            <a:r>
-              <a:rPr lang="en-US" dirty="0" smtClean="0"/>
-              <a:t>needed</a:t>
-            </a:r>
-          </a:p>
-          <a:p>
-            <a:pPr>
-              <a:lnSpc>
-                <a:spcPct val="150000"/>
-              </a:lnSpc>
-            </a:pPr>
-            <a:r>
-              <a:rPr lang="en-US" b="1" dirty="0" smtClean="0"/>
-              <a:t>Framework:</a:t>
-            </a:r>
-            <a:r>
-              <a:rPr lang="en-US" dirty="0" smtClean="0"/>
-              <a:t> </a:t>
-            </a:r>
-            <a:r>
-              <a:rPr lang="en-US" dirty="0" smtClean="0">
-                <a:solidFill>
-                  <a:srgbClr val="FF0000"/>
-                </a:solidFill>
-              </a:rPr>
-              <a:t>Express.js</a:t>
-            </a:r>
-          </a:p>
-          <a:p>
-            <a:pPr>
-              <a:lnSpc>
-                <a:spcPct val="150000"/>
-              </a:lnSpc>
-            </a:pPr>
-            <a:r>
-              <a:rPr lang="en-US" dirty="0">
-                <a:solidFill>
-                  <a:srgbClr val="FF0000"/>
-                </a:solidFill>
-              </a:rPr>
-              <a:t>H</a:t>
-            </a:r>
-            <a:r>
-              <a:rPr lang="en-US" dirty="0" smtClean="0">
-                <a:solidFill>
-                  <a:srgbClr val="FF0000"/>
-                </a:solidFill>
-              </a:rPr>
-              <a:t>andle HTTP requests </a:t>
-            </a:r>
-            <a:r>
-              <a:rPr lang="en-US" dirty="0" smtClean="0"/>
-              <a:t>from frontend (</a:t>
-            </a:r>
-            <a:r>
-              <a:rPr lang="en-US" dirty="0" err="1" smtClean="0"/>
-              <a:t>Axios</a:t>
-            </a:r>
-            <a:r>
-              <a:rPr lang="en-US" dirty="0" smtClean="0"/>
-              <a:t> or fetch API)</a:t>
-            </a:r>
-          </a:p>
-          <a:p>
-            <a:pPr>
-              <a:lnSpc>
-                <a:spcPct val="150000"/>
-              </a:lnSpc>
-            </a:pPr>
-            <a:r>
-              <a:rPr lang="en-US" dirty="0" smtClean="0"/>
-              <a:t>Use </a:t>
-            </a:r>
-            <a:r>
-              <a:rPr lang="en-US" dirty="0"/>
-              <a:t>Express.js to define </a:t>
-            </a:r>
-            <a:r>
-              <a:rPr lang="en-US" b="1" dirty="0"/>
-              <a:t>route handlers (controllers)</a:t>
-            </a:r>
-            <a:r>
-              <a:rPr lang="en-US" dirty="0"/>
-              <a:t> that interact with the Mongoose model to fetch or modify data and then </a:t>
-            </a:r>
-            <a:r>
-              <a:rPr lang="en-US" dirty="0">
-                <a:solidFill>
-                  <a:srgbClr val="FF0000"/>
-                </a:solidFill>
-              </a:rPr>
-              <a:t>send </a:t>
-            </a:r>
-            <a:r>
-              <a:rPr lang="en-US" dirty="0" smtClean="0">
-                <a:solidFill>
-                  <a:srgbClr val="FF0000"/>
-                </a:solidFill>
-              </a:rPr>
-              <a:t>responses/views</a:t>
-            </a:r>
-            <a:r>
-              <a:rPr lang="en-US" dirty="0">
-                <a:solidFill>
-                  <a:srgbClr val="FF0000"/>
-                </a:solidFill>
-              </a:rPr>
-              <a:t> </a:t>
-            </a:r>
-            <a:r>
-              <a:rPr lang="en-US" dirty="0" smtClean="0">
-                <a:solidFill>
-                  <a:srgbClr val="FF0000"/>
-                </a:solidFill>
-              </a:rPr>
-              <a:t>(</a:t>
-            </a:r>
-            <a:r>
-              <a:rPr lang="en-US" dirty="0">
-                <a:solidFill>
-                  <a:srgbClr val="FF0000"/>
-                </a:solidFill>
-              </a:rPr>
-              <a:t>JSON data, status codes</a:t>
-            </a:r>
-            <a:r>
-              <a:rPr lang="en-US" dirty="0" smtClean="0">
-                <a:solidFill>
-                  <a:srgbClr val="FF0000"/>
-                </a:solidFill>
-              </a:rPr>
-              <a:t>)</a:t>
-            </a:r>
-            <a:r>
-              <a:rPr lang="en-US" dirty="0" smtClean="0"/>
-              <a:t> </a:t>
-            </a:r>
-            <a:r>
-              <a:rPr lang="en-US" dirty="0"/>
-              <a:t>back to the </a:t>
-            </a:r>
-            <a:r>
-              <a:rPr lang="en-US" dirty="0" smtClean="0"/>
-              <a:t>client</a:t>
-            </a:r>
-            <a:r>
-              <a:rPr lang="en-US" dirty="0"/>
-              <a:t>.</a:t>
-            </a:r>
-            <a:endParaRPr lang="en-US" dirty="0" smtClean="0"/>
-          </a:p>
-        </p:txBody>
-      </p:sp>
-    </p:spTree>
-    <p:extLst>
-      <p:ext uri="{BB962C8B-B14F-4D97-AF65-F5344CB8AC3E}">
-        <p14:creationId xmlns:p14="http://schemas.microsoft.com/office/powerpoint/2010/main" val="2932344949"/>
-      </p:ext>
-    </p:extLst>
-  </p:cSld>
-  <p:clrMapOvr>
-    <a:masterClrMapping/>
-  </p:clrMapOvr>
-</p:sld>
-</file>
-
-<file path=ppt/slides/slide9.xml><?xml version="1.0" encoding="utf-8"?>
-<p:sld xmlns:a="http://schemas.openxmlformats.org/drawingml/2006/main" xmlns:r="http://schemas.openxmlformats.org/officeDocument/2006/relationships" xmlns:p="http://schemas.openxmlformats.org/presentationml/2006/main">
-  <p:cSld>
-    <p:spTree>
-      <p:nvGrpSpPr>
-        <p:cNvPr id="1" name=""/>
-        <p:cNvGrpSpPr/>
-        <p:nvPr/>
-      </p:nvGrpSpPr>
-      <p:grpSpPr>
-        <a:xfrm>
-          <a:off x="0" y="0"/>
-          <a:ext cx="0" cy="0"/>
-          <a:chOff x="0" y="0"/>
-          <a:chExt cx="0" cy="0"/>
-        </a:xfrm>
-      </p:grpSpPr>
-      <p:pic>
-        <p:nvPicPr>
-          <p:cNvPr id="4" name="Picture 2" descr="C:\Users\HP\AppData\Local\Microsoft\Windows\INetCache\IE\4FA5Y4LK\thank-you-1428147_960_720[1].png"/>
-          <p:cNvPicPr>
-            <a:picLocks noGrp="1" noChangeAspect="1" noChangeArrowheads="1"/>
-          </p:cNvPicPr>
-          <p:nvPr>
-            <p:ph idx="1"/>
-          </p:nvPr>
-        </p:nvPicPr>
-        <p:blipFill>
-          <a:blip r:embed="rId2">
-            <a:extLst>
-              <a:ext uri="{28A0092B-C50C-407E-A947-70E740481C1C}">
-                <a14:useLocalDpi xmlns:a14="http://schemas.microsoft.com/office/drawing/2010/main" val="0"/>
-              </a:ext>
-            </a:extLst>
-          </a:blip>
-          <a:srcRect/>
-          <a:stretch>
-            <a:fillRect/>
-          </a:stretch>
-        </p:blipFill>
-        <p:spPr bwMode="auto">
-          <a:xfrm>
-            <a:off x="2209800" y="1066800"/>
-            <a:ext cx="4707466" cy="4876800"/>
-          </a:xfrm>
-          <a:prstGeom prst="rect">
-            <a:avLst/>
-          </a:prstGeom>
-          <a:noFill/>
-          <a:extLst>
-            <a:ext uri="{909E8E84-426E-40DD-AFC4-6F175D3DCCD1}">
-              <a14:hiddenFill xmlns:a14="http://schemas.microsoft.com/office/drawing/2010/main">
-                <a:solidFill>
-                  <a:srgbClr val="FFFFFF"/>
-                </a:solidFill>
-              </a14:hiddenFill>
-            </a:ext>
-          </a:extLst>
-        </p:spPr>
-      </p:pic>
-    </p:spTree>
-    <p:extLst>
-      <p:ext uri="{BB962C8B-B14F-4D97-AF65-F5344CB8AC3E}">
-        <p14:creationId xmlns:p14="http://schemas.microsoft.com/office/powerpoint/2010/main" val="1122042934"/>
       </p:ext>
     </p:extLst>
   </p:cSld>

</xml_diff>

<commit_message>
[DOCS] System Arch, changed control flow diagram
</commit_message>
<xml_diff>
--- a/system-design/TechShoppers - System Architecture.pptx
+++ b/system-design/TechShoppers - System Architecture.pptx
@@ -13,7 +13,6 @@
     <p:sldId id="263" r:id="rId7"/>
     <p:sldId id="264" r:id="rId8"/>
     <p:sldId id="265" r:id="rId9"/>
-    <p:sldId id="258" r:id="rId10"/>
   </p:sldIdLst>
   <p:sldSz cx="9144000" cy="6858000" type="screen4x3"/>
   <p:notesSz cx="6858000" cy="9144000"/>
@@ -3789,18 +3788,724 @@
           </a:p>
         </p:txBody>
       </p:sp>
+      <p:cxnSp>
+        <p:nvCxnSpPr>
+          <p:cNvPr id="33" name="Google Shape;887;p34"/>
+          <p:cNvCxnSpPr/>
+          <p:nvPr/>
+        </p:nvCxnSpPr>
+        <p:spPr>
+          <a:xfrm flipH="1">
+            <a:off x="3494268" y="1728099"/>
+            <a:ext cx="8250" cy="4156254"/>
+          </a:xfrm>
+          <a:prstGeom prst="straightConnector1">
+            <a:avLst/>
+          </a:prstGeom>
+          <a:noFill/>
+          <a:ln w="19050" cap="flat" cmpd="sng">
+            <a:solidFill>
+              <a:schemeClr val="tx1"/>
+            </a:solidFill>
+            <a:prstDash val="dash"/>
+            <a:round/>
+            <a:headEnd type="none" w="med" len="med"/>
+            <a:tailEnd type="none" w="med" len="med"/>
+          </a:ln>
+        </p:spPr>
+      </p:cxnSp>
+      <p:cxnSp>
+        <p:nvCxnSpPr>
+          <p:cNvPr id="34" name="Google Shape;888;p34"/>
+          <p:cNvCxnSpPr/>
+          <p:nvPr/>
+        </p:nvCxnSpPr>
+        <p:spPr>
+          <a:xfrm>
+            <a:off x="6436332" y="1728099"/>
+            <a:ext cx="7500" cy="4156254"/>
+          </a:xfrm>
+          <a:prstGeom prst="straightConnector1">
+            <a:avLst/>
+          </a:prstGeom>
+          <a:noFill/>
+          <a:ln w="19050" cap="flat" cmpd="sng">
+            <a:solidFill>
+              <a:schemeClr val="tx1"/>
+            </a:solidFill>
+            <a:prstDash val="dash"/>
+            <a:round/>
+            <a:headEnd type="none" w="med" len="med"/>
+            <a:tailEnd type="none" w="med" len="med"/>
+          </a:ln>
+        </p:spPr>
+      </p:cxnSp>
+      <p:sp>
+        <p:nvSpPr>
+          <p:cNvPr id="35" name="Google Shape;892;p34"/>
+          <p:cNvSpPr txBox="1"/>
+          <p:nvPr/>
+        </p:nvSpPr>
+        <p:spPr>
+          <a:xfrm>
+            <a:off x="69081" y="4688735"/>
+            <a:ext cx="1555800" cy="738633"/>
+          </a:xfrm>
+          <a:prstGeom prst="rect">
+            <a:avLst/>
+          </a:prstGeom>
+          <a:noFill/>
+          <a:ln>
+            <a:noFill/>
+          </a:ln>
+        </p:spPr>
+        <p:txBody>
+          <a:bodyPr spcFirstLastPara="1" wrap="square" lIns="91425" tIns="91425" rIns="91425" bIns="91425" anchor="t" anchorCtr="0">
+            <a:spAutoFit/>
+          </a:bodyPr>
+          <a:lstStyle/>
+          <a:p>
+            <a:pPr marL="0" lvl="0" indent="0" algn="ctr" rtl="0">
+              <a:spcBef>
+                <a:spcPts val="0"/>
+              </a:spcBef>
+              <a:spcAft>
+                <a:spcPts val="0"/>
+              </a:spcAft>
+              <a:buNone/>
+            </a:pPr>
+            <a:r>
+              <a:rPr lang="en" dirty="0">
+                <a:ln>
+                  <a:solidFill>
+                    <a:schemeClr val="tx1"/>
+                  </a:solidFill>
+                </a:ln>
+                <a:latin typeface="Roboto"/>
+                <a:ea typeface="Roboto"/>
+                <a:cs typeface="Roboto"/>
+                <a:sym typeface="Roboto"/>
+              </a:rPr>
+              <a:t>View Request</a:t>
+            </a:r>
+            <a:endParaRPr dirty="0">
+              <a:ln>
+                <a:solidFill>
+                  <a:schemeClr val="tx1"/>
+                </a:solidFill>
+              </a:ln>
+              <a:latin typeface="Roboto"/>
+              <a:ea typeface="Roboto"/>
+              <a:cs typeface="Roboto"/>
+              <a:sym typeface="Roboto"/>
+            </a:endParaRPr>
+          </a:p>
+        </p:txBody>
+      </p:sp>
       <p:pic>
         <p:nvPicPr>
-          <p:cNvPr id="2050" name="Picture 2"/>
-          <p:cNvPicPr>
-            <a:picLocks noGrp="1" noChangeAspect="1" noChangeArrowheads="1"/>
-          </p:cNvPicPr>
-          <p:nvPr>
-            <p:ph idx="1"/>
-          </p:nvPr>
+          <p:cNvPr id="36" name="Google Shape;891;p34"/>
+          <p:cNvPicPr preferRelativeResize="0"/>
+          <p:nvPr/>
         </p:nvPicPr>
         <p:blipFill>
           <a:blip r:embed="rId2">
+            <a:alphaModFix/>
+            <a:biLevel thresh="75000"/>
+          </a:blip>
+          <a:stretch>
+            <a:fillRect/>
+          </a:stretch>
+        </p:blipFill>
+        <p:spPr>
+          <a:xfrm>
+            <a:off x="1560458" y="4485352"/>
+            <a:ext cx="572700" cy="572700"/>
+          </a:xfrm>
+          <a:prstGeom prst="rect">
+            <a:avLst/>
+          </a:prstGeom>
+          <a:noFill/>
+          <a:ln>
+            <a:noFill/>
+          </a:ln>
+        </p:spPr>
+      </p:pic>
+      <p:sp>
+        <p:nvSpPr>
+          <p:cNvPr id="37" name="Google Shape;896;p34"/>
+          <p:cNvSpPr txBox="1"/>
+          <p:nvPr/>
+        </p:nvSpPr>
+        <p:spPr>
+          <a:xfrm>
+            <a:off x="1262316" y="2642835"/>
+            <a:ext cx="1685100" cy="461635"/>
+          </a:xfrm>
+          <a:prstGeom prst="rect">
+            <a:avLst/>
+          </a:prstGeom>
+          <a:noFill/>
+          <a:ln>
+            <a:noFill/>
+          </a:ln>
+        </p:spPr>
+        <p:txBody>
+          <a:bodyPr spcFirstLastPara="1" wrap="square" lIns="91425" tIns="91425" rIns="91425" bIns="91425" anchor="t" anchorCtr="0">
+            <a:spAutoFit/>
+          </a:bodyPr>
+          <a:lstStyle/>
+          <a:p>
+            <a:pPr marL="0" lvl="0" indent="0" algn="ctr" rtl="0">
+              <a:spcBef>
+                <a:spcPts val="0"/>
+              </a:spcBef>
+              <a:spcAft>
+                <a:spcPts val="0"/>
+              </a:spcAft>
+              <a:buNone/>
+            </a:pPr>
+            <a:r>
+              <a:rPr lang="en" dirty="0">
+                <a:ln>
+                  <a:solidFill>
+                    <a:schemeClr val="tx1"/>
+                  </a:solidFill>
+                </a:ln>
+                <a:latin typeface="Roboto"/>
+                <a:ea typeface="Roboto"/>
+                <a:cs typeface="Roboto"/>
+                <a:sym typeface="Roboto"/>
+              </a:rPr>
+              <a:t>Update View</a:t>
+            </a:r>
+            <a:endParaRPr dirty="0">
+              <a:ln>
+                <a:solidFill>
+                  <a:schemeClr val="tx1"/>
+                </a:solidFill>
+              </a:ln>
+              <a:latin typeface="Roboto"/>
+              <a:ea typeface="Roboto"/>
+              <a:cs typeface="Roboto"/>
+              <a:sym typeface="Roboto"/>
+            </a:endParaRPr>
+          </a:p>
+        </p:txBody>
+      </p:sp>
+      <p:sp>
+        <p:nvSpPr>
+          <p:cNvPr id="38" name="Google Shape;897;p34"/>
+          <p:cNvSpPr txBox="1">
+            <a:spLocks/>
+          </p:cNvSpPr>
+          <p:nvPr/>
+        </p:nvSpPr>
+        <p:spPr>
+          <a:xfrm>
+            <a:off x="818907" y="5503353"/>
+            <a:ext cx="1685100" cy="572700"/>
+          </a:xfrm>
+          <a:prstGeom prst="rect">
+            <a:avLst/>
+          </a:prstGeom>
+          <a:ln>
+            <a:noFill/>
+          </a:ln>
+        </p:spPr>
+        <p:txBody>
+          <a:bodyPr spcFirstLastPara="1" vert="horz" wrap="square" lIns="91425" tIns="91425" rIns="91425" bIns="91425" rtlCol="0" anchor="t" anchorCtr="0">
+            <a:noAutofit/>
+          </a:bodyPr>
+          <a:lstStyle>
+            <a:lvl1pPr algn="l" defTabSz="914400" rtl="0" eaLnBrk="1" latinLnBrk="0" hangingPunct="1">
+              <a:spcBef>
+                <a:spcPct val="0"/>
+              </a:spcBef>
+              <a:buNone/>
+              <a:defRPr sz="4000" kern="1200" spc="-100" baseline="0">
+                <a:solidFill>
+                  <a:schemeClr val="tx2"/>
+                </a:solidFill>
+                <a:latin typeface="+mj-lt"/>
+                <a:ea typeface="+mj-ea"/>
+                <a:cs typeface="+mj-cs"/>
+              </a:defRPr>
+            </a:lvl1pPr>
+          </a:lstStyle>
+          <a:p>
+            <a:pPr algn="ctr">
+              <a:spcBef>
+                <a:spcPts val="0"/>
+              </a:spcBef>
+            </a:pPr>
+            <a:r>
+              <a:rPr lang="en-US" sz="2800" dirty="0" smtClean="0">
+                <a:ln>
+                  <a:solidFill>
+                    <a:schemeClr val="tx1"/>
+                  </a:solidFill>
+                </a:ln>
+                <a:solidFill>
+                  <a:srgbClr val="FF0000"/>
+                </a:solidFill>
+              </a:rPr>
+              <a:t>View</a:t>
+            </a:r>
+            <a:endParaRPr lang="en-US" dirty="0">
+              <a:ln>
+                <a:solidFill>
+                  <a:schemeClr val="tx1"/>
+                </a:solidFill>
+              </a:ln>
+              <a:solidFill>
+                <a:srgbClr val="FF0000"/>
+              </a:solidFill>
+            </a:endParaRPr>
+          </a:p>
+        </p:txBody>
+      </p:sp>
+      <p:sp>
+        <p:nvSpPr>
+          <p:cNvPr id="39" name="Google Shape;898;p34"/>
+          <p:cNvSpPr txBox="1">
+            <a:spLocks/>
+          </p:cNvSpPr>
+          <p:nvPr/>
+        </p:nvSpPr>
+        <p:spPr>
+          <a:xfrm>
+            <a:off x="4161027" y="5495891"/>
+            <a:ext cx="1685100" cy="572700"/>
+          </a:xfrm>
+          <a:prstGeom prst="rect">
+            <a:avLst/>
+          </a:prstGeom>
+          <a:ln>
+            <a:noFill/>
+          </a:ln>
+        </p:spPr>
+        <p:txBody>
+          <a:bodyPr spcFirstLastPara="1" vert="horz" wrap="square" lIns="91425" tIns="91425" rIns="91425" bIns="91425" rtlCol="0" anchor="t" anchorCtr="0">
+            <a:noAutofit/>
+          </a:bodyPr>
+          <a:lstStyle>
+            <a:lvl1pPr algn="l" defTabSz="914400" rtl="0" eaLnBrk="1" latinLnBrk="0" hangingPunct="1">
+              <a:spcBef>
+                <a:spcPct val="0"/>
+              </a:spcBef>
+              <a:buNone/>
+              <a:defRPr sz="4000" kern="1200" spc="-100" baseline="0">
+                <a:solidFill>
+                  <a:schemeClr val="tx2"/>
+                </a:solidFill>
+                <a:latin typeface="+mj-lt"/>
+                <a:ea typeface="+mj-ea"/>
+                <a:cs typeface="+mj-cs"/>
+              </a:defRPr>
+            </a:lvl1pPr>
+          </a:lstStyle>
+          <a:p>
+            <a:pPr algn="ctr">
+              <a:spcBef>
+                <a:spcPts val="0"/>
+              </a:spcBef>
+            </a:pPr>
+            <a:r>
+              <a:rPr lang="en-US" sz="2800" dirty="0" smtClean="0">
+                <a:ln>
+                  <a:solidFill>
+                    <a:schemeClr val="tx1"/>
+                  </a:solidFill>
+                </a:ln>
+                <a:solidFill>
+                  <a:srgbClr val="FF0000"/>
+                </a:solidFill>
+              </a:rPr>
+              <a:t>Controller</a:t>
+            </a:r>
+            <a:endParaRPr lang="en-US" dirty="0">
+              <a:ln>
+                <a:solidFill>
+                  <a:schemeClr val="tx1"/>
+                </a:solidFill>
+              </a:ln>
+              <a:solidFill>
+                <a:srgbClr val="FF0000"/>
+              </a:solidFill>
+            </a:endParaRPr>
+          </a:p>
+        </p:txBody>
+      </p:sp>
+      <p:sp>
+        <p:nvSpPr>
+          <p:cNvPr id="40" name="Google Shape;899;p34"/>
+          <p:cNvSpPr txBox="1">
+            <a:spLocks/>
+          </p:cNvSpPr>
+          <p:nvPr/>
+        </p:nvSpPr>
+        <p:spPr>
+          <a:xfrm>
+            <a:off x="6898807" y="5480520"/>
+            <a:ext cx="1685100" cy="572700"/>
+          </a:xfrm>
+          <a:prstGeom prst="rect">
+            <a:avLst/>
+          </a:prstGeom>
+          <a:ln>
+            <a:noFill/>
+          </a:ln>
+        </p:spPr>
+        <p:txBody>
+          <a:bodyPr spcFirstLastPara="1" vert="horz" wrap="square" lIns="91425" tIns="91425" rIns="91425" bIns="91425" rtlCol="0" anchor="t" anchorCtr="0">
+            <a:noAutofit/>
+          </a:bodyPr>
+          <a:lstStyle>
+            <a:lvl1pPr algn="l" defTabSz="914400" rtl="0" eaLnBrk="1" latinLnBrk="0" hangingPunct="1">
+              <a:spcBef>
+                <a:spcPct val="0"/>
+              </a:spcBef>
+              <a:buNone/>
+              <a:defRPr sz="4000" kern="1200" spc="-100" baseline="0">
+                <a:solidFill>
+                  <a:schemeClr val="tx2"/>
+                </a:solidFill>
+                <a:latin typeface="+mj-lt"/>
+                <a:ea typeface="+mj-ea"/>
+                <a:cs typeface="+mj-cs"/>
+              </a:defRPr>
+            </a:lvl1pPr>
+          </a:lstStyle>
+          <a:p>
+            <a:pPr algn="ctr">
+              <a:spcBef>
+                <a:spcPts val="0"/>
+              </a:spcBef>
+            </a:pPr>
+            <a:r>
+              <a:rPr lang="en-US" sz="2800" dirty="0" smtClean="0">
+                <a:ln>
+                  <a:solidFill>
+                    <a:schemeClr val="tx1"/>
+                  </a:solidFill>
+                </a:ln>
+                <a:solidFill>
+                  <a:srgbClr val="FF0000"/>
+                </a:solidFill>
+              </a:rPr>
+              <a:t>Model</a:t>
+            </a:r>
+            <a:endParaRPr lang="en-US" dirty="0">
+              <a:ln>
+                <a:solidFill>
+                  <a:schemeClr val="tx1"/>
+                </a:solidFill>
+              </a:ln>
+              <a:solidFill>
+                <a:srgbClr val="FF0000"/>
+              </a:solidFill>
+            </a:endParaRPr>
+          </a:p>
+        </p:txBody>
+      </p:sp>
+      <p:pic>
+        <p:nvPicPr>
+          <p:cNvPr id="41" name="Google Shape;900;p34"/>
+          <p:cNvPicPr preferRelativeResize="0"/>
+          <p:nvPr/>
+        </p:nvPicPr>
+        <p:blipFill>
+          <a:blip r:embed="rId3">
+            <a:alphaModFix/>
+            <a:biLevel thresh="75000"/>
+            <a:extLst>
+              <a:ext uri="{BEBA8EAE-BF5A-486C-A8C5-ECC9F3942E4B}">
+                <a14:imgProps xmlns:a14="http://schemas.microsoft.com/office/drawing/2010/main">
+                  <a14:imgLayer r:embed="rId4">
+                    <a14:imgEffect>
+                      <a14:saturation sat="0"/>
+                    </a14:imgEffect>
+                  </a14:imgLayer>
+                </a14:imgProps>
+              </a:ext>
+            </a:extLst>
+          </a:blip>
+          <a:stretch>
+            <a:fillRect/>
+          </a:stretch>
+        </p:blipFill>
+        <p:spPr>
+          <a:xfrm>
+            <a:off x="6568507" y="2182455"/>
+            <a:ext cx="691200" cy="691200"/>
+          </a:xfrm>
+          <a:prstGeom prst="rect">
+            <a:avLst/>
+          </a:prstGeom>
+          <a:noFill/>
+          <a:ln>
+            <a:noFill/>
+          </a:ln>
+        </p:spPr>
+      </p:pic>
+      <p:cxnSp>
+        <p:nvCxnSpPr>
+          <p:cNvPr id="42" name="Google Shape;901;p34"/>
+          <p:cNvCxnSpPr>
+            <a:endCxn id="41" idx="0"/>
+          </p:cNvCxnSpPr>
+          <p:nvPr/>
+        </p:nvCxnSpPr>
+        <p:spPr>
+          <a:xfrm flipV="1">
+            <a:off x="4261882" y="2182455"/>
+            <a:ext cx="2652225" cy="1559013"/>
+          </a:xfrm>
+          <a:prstGeom prst="bentConnector4">
+            <a:avLst>
+              <a:gd name="adj1" fmla="val 44"/>
+              <a:gd name="adj2" fmla="val 114663"/>
+            </a:avLst>
+          </a:prstGeom>
+          <a:noFill/>
+          <a:ln w="28575" cap="flat" cmpd="sng">
+            <a:solidFill>
+              <a:schemeClr val="tx1"/>
+            </a:solidFill>
+            <a:prstDash val="solid"/>
+            <a:round/>
+            <a:headEnd type="none" w="med" len="med"/>
+            <a:tailEnd type="stealth" w="med" len="med"/>
+          </a:ln>
+        </p:spPr>
+      </p:cxnSp>
+      <p:sp>
+        <p:nvSpPr>
+          <p:cNvPr id="43" name="Google Shape;903;p34"/>
+          <p:cNvSpPr txBox="1"/>
+          <p:nvPr/>
+        </p:nvSpPr>
+        <p:spPr>
+          <a:xfrm>
+            <a:off x="751866" y="1973923"/>
+            <a:ext cx="2706000" cy="461635"/>
+          </a:xfrm>
+          <a:prstGeom prst="rect">
+            <a:avLst/>
+          </a:prstGeom>
+          <a:noFill/>
+          <a:ln>
+            <a:noFill/>
+          </a:ln>
+        </p:spPr>
+        <p:txBody>
+          <a:bodyPr spcFirstLastPara="1" wrap="square" lIns="91425" tIns="91425" rIns="91425" bIns="91425" anchor="t" anchorCtr="0">
+            <a:spAutoFit/>
+          </a:bodyPr>
+          <a:lstStyle/>
+          <a:p>
+            <a:pPr marL="0" lvl="0" indent="0" algn="ctr" rtl="0">
+              <a:spcBef>
+                <a:spcPts val="0"/>
+              </a:spcBef>
+              <a:spcAft>
+                <a:spcPts val="0"/>
+              </a:spcAft>
+              <a:buNone/>
+            </a:pPr>
+            <a:r>
+              <a:rPr lang="en" dirty="0" smtClean="0">
+                <a:ln>
+                  <a:solidFill>
+                    <a:schemeClr val="tx1"/>
+                  </a:solidFill>
+                </a:ln>
+                <a:latin typeface="Roboto"/>
+                <a:ea typeface="Roboto"/>
+                <a:cs typeface="Roboto"/>
+                <a:sym typeface="Roboto"/>
+              </a:rPr>
+              <a:t>HTTP Fetch Request</a:t>
+            </a:r>
+            <a:endParaRPr dirty="0">
+              <a:ln>
+                <a:solidFill>
+                  <a:schemeClr val="tx1"/>
+                </a:solidFill>
+              </a:ln>
+              <a:latin typeface="Roboto"/>
+              <a:ea typeface="Roboto"/>
+              <a:cs typeface="Roboto"/>
+              <a:sym typeface="Roboto"/>
+            </a:endParaRPr>
+          </a:p>
+        </p:txBody>
+      </p:sp>
+      <p:cxnSp>
+        <p:nvCxnSpPr>
+          <p:cNvPr id="44" name="Google Shape;906;p34"/>
+          <p:cNvCxnSpPr>
+            <a:stCxn id="41" idx="2"/>
+          </p:cNvCxnSpPr>
+          <p:nvPr/>
+        </p:nvCxnSpPr>
+        <p:spPr>
+          <a:xfrm rot="16200000" flipH="1">
+            <a:off x="6989096" y="2798665"/>
+            <a:ext cx="1158897" cy="1308875"/>
+          </a:xfrm>
+          <a:prstGeom prst="bentConnector3">
+            <a:avLst>
+              <a:gd name="adj1" fmla="val 119726"/>
+            </a:avLst>
+          </a:prstGeom>
+          <a:noFill/>
+          <a:ln w="19050" cap="flat" cmpd="sng">
+            <a:solidFill>
+              <a:schemeClr val="tx1"/>
+            </a:solidFill>
+            <a:prstDash val="solid"/>
+            <a:round/>
+            <a:headEnd type="stealth" w="med" len="med"/>
+            <a:tailEnd type="none" w="med" len="med"/>
+          </a:ln>
+        </p:spPr>
+      </p:cxnSp>
+      <p:sp>
+        <p:nvSpPr>
+          <p:cNvPr id="45" name="Google Shape;908;p34"/>
+          <p:cNvSpPr txBox="1"/>
+          <p:nvPr/>
+        </p:nvSpPr>
+        <p:spPr>
+          <a:xfrm>
+            <a:off x="6667207" y="4235680"/>
+            <a:ext cx="1555800" cy="461635"/>
+          </a:xfrm>
+          <a:prstGeom prst="rect">
+            <a:avLst/>
+          </a:prstGeom>
+          <a:noFill/>
+          <a:ln>
+            <a:noFill/>
+          </a:ln>
+        </p:spPr>
+        <p:txBody>
+          <a:bodyPr spcFirstLastPara="1" wrap="square" lIns="91425" tIns="91425" rIns="91425" bIns="91425" anchor="t" anchorCtr="0">
+            <a:spAutoFit/>
+          </a:bodyPr>
+          <a:lstStyle/>
+          <a:p>
+            <a:pPr marL="0" lvl="0" indent="0" algn="ctr" rtl="0">
+              <a:spcBef>
+                <a:spcPts val="0"/>
+              </a:spcBef>
+              <a:spcAft>
+                <a:spcPts val="0"/>
+              </a:spcAft>
+              <a:buNone/>
+            </a:pPr>
+            <a:r>
+              <a:rPr lang="en" dirty="0">
+                <a:ln>
+                  <a:solidFill>
+                    <a:schemeClr val="tx1"/>
+                  </a:solidFill>
+                </a:ln>
+                <a:latin typeface="Roboto"/>
+                <a:ea typeface="Roboto"/>
+                <a:cs typeface="Roboto"/>
+                <a:sym typeface="Roboto"/>
+              </a:rPr>
+              <a:t>Send Data</a:t>
+            </a:r>
+            <a:endParaRPr dirty="0">
+              <a:ln>
+                <a:solidFill>
+                  <a:schemeClr val="tx1"/>
+                </a:solidFill>
+              </a:ln>
+              <a:latin typeface="Roboto"/>
+              <a:ea typeface="Roboto"/>
+              <a:cs typeface="Roboto"/>
+              <a:sym typeface="Roboto"/>
+            </a:endParaRPr>
+          </a:p>
+        </p:txBody>
+      </p:sp>
+      <p:sp>
+        <p:nvSpPr>
+          <p:cNvPr id="46" name="Google Shape;909;p34"/>
+          <p:cNvSpPr txBox="1"/>
+          <p:nvPr/>
+        </p:nvSpPr>
+        <p:spPr>
+          <a:xfrm>
+            <a:off x="4443940" y="4116035"/>
+            <a:ext cx="1555800" cy="738633"/>
+          </a:xfrm>
+          <a:prstGeom prst="rect">
+            <a:avLst/>
+          </a:prstGeom>
+          <a:noFill/>
+          <a:ln>
+            <a:noFill/>
+          </a:ln>
+        </p:spPr>
+        <p:txBody>
+          <a:bodyPr spcFirstLastPara="1" wrap="square" lIns="91425" tIns="91425" rIns="91425" bIns="91425" anchor="t" anchorCtr="0">
+            <a:spAutoFit/>
+          </a:bodyPr>
+          <a:lstStyle/>
+          <a:p>
+            <a:pPr marL="0" lvl="0" indent="0" algn="ctr" rtl="0">
+              <a:spcBef>
+                <a:spcPts val="0"/>
+              </a:spcBef>
+              <a:spcAft>
+                <a:spcPts val="0"/>
+              </a:spcAft>
+              <a:buNone/>
+            </a:pPr>
+            <a:r>
+              <a:rPr lang="en" dirty="0">
+                <a:ln>
+                  <a:solidFill>
+                    <a:schemeClr val="tx1"/>
+                  </a:solidFill>
+                </a:ln>
+                <a:latin typeface="Roboto"/>
+                <a:ea typeface="Roboto"/>
+                <a:cs typeface="Roboto"/>
+                <a:sym typeface="Roboto"/>
+              </a:rPr>
+              <a:t>JSON Response</a:t>
+            </a:r>
+            <a:endParaRPr dirty="0">
+              <a:ln>
+                <a:solidFill>
+                  <a:schemeClr val="tx1"/>
+                </a:solidFill>
+              </a:ln>
+              <a:latin typeface="Roboto"/>
+              <a:ea typeface="Roboto"/>
+              <a:cs typeface="Roboto"/>
+              <a:sym typeface="Roboto"/>
+            </a:endParaRPr>
+          </a:p>
+        </p:txBody>
+      </p:sp>
+      <p:pic>
+        <p:nvPicPr>
+          <p:cNvPr id="47" name="Picture 10" descr="Express.js Node.js JavaScript MongoDB, node js, text, trademark, logo png |  PNGWing"/>
+          <p:cNvPicPr>
+            <a:picLocks noChangeAspect="1" noChangeArrowheads="1"/>
+          </p:cNvPicPr>
+          <p:nvPr/>
+        </p:nvPicPr>
+        <p:blipFill>
+          <a:blip r:embed="rId5" cstate="print">
             <a:extLst>
               <a:ext uri="{28A0092B-C50C-407E-A947-70E740481C1C}">
                 <a14:useLocalDpi xmlns:a14="http://schemas.microsoft.com/office/drawing/2010/main" val="0"/>
@@ -3814,8 +4519,100 @@
         </p:blipFill>
         <p:spPr bwMode="auto">
           <a:xfrm>
-            <a:off x="457200" y="1794164"/>
-            <a:ext cx="8229600" cy="4488872"/>
+            <a:off x="3788674" y="3754532"/>
+            <a:ext cx="565827" cy="565827"/>
+          </a:xfrm>
+          <a:prstGeom prst="rect">
+            <a:avLst/>
+          </a:prstGeom>
+          <a:noFill/>
+          <a:extLst>
+            <a:ext uri="{909E8E84-426E-40DD-AFC4-6F175D3DCCD1}">
+              <a14:hiddenFill xmlns:a14="http://schemas.microsoft.com/office/drawing/2010/main">
+                <a:solidFill>
+                  <a:srgbClr val="FFFFFF"/>
+                </a:solidFill>
+              </a14:hiddenFill>
+            </a:ext>
+          </a:extLst>
+        </p:spPr>
+      </p:pic>
+      <p:sp>
+        <p:nvSpPr>
+          <p:cNvPr id="48" name="Google Shape;892;p34"/>
+          <p:cNvSpPr txBox="1"/>
+          <p:nvPr/>
+        </p:nvSpPr>
+        <p:spPr>
+          <a:xfrm>
+            <a:off x="4105385" y="1497282"/>
+            <a:ext cx="2042511" cy="461635"/>
+          </a:xfrm>
+          <a:prstGeom prst="rect">
+            <a:avLst/>
+          </a:prstGeom>
+          <a:noFill/>
+          <a:ln>
+            <a:noFill/>
+          </a:ln>
+        </p:spPr>
+        <p:txBody>
+          <a:bodyPr spcFirstLastPara="1" wrap="square" lIns="91425" tIns="91425" rIns="91425" bIns="91425" anchor="t" anchorCtr="0">
+            <a:spAutoFit/>
+          </a:bodyPr>
+          <a:lstStyle/>
+          <a:p>
+            <a:pPr marL="0" lvl="0" indent="0" algn="ctr" rtl="0">
+              <a:spcBef>
+                <a:spcPts val="0"/>
+              </a:spcBef>
+              <a:spcAft>
+                <a:spcPts val="0"/>
+              </a:spcAft>
+              <a:buNone/>
+            </a:pPr>
+            <a:r>
+              <a:rPr lang="en" dirty="0" smtClean="0">
+                <a:ln>
+                  <a:solidFill>
+                    <a:schemeClr val="tx1"/>
+                  </a:solidFill>
+                </a:ln>
+                <a:latin typeface="Roboto"/>
+                <a:ea typeface="Roboto"/>
+                <a:cs typeface="Roboto"/>
+                <a:sym typeface="Roboto"/>
+              </a:rPr>
+              <a:t>Route Handler</a:t>
+            </a:r>
+          </a:p>
+        </p:txBody>
+      </p:sp>
+      <p:pic>
+        <p:nvPicPr>
+          <p:cNvPr id="49" name="Picture 2"/>
+          <p:cNvPicPr>
+            <a:picLocks noChangeAspect="1" noChangeArrowheads="1"/>
+          </p:cNvPicPr>
+          <p:nvPr/>
+        </p:nvPicPr>
+        <p:blipFill>
+          <a:blip r:embed="rId6" cstate="print">
+            <a:extLst>
+              <a:ext uri="{28A0092B-C50C-407E-A947-70E740481C1C}">
+                <a14:useLocalDpi xmlns:a14="http://schemas.microsoft.com/office/drawing/2010/main" val="0"/>
+              </a:ext>
+            </a:extLst>
+          </a:blip>
+          <a:srcRect/>
+          <a:stretch>
+            <a:fillRect/>
+          </a:stretch>
+        </p:blipFill>
+        <p:spPr bwMode="auto">
+          <a:xfrm>
+            <a:off x="7537375" y="3147110"/>
+            <a:ext cx="1188720" cy="1188720"/>
           </a:xfrm>
           <a:prstGeom prst="rect">
             <a:avLst/>
@@ -3855,6 +4652,478 @@
           </a:extLst>
         </p:spPr>
       </p:pic>
+      <p:pic>
+        <p:nvPicPr>
+          <p:cNvPr id="50" name="Content Placeholder 42"/>
+          <p:cNvPicPr>
+            <a:picLocks noGrp="1" noChangeAspect="1"/>
+          </p:cNvPicPr>
+          <p:nvPr>
+            <p:ph idx="1"/>
+          </p:nvPr>
+        </p:nvPicPr>
+        <p:blipFill>
+          <a:blip r:embed="rId7" cstate="print">
+            <a:extLst>
+              <a:ext uri="{28A0092B-C50C-407E-A947-70E740481C1C}">
+                <a14:useLocalDpi xmlns:a14="http://schemas.microsoft.com/office/drawing/2010/main" val="0"/>
+              </a:ext>
+            </a:extLst>
+          </a:blip>
+          <a:stretch>
+            <a:fillRect/>
+          </a:stretch>
+        </p:blipFill>
+        <p:spPr>
+          <a:xfrm>
+            <a:off x="7141855" y="2829763"/>
+            <a:ext cx="1027651" cy="488607"/>
+          </a:xfrm>
+          <a:prstGeom prst="rect">
+            <a:avLst/>
+          </a:prstGeom>
+        </p:spPr>
+      </p:pic>
+      <p:cxnSp>
+        <p:nvCxnSpPr>
+          <p:cNvPr id="51" name="Google Shape;904;p34"/>
+          <p:cNvCxnSpPr>
+            <a:stCxn id="41" idx="3"/>
+          </p:cNvCxnSpPr>
+          <p:nvPr/>
+        </p:nvCxnSpPr>
+        <p:spPr>
+          <a:xfrm>
+            <a:off x="7259707" y="2528055"/>
+            <a:ext cx="963300" cy="1092025"/>
+          </a:xfrm>
+          <a:prstGeom prst="bentConnector2">
+            <a:avLst/>
+          </a:prstGeom>
+          <a:noFill/>
+          <a:ln w="19050" cap="flat" cmpd="sng">
+            <a:solidFill>
+              <a:schemeClr val="tx1"/>
+            </a:solidFill>
+            <a:prstDash val="solid"/>
+            <a:round/>
+            <a:headEnd type="none" w="med" len="med"/>
+            <a:tailEnd type="stealth" w="med" len="med"/>
+          </a:ln>
+        </p:spPr>
+      </p:cxnSp>
+      <p:sp>
+        <p:nvSpPr>
+          <p:cNvPr id="52" name="Google Shape;905;p34"/>
+          <p:cNvSpPr txBox="1"/>
+          <p:nvPr/>
+        </p:nvSpPr>
+        <p:spPr>
+          <a:xfrm>
+            <a:off x="7077456" y="1813111"/>
+            <a:ext cx="1555800" cy="738633"/>
+          </a:xfrm>
+          <a:prstGeom prst="rect">
+            <a:avLst/>
+          </a:prstGeom>
+          <a:noFill/>
+          <a:ln>
+            <a:noFill/>
+          </a:ln>
+        </p:spPr>
+        <p:txBody>
+          <a:bodyPr spcFirstLastPara="1" wrap="square" lIns="91425" tIns="91425" rIns="91425" bIns="91425" anchor="t" anchorCtr="0">
+            <a:spAutoFit/>
+          </a:bodyPr>
+          <a:lstStyle/>
+          <a:p>
+            <a:pPr marL="0" lvl="0" indent="0" algn="ctr" rtl="0">
+              <a:spcBef>
+                <a:spcPts val="0"/>
+              </a:spcBef>
+              <a:spcAft>
+                <a:spcPts val="0"/>
+              </a:spcAft>
+              <a:buNone/>
+            </a:pPr>
+            <a:r>
+              <a:rPr lang="en" dirty="0" smtClean="0">
+                <a:ln>
+                  <a:solidFill>
+                    <a:schemeClr val="tx1"/>
+                  </a:solidFill>
+                </a:ln>
+                <a:latin typeface="Roboto"/>
+                <a:ea typeface="Roboto"/>
+                <a:cs typeface="Roboto"/>
+                <a:sym typeface="Roboto"/>
+              </a:rPr>
+              <a:t>Query for data</a:t>
+            </a:r>
+            <a:endParaRPr dirty="0">
+              <a:ln>
+                <a:solidFill>
+                  <a:schemeClr val="tx1"/>
+                </a:solidFill>
+              </a:ln>
+              <a:latin typeface="Roboto"/>
+              <a:ea typeface="Roboto"/>
+              <a:cs typeface="Roboto"/>
+              <a:sym typeface="Roboto"/>
+            </a:endParaRPr>
+          </a:p>
+        </p:txBody>
+      </p:sp>
+      <p:pic>
+        <p:nvPicPr>
+          <p:cNvPr id="53" name="Picture 52"/>
+          <p:cNvPicPr>
+            <a:picLocks noChangeAspect="1"/>
+          </p:cNvPicPr>
+          <p:nvPr/>
+        </p:nvPicPr>
+        <p:blipFill>
+          <a:blip r:embed="rId8" cstate="print">
+            <a:extLst>
+              <a:ext uri="{28A0092B-C50C-407E-A947-70E740481C1C}">
+                <a14:useLocalDpi xmlns:a14="http://schemas.microsoft.com/office/drawing/2010/main" val="0"/>
+              </a:ext>
+            </a:extLst>
+          </a:blip>
+          <a:stretch>
+            <a:fillRect/>
+          </a:stretch>
+        </p:blipFill>
+        <p:spPr>
+          <a:xfrm>
+            <a:off x="360676" y="2847473"/>
+            <a:ext cx="893995" cy="893995"/>
+          </a:xfrm>
+          <a:prstGeom prst="rect">
+            <a:avLst/>
+          </a:prstGeom>
+        </p:spPr>
+      </p:pic>
+      <p:cxnSp>
+        <p:nvCxnSpPr>
+          <p:cNvPr id="54" name="Elbow Connector 53"/>
+          <p:cNvCxnSpPr/>
+          <p:nvPr/>
+        </p:nvCxnSpPr>
+        <p:spPr>
+          <a:xfrm rot="16200000" flipV="1">
+            <a:off x="679391" y="3938049"/>
+            <a:ext cx="887548" cy="630983"/>
+          </a:xfrm>
+          <a:prstGeom prst="bentConnector3">
+            <a:avLst>
+              <a:gd name="adj1" fmla="val -482"/>
+            </a:avLst>
+          </a:prstGeom>
+          <a:ln w="28575">
+            <a:solidFill>
+              <a:schemeClr val="tx1"/>
+            </a:solidFill>
+            <a:tailEnd type="arrow"/>
+          </a:ln>
+        </p:spPr>
+        <p:style>
+          <a:lnRef idx="1">
+            <a:schemeClr val="accent1"/>
+          </a:lnRef>
+          <a:fillRef idx="0">
+            <a:schemeClr val="accent1"/>
+          </a:fillRef>
+          <a:effectRef idx="0">
+            <a:schemeClr val="accent1"/>
+          </a:effectRef>
+          <a:fontRef idx="minor">
+            <a:schemeClr val="tx1"/>
+          </a:fontRef>
+        </p:style>
+      </p:cxnSp>
+      <p:cxnSp>
+        <p:nvCxnSpPr>
+          <p:cNvPr id="55" name="Elbow Connector 54"/>
+          <p:cNvCxnSpPr/>
+          <p:nvPr/>
+        </p:nvCxnSpPr>
+        <p:spPr>
+          <a:xfrm rot="16200000" flipH="1">
+            <a:off x="1147724" y="3636745"/>
+            <a:ext cx="813677" cy="584492"/>
+          </a:xfrm>
+          <a:prstGeom prst="bentConnector3">
+            <a:avLst>
+              <a:gd name="adj1" fmla="val -1694"/>
+            </a:avLst>
+          </a:prstGeom>
+          <a:ln w="28575">
+            <a:solidFill>
+              <a:schemeClr val="tx1"/>
+            </a:solidFill>
+            <a:tailEnd type="arrow"/>
+          </a:ln>
+        </p:spPr>
+        <p:style>
+          <a:lnRef idx="1">
+            <a:schemeClr val="accent1"/>
+          </a:lnRef>
+          <a:fillRef idx="0">
+            <a:schemeClr val="accent1"/>
+          </a:fillRef>
+          <a:effectRef idx="0">
+            <a:schemeClr val="accent1"/>
+          </a:effectRef>
+          <a:fontRef idx="minor">
+            <a:schemeClr val="tx1"/>
+          </a:fontRef>
+        </p:style>
+      </p:cxnSp>
+      <p:sp>
+        <p:nvSpPr>
+          <p:cNvPr id="56" name="Google Shape;896;p34"/>
+          <p:cNvSpPr txBox="1"/>
+          <p:nvPr/>
+        </p:nvSpPr>
+        <p:spPr>
+          <a:xfrm>
+            <a:off x="1838388" y="3612099"/>
+            <a:ext cx="1685100" cy="738633"/>
+          </a:xfrm>
+          <a:prstGeom prst="rect">
+            <a:avLst/>
+          </a:prstGeom>
+          <a:noFill/>
+          <a:ln>
+            <a:noFill/>
+          </a:ln>
+        </p:spPr>
+        <p:txBody>
+          <a:bodyPr spcFirstLastPara="1" wrap="square" lIns="91425" tIns="91425" rIns="91425" bIns="91425" anchor="t" anchorCtr="0">
+            <a:spAutoFit/>
+          </a:bodyPr>
+          <a:lstStyle/>
+          <a:p>
+            <a:pPr marL="0" lvl="0" indent="0" algn="ctr" rtl="0">
+              <a:spcBef>
+                <a:spcPts val="0"/>
+              </a:spcBef>
+              <a:spcAft>
+                <a:spcPts val="0"/>
+              </a:spcAft>
+              <a:buNone/>
+            </a:pPr>
+            <a:r>
+              <a:rPr lang="en" dirty="0" smtClean="0">
+                <a:ln>
+                  <a:solidFill>
+                    <a:schemeClr val="tx1"/>
+                  </a:solidFill>
+                </a:ln>
+                <a:latin typeface="Roboto"/>
+                <a:ea typeface="Roboto"/>
+                <a:cs typeface="Roboto"/>
+                <a:sym typeface="Roboto"/>
+              </a:rPr>
+              <a:t>Render Updated View</a:t>
+            </a:r>
+            <a:endParaRPr dirty="0">
+              <a:ln>
+                <a:solidFill>
+                  <a:schemeClr val="tx1"/>
+                </a:solidFill>
+              </a:ln>
+              <a:latin typeface="Roboto"/>
+              <a:ea typeface="Roboto"/>
+              <a:cs typeface="Roboto"/>
+              <a:sym typeface="Roboto"/>
+            </a:endParaRPr>
+          </a:p>
+        </p:txBody>
+      </p:sp>
+      <p:pic>
+        <p:nvPicPr>
+          <p:cNvPr id="57" name="Picture 2"/>
+          <p:cNvPicPr>
+            <a:picLocks noChangeAspect="1" noChangeArrowheads="1"/>
+          </p:cNvPicPr>
+          <p:nvPr/>
+        </p:nvPicPr>
+        <p:blipFill>
+          <a:blip r:embed="rId9" cstate="print">
+            <a:extLst>
+              <a:ext uri="{28A0092B-C50C-407E-A947-70E740481C1C}">
+                <a14:useLocalDpi xmlns:a14="http://schemas.microsoft.com/office/drawing/2010/main" val="0"/>
+              </a:ext>
+            </a:extLst>
+          </a:blip>
+          <a:srcRect/>
+          <a:stretch>
+            <a:fillRect/>
+          </a:stretch>
+        </p:blipFill>
+        <p:spPr bwMode="auto">
+          <a:xfrm>
+            <a:off x="2211474" y="4817553"/>
+            <a:ext cx="685800" cy="685800"/>
+          </a:xfrm>
+          <a:prstGeom prst="rect">
+            <a:avLst/>
+          </a:prstGeom>
+          <a:noFill/>
+          <a:ln>
+            <a:noFill/>
+          </a:ln>
+          <a:effectLst/>
+          <a:extLst>
+            <a:ext uri="{909E8E84-426E-40DD-AFC4-6F175D3DCCD1}">
+              <a14:hiddenFill xmlns:a14="http://schemas.microsoft.com/office/drawing/2010/main">
+                <a:solidFill>
+                  <a:schemeClr val="accent1"/>
+                </a:solidFill>
+              </a14:hiddenFill>
+            </a:ext>
+            <a:ext uri="{91240B29-F687-4F45-9708-019B960494DF}">
+              <a14:hiddenLine xmlns:a14="http://schemas.microsoft.com/office/drawing/2010/main" w="9525">
+                <a:solidFill>
+                  <a:schemeClr val="tx1"/>
+                </a:solidFill>
+                <a:miter lim="800000"/>
+                <a:headEnd/>
+                <a:tailEnd/>
+              </a14:hiddenLine>
+            </a:ext>
+            <a:ext uri="{AF507438-7753-43E0-B8FC-AC1667EBCBE1}">
+              <a14:hiddenEffects xmlns:a14="http://schemas.microsoft.com/office/drawing/2010/main">
+                <a:effectLst>
+                  <a:outerShdw dist="35921" dir="2700000" algn="ctr" rotWithShape="0">
+                    <a:schemeClr val="bg2"/>
+                  </a:outerShdw>
+                </a:effectLst>
+              </a14:hiddenEffects>
+            </a:ext>
+          </a:extLst>
+        </p:spPr>
+      </p:pic>
+      <p:cxnSp>
+        <p:nvCxnSpPr>
+          <p:cNvPr id="58" name="Elbow Connector 57"/>
+          <p:cNvCxnSpPr>
+            <a:stCxn id="41" idx="1"/>
+            <a:endCxn id="47" idx="3"/>
+          </p:cNvCxnSpPr>
+          <p:nvPr/>
+        </p:nvCxnSpPr>
+        <p:spPr>
+          <a:xfrm rot="10800000" flipV="1">
+            <a:off x="4354501" y="2528054"/>
+            <a:ext cx="2214006" cy="1509391"/>
+          </a:xfrm>
+          <a:prstGeom prst="bentConnector3">
+            <a:avLst/>
+          </a:prstGeom>
+          <a:ln w="28575">
+            <a:solidFill>
+              <a:schemeClr val="tx1"/>
+            </a:solidFill>
+            <a:tailEnd type="arrow"/>
+          </a:ln>
+        </p:spPr>
+        <p:style>
+          <a:lnRef idx="1">
+            <a:schemeClr val="accent1"/>
+          </a:lnRef>
+          <a:fillRef idx="0">
+            <a:schemeClr val="accent1"/>
+          </a:fillRef>
+          <a:effectRef idx="0">
+            <a:schemeClr val="accent1"/>
+          </a:effectRef>
+          <a:fontRef idx="minor">
+            <a:schemeClr val="tx1"/>
+          </a:fontRef>
+        </p:style>
+      </p:cxnSp>
+      <p:cxnSp>
+        <p:nvCxnSpPr>
+          <p:cNvPr id="59" name="Elbow Connector 58"/>
+          <p:cNvCxnSpPr/>
+          <p:nvPr/>
+        </p:nvCxnSpPr>
+        <p:spPr>
+          <a:xfrm rot="10800000">
+            <a:off x="1254672" y="3147110"/>
+            <a:ext cx="2698585" cy="594358"/>
+          </a:xfrm>
+          <a:prstGeom prst="bentConnector3">
+            <a:avLst>
+              <a:gd name="adj1" fmla="val 190"/>
+            </a:avLst>
+          </a:prstGeom>
+          <a:ln w="28575">
+            <a:solidFill>
+              <a:schemeClr val="tx1"/>
+            </a:solidFill>
+            <a:tailEnd type="arrow"/>
+          </a:ln>
+        </p:spPr>
+        <p:style>
+          <a:lnRef idx="1">
+            <a:schemeClr val="accent1"/>
+          </a:lnRef>
+          <a:fillRef idx="0">
+            <a:schemeClr val="accent1"/>
+          </a:fillRef>
+          <a:effectRef idx="0">
+            <a:schemeClr val="accent1"/>
+          </a:effectRef>
+          <a:fontRef idx="minor">
+            <a:schemeClr val="tx1"/>
+          </a:fontRef>
+        </p:style>
+      </p:cxnSp>
+      <p:cxnSp>
+        <p:nvCxnSpPr>
+          <p:cNvPr id="60" name="Elbow Connector 59"/>
+          <p:cNvCxnSpPr>
+            <a:stCxn id="53" idx="0"/>
+            <a:endCxn id="47" idx="0"/>
+          </p:cNvCxnSpPr>
+          <p:nvPr/>
+        </p:nvCxnSpPr>
+        <p:spPr>
+          <a:xfrm rot="16200000" flipH="1">
+            <a:off x="1986101" y="1669045"/>
+            <a:ext cx="907059" cy="3263914"/>
+          </a:xfrm>
+          <a:prstGeom prst="bentConnector3">
+            <a:avLst>
+              <a:gd name="adj1" fmla="val -40323"/>
+            </a:avLst>
+          </a:prstGeom>
+          <a:ln w="28575">
+            <a:solidFill>
+              <a:schemeClr val="tx1"/>
+            </a:solidFill>
+            <a:tailEnd type="arrow"/>
+          </a:ln>
+        </p:spPr>
+        <p:style>
+          <a:lnRef idx="1">
+            <a:schemeClr val="accent1"/>
+          </a:lnRef>
+          <a:fillRef idx="0">
+            <a:schemeClr val="accent1"/>
+          </a:fillRef>
+          <a:effectRef idx="0">
+            <a:schemeClr val="accent1"/>
+          </a:effectRef>
+          <a:fontRef idx="minor">
+            <a:schemeClr val="tx1"/>
+          </a:fontRef>
+        </p:style>
+      </p:cxnSp>
     </p:spTree>
     <p:extLst>
       <p:ext uri="{BB962C8B-B14F-4D97-AF65-F5344CB8AC3E}">
@@ -3964,7 +5233,6 @@
               <a:rPr lang="en-US" dirty="0" smtClean="0"/>
               <a:t>.</a:t>
             </a:r>
-            <a:endParaRPr lang="en-US" dirty="0" smtClean="0"/>
           </a:p>
           <a:p>
             <a:pPr>
@@ -4020,7 +5288,6 @@
               <a:rPr lang="en-US" dirty="0" smtClean="0"/>
               <a:t>the components.</a:t>
             </a:r>
-            <a:endParaRPr lang="en-US" dirty="0" smtClean="0"/>
           </a:p>
         </p:txBody>
       </p:sp>
@@ -4772,1625 +6039,6 @@
     <p:extLst>
       <p:ext uri="{BB962C8B-B14F-4D97-AF65-F5344CB8AC3E}">
         <p14:creationId xmlns:p14="http://schemas.microsoft.com/office/powerpoint/2010/main" val="1122042934"/>
-      </p:ext>
-    </p:extLst>
-  </p:cSld>
-  <p:clrMapOvr>
-    <a:masterClrMapping/>
-  </p:clrMapOvr>
-</p:sld>
-</file>
-
-<file path=ppt/slides/slide9.xml><?xml version="1.0" encoding="utf-8"?>
-<p:sld xmlns:a="http://schemas.openxmlformats.org/drawingml/2006/main" xmlns:r="http://schemas.openxmlformats.org/officeDocument/2006/relationships" xmlns:p="http://schemas.openxmlformats.org/presentationml/2006/main">
-  <p:cSld>
-    <p:spTree>
-      <p:nvGrpSpPr>
-        <p:cNvPr id="1" name=""/>
-        <p:cNvGrpSpPr/>
-        <p:nvPr/>
-      </p:nvGrpSpPr>
-      <p:grpSpPr>
-        <a:xfrm>
-          <a:off x="0" y="0"/>
-          <a:ext cx="0" cy="0"/>
-          <a:chOff x="0" y="0"/>
-          <a:chExt cx="0" cy="0"/>
-        </a:xfrm>
-      </p:grpSpPr>
-      <p:sp>
-        <p:nvSpPr>
-          <p:cNvPr id="2" name="Title 1"/>
-          <p:cNvSpPr>
-            <a:spLocks noGrp="1"/>
-          </p:cNvSpPr>
-          <p:nvPr>
-            <p:ph type="title"/>
-          </p:nvPr>
-        </p:nvSpPr>
-        <p:spPr/>
-        <p:txBody>
-          <a:bodyPr>
-            <a:noAutofit/>
-          </a:bodyPr>
-          <a:lstStyle/>
-          <a:p>
-            <a:r>
-              <a:rPr lang="en-US" sz="3200" dirty="0" smtClean="0"/>
-              <a:t>Spare Slide – Modify the Diagram Here if Needed and then Copy at Appropriate Slide</a:t>
-            </a:r>
-            <a:endParaRPr lang="en-US" sz="3200" dirty="0"/>
-          </a:p>
-        </p:txBody>
-      </p:sp>
-      <p:sp>
-        <p:nvSpPr>
-          <p:cNvPr id="3" name="Content Placeholder 2"/>
-          <p:cNvSpPr>
-            <a:spLocks noGrp="1"/>
-          </p:cNvSpPr>
-          <p:nvPr>
-            <p:ph idx="1"/>
-          </p:nvPr>
-        </p:nvSpPr>
-        <p:spPr/>
-        <p:txBody>
-          <a:bodyPr/>
-          <a:lstStyle/>
-          <a:p>
-            <a:pPr marL="0" indent="0">
-              <a:buNone/>
-            </a:pPr>
-            <a:endParaRPr lang="en-US" dirty="0"/>
-          </a:p>
-        </p:txBody>
-      </p:sp>
-      <p:cxnSp>
-        <p:nvCxnSpPr>
-          <p:cNvPr id="4" name="Google Shape;887;p34"/>
-          <p:cNvCxnSpPr/>
-          <p:nvPr/>
-        </p:nvCxnSpPr>
-        <p:spPr>
-          <a:xfrm flipH="1">
-            <a:off x="2971800" y="2246764"/>
-            <a:ext cx="16500" cy="3701700"/>
-          </a:xfrm>
-          <a:prstGeom prst="straightConnector1">
-            <a:avLst/>
-          </a:prstGeom>
-          <a:noFill/>
-          <a:ln w="19050" cap="flat" cmpd="sng">
-            <a:solidFill>
-              <a:schemeClr val="tx1"/>
-            </a:solidFill>
-            <a:prstDash val="dash"/>
-            <a:round/>
-            <a:headEnd type="none" w="med" len="med"/>
-            <a:tailEnd type="none" w="med" len="med"/>
-          </a:ln>
-        </p:spPr>
-      </p:cxnSp>
-      <p:cxnSp>
-        <p:nvCxnSpPr>
-          <p:cNvPr id="5" name="Google Shape;888;p34"/>
-          <p:cNvCxnSpPr/>
-          <p:nvPr/>
-        </p:nvCxnSpPr>
-        <p:spPr>
-          <a:xfrm>
-            <a:off x="6445476" y="2153314"/>
-            <a:ext cx="7500" cy="3782400"/>
-          </a:xfrm>
-          <a:prstGeom prst="straightConnector1">
-            <a:avLst/>
-          </a:prstGeom>
-          <a:noFill/>
-          <a:ln w="19050" cap="flat" cmpd="sng">
-            <a:solidFill>
-              <a:schemeClr val="tx1"/>
-            </a:solidFill>
-            <a:prstDash val="dash"/>
-            <a:round/>
-            <a:headEnd type="none" w="med" len="med"/>
-            <a:tailEnd type="none" w="med" len="med"/>
-          </a:ln>
-        </p:spPr>
-      </p:cxnSp>
-      <p:sp>
-        <p:nvSpPr>
-          <p:cNvPr id="6" name="Google Shape;889;p34"/>
-          <p:cNvSpPr txBox="1"/>
-          <p:nvPr/>
-        </p:nvSpPr>
-        <p:spPr>
-          <a:xfrm>
-            <a:off x="397740" y="3766714"/>
-            <a:ext cx="1446900" cy="738633"/>
-          </a:xfrm>
-          <a:prstGeom prst="rect">
-            <a:avLst/>
-          </a:prstGeom>
-          <a:noFill/>
-          <a:ln>
-            <a:noFill/>
-          </a:ln>
-        </p:spPr>
-        <p:txBody>
-          <a:bodyPr spcFirstLastPara="1" wrap="square" lIns="91425" tIns="91425" rIns="91425" bIns="91425" anchor="t" anchorCtr="0">
-            <a:spAutoFit/>
-          </a:bodyPr>
-          <a:lstStyle/>
-          <a:p>
-            <a:pPr marL="0" lvl="0" indent="0" algn="l" rtl="0">
-              <a:spcBef>
-                <a:spcPts val="0"/>
-              </a:spcBef>
-              <a:spcAft>
-                <a:spcPts val="0"/>
-              </a:spcAft>
-              <a:buNone/>
-            </a:pPr>
-            <a:r>
-              <a:rPr lang="en" dirty="0">
-                <a:ln>
-                  <a:solidFill>
-                    <a:schemeClr val="tx1"/>
-                  </a:solidFill>
-                </a:ln>
-                <a:latin typeface="Roboto"/>
-                <a:ea typeface="Roboto"/>
-                <a:cs typeface="Roboto"/>
-                <a:sym typeface="Roboto"/>
-              </a:rPr>
-              <a:t>React</a:t>
-            </a:r>
-            <a:endParaRPr dirty="0">
-              <a:ln>
-                <a:solidFill>
-                  <a:schemeClr val="tx1"/>
-                </a:solidFill>
-              </a:ln>
-              <a:latin typeface="Roboto"/>
-              <a:ea typeface="Roboto"/>
-              <a:cs typeface="Roboto"/>
-              <a:sym typeface="Roboto"/>
-            </a:endParaRPr>
-          </a:p>
-          <a:p>
-            <a:pPr marL="0" lvl="0" indent="0" algn="l" rtl="0">
-              <a:spcBef>
-                <a:spcPts val="0"/>
-              </a:spcBef>
-              <a:spcAft>
-                <a:spcPts val="0"/>
-              </a:spcAft>
-              <a:buNone/>
-            </a:pPr>
-            <a:r>
-              <a:rPr lang="en" dirty="0">
-                <a:ln>
-                  <a:solidFill>
-                    <a:schemeClr val="tx1"/>
-                  </a:solidFill>
-                </a:ln>
-                <a:latin typeface="Roboto"/>
-                <a:ea typeface="Roboto"/>
-                <a:cs typeface="Roboto"/>
-                <a:sym typeface="Roboto"/>
-              </a:rPr>
-              <a:t>Pages</a:t>
-            </a:r>
-            <a:endParaRPr dirty="0">
-              <a:ln>
-                <a:solidFill>
-                  <a:schemeClr val="tx1"/>
-                </a:solidFill>
-              </a:ln>
-              <a:latin typeface="Roboto"/>
-              <a:ea typeface="Roboto"/>
-              <a:cs typeface="Roboto"/>
-              <a:sym typeface="Roboto"/>
-            </a:endParaRPr>
-          </a:p>
-        </p:txBody>
-      </p:sp>
-      <p:cxnSp>
-        <p:nvCxnSpPr>
-          <p:cNvPr id="7" name="Google Shape;890;p34"/>
-          <p:cNvCxnSpPr>
-            <a:stCxn id="11" idx="0"/>
-          </p:cNvCxnSpPr>
-          <p:nvPr/>
-        </p:nvCxnSpPr>
-        <p:spPr>
-          <a:xfrm rot="16200000">
-            <a:off x="2246166" y="1393614"/>
-            <a:ext cx="400500" cy="3259200"/>
-          </a:xfrm>
-          <a:prstGeom prst="bentConnector2">
-            <a:avLst/>
-          </a:prstGeom>
-          <a:noFill/>
-          <a:ln w="19050" cap="flat" cmpd="sng">
-            <a:solidFill>
-              <a:schemeClr val="tx1"/>
-            </a:solidFill>
-            <a:prstDash val="solid"/>
-            <a:round/>
-            <a:headEnd type="none" w="med" len="med"/>
-            <a:tailEnd type="stealth" w="med" len="med"/>
-          </a:ln>
-        </p:spPr>
-      </p:cxnSp>
-      <p:sp>
-        <p:nvSpPr>
-          <p:cNvPr id="8" name="Google Shape;892;p34"/>
-          <p:cNvSpPr txBox="1"/>
-          <p:nvPr/>
-        </p:nvSpPr>
-        <p:spPr>
-          <a:xfrm>
-            <a:off x="1106624" y="2139958"/>
-            <a:ext cx="1555800" cy="738633"/>
-          </a:xfrm>
-          <a:prstGeom prst="rect">
-            <a:avLst/>
-          </a:prstGeom>
-          <a:noFill/>
-          <a:ln>
-            <a:noFill/>
-          </a:ln>
-        </p:spPr>
-        <p:txBody>
-          <a:bodyPr spcFirstLastPara="1" wrap="square" lIns="91425" tIns="91425" rIns="91425" bIns="91425" anchor="t" anchorCtr="0">
-            <a:spAutoFit/>
-          </a:bodyPr>
-          <a:lstStyle/>
-          <a:p>
-            <a:pPr marL="0" lvl="0" indent="0" algn="ctr" rtl="0">
-              <a:spcBef>
-                <a:spcPts val="0"/>
-              </a:spcBef>
-              <a:spcAft>
-                <a:spcPts val="0"/>
-              </a:spcAft>
-              <a:buNone/>
-            </a:pPr>
-            <a:r>
-              <a:rPr lang="en" dirty="0">
-                <a:ln>
-                  <a:solidFill>
-                    <a:schemeClr val="tx1"/>
-                  </a:solidFill>
-                </a:ln>
-                <a:latin typeface="Roboto"/>
-                <a:ea typeface="Roboto"/>
-                <a:cs typeface="Roboto"/>
-                <a:sym typeface="Roboto"/>
-              </a:rPr>
-              <a:t>View Request</a:t>
-            </a:r>
-            <a:endParaRPr dirty="0">
-              <a:ln>
-                <a:solidFill>
-                  <a:schemeClr val="tx1"/>
-                </a:solidFill>
-              </a:ln>
-              <a:latin typeface="Roboto"/>
-              <a:ea typeface="Roboto"/>
-              <a:cs typeface="Roboto"/>
-              <a:sym typeface="Roboto"/>
-            </a:endParaRPr>
-          </a:p>
-        </p:txBody>
-      </p:sp>
-      <p:sp>
-        <p:nvSpPr>
-          <p:cNvPr id="9" name="Google Shape;893;p34"/>
-          <p:cNvSpPr txBox="1"/>
-          <p:nvPr/>
-        </p:nvSpPr>
-        <p:spPr>
-          <a:xfrm>
-            <a:off x="3849126" y="2966414"/>
-            <a:ext cx="951474" cy="461635"/>
-          </a:xfrm>
-          <a:prstGeom prst="rect">
-            <a:avLst/>
-          </a:prstGeom>
-          <a:noFill/>
-          <a:ln>
-            <a:noFill/>
-          </a:ln>
-        </p:spPr>
-        <p:txBody>
-          <a:bodyPr spcFirstLastPara="1" wrap="square" lIns="91425" tIns="91425" rIns="91425" bIns="91425" anchor="t" anchorCtr="0">
-            <a:spAutoFit/>
-          </a:bodyPr>
-          <a:lstStyle/>
-          <a:p>
-            <a:pPr marL="0" lvl="0" indent="0" algn="ctr" rtl="0">
-              <a:spcBef>
-                <a:spcPts val="0"/>
-              </a:spcBef>
-              <a:spcAft>
-                <a:spcPts val="0"/>
-              </a:spcAft>
-              <a:buNone/>
-            </a:pPr>
-            <a:r>
-              <a:rPr lang="en" dirty="0">
-                <a:ln>
-                  <a:solidFill>
-                    <a:schemeClr val="tx1"/>
-                  </a:solidFill>
-                </a:ln>
-                <a:latin typeface="Roboto"/>
-                <a:ea typeface="Roboto"/>
-                <a:cs typeface="Roboto"/>
-                <a:sym typeface="Roboto"/>
-              </a:rPr>
-              <a:t>Server</a:t>
-            </a:r>
-            <a:endParaRPr dirty="0">
-              <a:ln>
-                <a:solidFill>
-                  <a:schemeClr val="tx1"/>
-                </a:solidFill>
-              </a:ln>
-              <a:latin typeface="Roboto"/>
-              <a:ea typeface="Roboto"/>
-              <a:cs typeface="Roboto"/>
-              <a:sym typeface="Roboto"/>
-            </a:endParaRPr>
-          </a:p>
-        </p:txBody>
-      </p:sp>
-      <p:pic>
-        <p:nvPicPr>
-          <p:cNvPr id="10" name="Google Shape;894;p34"/>
-          <p:cNvPicPr preferRelativeResize="0"/>
-          <p:nvPr/>
-        </p:nvPicPr>
-        <p:blipFill>
-          <a:blip r:embed="rId2">
-            <a:alphaModFix/>
-            <a:biLevel thresh="75000"/>
-          </a:blip>
-          <a:stretch>
-            <a:fillRect/>
-          </a:stretch>
-        </p:blipFill>
-        <p:spPr>
-          <a:xfrm>
-            <a:off x="7886526" y="3194014"/>
-            <a:ext cx="691200" cy="691200"/>
-          </a:xfrm>
-          <a:prstGeom prst="rect">
-            <a:avLst/>
-          </a:prstGeom>
-          <a:noFill/>
-          <a:ln>
-            <a:noFill/>
-          </a:ln>
-        </p:spPr>
-      </p:pic>
-      <p:pic>
-        <p:nvPicPr>
-          <p:cNvPr id="11" name="Google Shape;891;p34"/>
-          <p:cNvPicPr preferRelativeResize="0"/>
-          <p:nvPr/>
-        </p:nvPicPr>
-        <p:blipFill>
-          <a:blip r:embed="rId3">
-            <a:alphaModFix/>
-            <a:biLevel thresh="75000"/>
-          </a:blip>
-          <a:stretch>
-            <a:fillRect/>
-          </a:stretch>
-        </p:blipFill>
-        <p:spPr>
-          <a:xfrm>
-            <a:off x="530466" y="3223464"/>
-            <a:ext cx="572700" cy="572700"/>
-          </a:xfrm>
-          <a:prstGeom prst="rect">
-            <a:avLst/>
-          </a:prstGeom>
-          <a:noFill/>
-          <a:ln>
-            <a:noFill/>
-          </a:ln>
-        </p:spPr>
-      </p:pic>
-      <p:cxnSp>
-        <p:nvCxnSpPr>
-          <p:cNvPr id="12" name="Google Shape;895;p34"/>
-          <p:cNvCxnSpPr>
-            <a:endCxn id="9" idx="1"/>
-          </p:cNvCxnSpPr>
-          <p:nvPr/>
-        </p:nvCxnSpPr>
-        <p:spPr>
-          <a:xfrm flipV="1">
-            <a:off x="1271460" y="3197232"/>
-            <a:ext cx="2577666" cy="289749"/>
-          </a:xfrm>
-          <a:prstGeom prst="bentConnector3">
-            <a:avLst>
-              <a:gd name="adj1" fmla="val 72703"/>
-            </a:avLst>
-          </a:prstGeom>
-          <a:noFill/>
-          <a:ln w="19050" cap="flat" cmpd="sng">
-            <a:solidFill>
-              <a:schemeClr val="tx1"/>
-            </a:solidFill>
-            <a:prstDash val="solid"/>
-            <a:round/>
-            <a:headEnd type="stealth" w="med" len="med"/>
-            <a:tailEnd type="none" w="med" len="med"/>
-          </a:ln>
-        </p:spPr>
-      </p:cxnSp>
-      <p:sp>
-        <p:nvSpPr>
-          <p:cNvPr id="13" name="Google Shape;896;p34"/>
-          <p:cNvSpPr txBox="1"/>
-          <p:nvPr/>
-        </p:nvSpPr>
-        <p:spPr>
-          <a:xfrm>
-            <a:off x="1271460" y="2930682"/>
-            <a:ext cx="1685100" cy="461635"/>
-          </a:xfrm>
-          <a:prstGeom prst="rect">
-            <a:avLst/>
-          </a:prstGeom>
-          <a:noFill/>
-          <a:ln>
-            <a:noFill/>
-          </a:ln>
-        </p:spPr>
-        <p:txBody>
-          <a:bodyPr spcFirstLastPara="1" wrap="square" lIns="91425" tIns="91425" rIns="91425" bIns="91425" anchor="t" anchorCtr="0">
-            <a:spAutoFit/>
-          </a:bodyPr>
-          <a:lstStyle/>
-          <a:p>
-            <a:pPr marL="0" lvl="0" indent="0" algn="ctr" rtl="0">
-              <a:spcBef>
-                <a:spcPts val="0"/>
-              </a:spcBef>
-              <a:spcAft>
-                <a:spcPts val="0"/>
-              </a:spcAft>
-              <a:buNone/>
-            </a:pPr>
-            <a:r>
-              <a:rPr lang="en" dirty="0">
-                <a:ln>
-                  <a:solidFill>
-                    <a:schemeClr val="tx1"/>
-                  </a:solidFill>
-                </a:ln>
-                <a:latin typeface="Roboto"/>
-                <a:ea typeface="Roboto"/>
-                <a:cs typeface="Roboto"/>
-                <a:sym typeface="Roboto"/>
-              </a:rPr>
-              <a:t>Update View</a:t>
-            </a:r>
-            <a:endParaRPr dirty="0">
-              <a:ln>
-                <a:solidFill>
-                  <a:schemeClr val="tx1"/>
-                </a:solidFill>
-              </a:ln>
-              <a:latin typeface="Roboto"/>
-              <a:ea typeface="Roboto"/>
-              <a:cs typeface="Roboto"/>
-              <a:sym typeface="Roboto"/>
-            </a:endParaRPr>
-          </a:p>
-        </p:txBody>
-      </p:sp>
-      <p:sp>
-        <p:nvSpPr>
-          <p:cNvPr id="14" name="Google Shape;897;p34"/>
-          <p:cNvSpPr txBox="1">
-            <a:spLocks/>
-          </p:cNvSpPr>
-          <p:nvPr/>
-        </p:nvSpPr>
-        <p:spPr>
-          <a:xfrm>
-            <a:off x="828051" y="5791200"/>
-            <a:ext cx="1685100" cy="572700"/>
-          </a:xfrm>
-          <a:prstGeom prst="rect">
-            <a:avLst/>
-          </a:prstGeom>
-          <a:ln>
-            <a:noFill/>
-          </a:ln>
-        </p:spPr>
-        <p:txBody>
-          <a:bodyPr spcFirstLastPara="1" vert="horz" wrap="square" lIns="91425" tIns="91425" rIns="91425" bIns="91425" rtlCol="0" anchor="t" anchorCtr="0">
-            <a:noAutofit/>
-          </a:bodyPr>
-          <a:lstStyle>
-            <a:lvl1pPr algn="l" defTabSz="914400" rtl="0" eaLnBrk="1" latinLnBrk="0" hangingPunct="1">
-              <a:spcBef>
-                <a:spcPct val="0"/>
-              </a:spcBef>
-              <a:buNone/>
-              <a:defRPr sz="4000" kern="1200" spc="-100" baseline="0">
-                <a:solidFill>
-                  <a:schemeClr val="tx2"/>
-                </a:solidFill>
-                <a:latin typeface="+mj-lt"/>
-                <a:ea typeface="+mj-ea"/>
-                <a:cs typeface="+mj-cs"/>
-              </a:defRPr>
-            </a:lvl1pPr>
-          </a:lstStyle>
-          <a:p>
-            <a:pPr algn="ctr">
-              <a:spcBef>
-                <a:spcPts val="0"/>
-              </a:spcBef>
-            </a:pPr>
-            <a:r>
-              <a:rPr lang="en-US" sz="2800" dirty="0" smtClean="0">
-                <a:ln>
-                  <a:solidFill>
-                    <a:schemeClr val="tx1"/>
-                  </a:solidFill>
-                </a:ln>
-                <a:solidFill>
-                  <a:schemeClr val="tx1"/>
-                </a:solidFill>
-              </a:rPr>
-              <a:t>View</a:t>
-            </a:r>
-            <a:endParaRPr lang="en-US" dirty="0">
-              <a:ln>
-                <a:solidFill>
-                  <a:schemeClr val="tx1"/>
-                </a:solidFill>
-              </a:ln>
-              <a:solidFill>
-                <a:schemeClr val="tx1"/>
-              </a:solidFill>
-            </a:endParaRPr>
-          </a:p>
-        </p:txBody>
-      </p:sp>
-      <p:sp>
-        <p:nvSpPr>
-          <p:cNvPr id="15" name="Google Shape;898;p34"/>
-          <p:cNvSpPr txBox="1">
-            <a:spLocks/>
-          </p:cNvSpPr>
-          <p:nvPr/>
-        </p:nvSpPr>
-        <p:spPr>
-          <a:xfrm>
-            <a:off x="3824742" y="5791200"/>
-            <a:ext cx="1685100" cy="572700"/>
-          </a:xfrm>
-          <a:prstGeom prst="rect">
-            <a:avLst/>
-          </a:prstGeom>
-          <a:ln>
-            <a:noFill/>
-          </a:ln>
-        </p:spPr>
-        <p:txBody>
-          <a:bodyPr spcFirstLastPara="1" vert="horz" wrap="square" lIns="91425" tIns="91425" rIns="91425" bIns="91425" rtlCol="0" anchor="t" anchorCtr="0">
-            <a:noAutofit/>
-          </a:bodyPr>
-          <a:lstStyle>
-            <a:lvl1pPr algn="l" defTabSz="914400" rtl="0" eaLnBrk="1" latinLnBrk="0" hangingPunct="1">
-              <a:spcBef>
-                <a:spcPct val="0"/>
-              </a:spcBef>
-              <a:buNone/>
-              <a:defRPr sz="4000" kern="1200" spc="-100" baseline="0">
-                <a:solidFill>
-                  <a:schemeClr val="tx2"/>
-                </a:solidFill>
-                <a:latin typeface="+mj-lt"/>
-                <a:ea typeface="+mj-ea"/>
-                <a:cs typeface="+mj-cs"/>
-              </a:defRPr>
-            </a:lvl1pPr>
-          </a:lstStyle>
-          <a:p>
-            <a:pPr algn="ctr">
-              <a:spcBef>
-                <a:spcPts val="0"/>
-              </a:spcBef>
-            </a:pPr>
-            <a:r>
-              <a:rPr lang="en-US" sz="2800" dirty="0" smtClean="0">
-                <a:ln>
-                  <a:solidFill>
-                    <a:schemeClr val="tx1"/>
-                  </a:solidFill>
-                </a:ln>
-                <a:solidFill>
-                  <a:schemeClr val="tx1"/>
-                </a:solidFill>
-              </a:rPr>
-              <a:t>Controller</a:t>
-            </a:r>
-            <a:endParaRPr lang="en-US" dirty="0">
-              <a:ln>
-                <a:solidFill>
-                  <a:schemeClr val="tx1"/>
-                </a:solidFill>
-              </a:ln>
-              <a:solidFill>
-                <a:schemeClr val="tx1"/>
-              </a:solidFill>
-            </a:endParaRPr>
-          </a:p>
-        </p:txBody>
-      </p:sp>
-      <p:sp>
-        <p:nvSpPr>
-          <p:cNvPr id="16" name="Google Shape;899;p34"/>
-          <p:cNvSpPr txBox="1">
-            <a:spLocks/>
-          </p:cNvSpPr>
-          <p:nvPr/>
-        </p:nvSpPr>
-        <p:spPr>
-          <a:xfrm>
-            <a:off x="6766776" y="5791200"/>
-            <a:ext cx="1685100" cy="572700"/>
-          </a:xfrm>
-          <a:prstGeom prst="rect">
-            <a:avLst/>
-          </a:prstGeom>
-          <a:ln>
-            <a:noFill/>
-          </a:ln>
-        </p:spPr>
-        <p:txBody>
-          <a:bodyPr spcFirstLastPara="1" vert="horz" wrap="square" lIns="91425" tIns="91425" rIns="91425" bIns="91425" rtlCol="0" anchor="t" anchorCtr="0">
-            <a:noAutofit/>
-          </a:bodyPr>
-          <a:lstStyle>
-            <a:lvl1pPr algn="l" defTabSz="914400" rtl="0" eaLnBrk="1" latinLnBrk="0" hangingPunct="1">
-              <a:spcBef>
-                <a:spcPct val="0"/>
-              </a:spcBef>
-              <a:buNone/>
-              <a:defRPr sz="4000" kern="1200" spc="-100" baseline="0">
-                <a:solidFill>
-                  <a:schemeClr val="tx2"/>
-                </a:solidFill>
-                <a:latin typeface="+mj-lt"/>
-                <a:ea typeface="+mj-ea"/>
-                <a:cs typeface="+mj-cs"/>
-              </a:defRPr>
-            </a:lvl1pPr>
-          </a:lstStyle>
-          <a:p>
-            <a:pPr algn="ctr">
-              <a:spcBef>
-                <a:spcPts val="0"/>
-              </a:spcBef>
-            </a:pPr>
-            <a:r>
-              <a:rPr lang="en-US" sz="2800" dirty="0" smtClean="0">
-                <a:ln>
-                  <a:solidFill>
-                    <a:schemeClr val="tx1"/>
-                  </a:solidFill>
-                </a:ln>
-                <a:solidFill>
-                  <a:schemeClr val="tx1"/>
-                </a:solidFill>
-              </a:rPr>
-              <a:t>Model</a:t>
-            </a:r>
-            <a:endParaRPr lang="en-US" dirty="0">
-              <a:ln>
-                <a:solidFill>
-                  <a:schemeClr val="tx1"/>
-                </a:solidFill>
-              </a:ln>
-              <a:solidFill>
-                <a:schemeClr val="tx1"/>
-              </a:solidFill>
-            </a:endParaRPr>
-          </a:p>
-        </p:txBody>
-      </p:sp>
-      <p:pic>
-        <p:nvPicPr>
-          <p:cNvPr id="17" name="Google Shape;900;p34"/>
-          <p:cNvPicPr preferRelativeResize="0"/>
-          <p:nvPr/>
-        </p:nvPicPr>
-        <p:blipFill>
-          <a:blip r:embed="rId4">
-            <a:alphaModFix/>
-            <a:biLevel thresh="75000"/>
-            <a:extLst>
-              <a:ext uri="{BEBA8EAE-BF5A-486C-A8C5-ECC9F3942E4B}">
-                <a14:imgProps xmlns:a14="http://schemas.microsoft.com/office/drawing/2010/main">
-                  <a14:imgLayer r:embed="rId5">
-                    <a14:imgEffect>
-                      <a14:saturation sat="0"/>
-                    </a14:imgEffect>
-                  </a14:imgLayer>
-                </a14:imgProps>
-              </a:ext>
-            </a:extLst>
-          </a:blip>
-          <a:stretch>
-            <a:fillRect/>
-          </a:stretch>
-        </p:blipFill>
-        <p:spPr>
-          <a:xfrm>
-            <a:off x="6577651" y="2470302"/>
-            <a:ext cx="691200" cy="691200"/>
-          </a:xfrm>
-          <a:prstGeom prst="rect">
-            <a:avLst/>
-          </a:prstGeom>
-          <a:noFill/>
-          <a:ln>
-            <a:noFill/>
-          </a:ln>
-        </p:spPr>
-      </p:pic>
-      <p:cxnSp>
-        <p:nvCxnSpPr>
-          <p:cNvPr id="18" name="Google Shape;901;p34"/>
-          <p:cNvCxnSpPr>
-            <a:stCxn id="27" idx="0"/>
-            <a:endCxn id="17" idx="0"/>
-          </p:cNvCxnSpPr>
-          <p:nvPr/>
-        </p:nvCxnSpPr>
-        <p:spPr>
-          <a:xfrm rot="16200000">
-            <a:off x="5558176" y="1183126"/>
-            <a:ext cx="78000" cy="2652300"/>
-          </a:xfrm>
-          <a:prstGeom prst="bentConnector3">
-            <a:avLst>
-              <a:gd name="adj1" fmla="val 405256"/>
-            </a:avLst>
-          </a:prstGeom>
-          <a:noFill/>
-          <a:ln w="19050" cap="flat" cmpd="sng">
-            <a:solidFill>
-              <a:schemeClr val="tx1"/>
-            </a:solidFill>
-            <a:prstDash val="solid"/>
-            <a:round/>
-            <a:headEnd type="none" w="med" len="med"/>
-            <a:tailEnd type="stealth" w="med" len="med"/>
-          </a:ln>
-        </p:spPr>
-      </p:cxnSp>
-      <p:sp>
-        <p:nvSpPr>
-          <p:cNvPr id="19" name="Google Shape;903;p34"/>
-          <p:cNvSpPr txBox="1"/>
-          <p:nvPr/>
-        </p:nvSpPr>
-        <p:spPr>
-          <a:xfrm>
-            <a:off x="3743226" y="1806560"/>
-            <a:ext cx="2706000" cy="461635"/>
-          </a:xfrm>
-          <a:prstGeom prst="rect">
-            <a:avLst/>
-          </a:prstGeom>
-          <a:noFill/>
-          <a:ln>
-            <a:noFill/>
-          </a:ln>
-        </p:spPr>
-        <p:txBody>
-          <a:bodyPr spcFirstLastPara="1" wrap="square" lIns="91425" tIns="91425" rIns="91425" bIns="91425" anchor="t" anchorCtr="0">
-            <a:spAutoFit/>
-          </a:bodyPr>
-          <a:lstStyle/>
-          <a:p>
-            <a:pPr marL="0" lvl="0" indent="0" algn="ctr" rtl="0">
-              <a:spcBef>
-                <a:spcPts val="0"/>
-              </a:spcBef>
-              <a:spcAft>
-                <a:spcPts val="0"/>
-              </a:spcAft>
-              <a:buNone/>
-            </a:pPr>
-            <a:r>
-              <a:rPr lang="en" dirty="0">
-                <a:ln>
-                  <a:solidFill>
-                    <a:schemeClr val="tx1"/>
-                  </a:solidFill>
-                </a:ln>
-                <a:latin typeface="Roboto"/>
-                <a:ea typeface="Roboto"/>
-                <a:cs typeface="Roboto"/>
-                <a:sym typeface="Roboto"/>
-              </a:rPr>
-              <a:t>CRUD API Request</a:t>
-            </a:r>
-            <a:endParaRPr dirty="0">
-              <a:ln>
-                <a:solidFill>
-                  <a:schemeClr val="tx1"/>
-                </a:solidFill>
-              </a:ln>
-              <a:latin typeface="Roboto"/>
-              <a:ea typeface="Roboto"/>
-              <a:cs typeface="Roboto"/>
-              <a:sym typeface="Roboto"/>
-            </a:endParaRPr>
-          </a:p>
-        </p:txBody>
-      </p:sp>
-      <p:cxnSp>
-        <p:nvCxnSpPr>
-          <p:cNvPr id="20" name="Google Shape;904;p34"/>
-          <p:cNvCxnSpPr>
-            <a:stCxn id="17" idx="3"/>
-            <a:endCxn id="10" idx="0"/>
-          </p:cNvCxnSpPr>
-          <p:nvPr/>
-        </p:nvCxnSpPr>
-        <p:spPr>
-          <a:xfrm>
-            <a:off x="7268851" y="2815902"/>
-            <a:ext cx="963300" cy="378000"/>
-          </a:xfrm>
-          <a:prstGeom prst="bentConnector2">
-            <a:avLst/>
-          </a:prstGeom>
-          <a:noFill/>
-          <a:ln w="19050" cap="flat" cmpd="sng">
-            <a:solidFill>
-              <a:schemeClr val="tx1"/>
-            </a:solidFill>
-            <a:prstDash val="solid"/>
-            <a:round/>
-            <a:headEnd type="none" w="med" len="med"/>
-            <a:tailEnd type="stealth" w="med" len="med"/>
-          </a:ln>
-        </p:spPr>
-      </p:cxnSp>
-      <p:sp>
-        <p:nvSpPr>
-          <p:cNvPr id="21" name="Google Shape;905;p34"/>
-          <p:cNvSpPr txBox="1"/>
-          <p:nvPr/>
-        </p:nvSpPr>
-        <p:spPr>
-          <a:xfrm>
-            <a:off x="7268851" y="2139957"/>
-            <a:ext cx="1555800" cy="738633"/>
-          </a:xfrm>
-          <a:prstGeom prst="rect">
-            <a:avLst/>
-          </a:prstGeom>
-          <a:noFill/>
-          <a:ln>
-            <a:noFill/>
-          </a:ln>
-        </p:spPr>
-        <p:txBody>
-          <a:bodyPr spcFirstLastPara="1" wrap="square" lIns="91425" tIns="91425" rIns="91425" bIns="91425" anchor="t" anchorCtr="0">
-            <a:spAutoFit/>
-          </a:bodyPr>
-          <a:lstStyle/>
-          <a:p>
-            <a:pPr marL="0" lvl="0" indent="0" algn="ctr" rtl="0">
-              <a:spcBef>
-                <a:spcPts val="0"/>
-              </a:spcBef>
-              <a:spcAft>
-                <a:spcPts val="0"/>
-              </a:spcAft>
-              <a:buNone/>
-            </a:pPr>
-            <a:r>
-              <a:rPr lang="en" dirty="0">
-                <a:ln>
-                  <a:solidFill>
-                    <a:schemeClr val="tx1"/>
-                  </a:solidFill>
-                </a:ln>
-                <a:latin typeface="Roboto"/>
-                <a:ea typeface="Roboto"/>
-                <a:cs typeface="Roboto"/>
-                <a:sym typeface="Roboto"/>
-              </a:rPr>
-              <a:t>Fetch/Update  Data</a:t>
-            </a:r>
-            <a:endParaRPr dirty="0">
-              <a:ln>
-                <a:solidFill>
-                  <a:schemeClr val="tx1"/>
-                </a:solidFill>
-              </a:ln>
-              <a:latin typeface="Roboto"/>
-              <a:ea typeface="Roboto"/>
-              <a:cs typeface="Roboto"/>
-              <a:sym typeface="Roboto"/>
-            </a:endParaRPr>
-          </a:p>
-        </p:txBody>
-      </p:sp>
-      <p:cxnSp>
-        <p:nvCxnSpPr>
-          <p:cNvPr id="22" name="Google Shape;906;p34"/>
-          <p:cNvCxnSpPr>
-            <a:stCxn id="17" idx="2"/>
-            <a:endCxn id="25" idx="2"/>
-          </p:cNvCxnSpPr>
-          <p:nvPr/>
-        </p:nvCxnSpPr>
-        <p:spPr>
-          <a:xfrm rot="16200000" flipH="1">
-            <a:off x="6998240" y="3086512"/>
-            <a:ext cx="1158897" cy="1308875"/>
-          </a:xfrm>
-          <a:prstGeom prst="bentConnector3">
-            <a:avLst>
-              <a:gd name="adj1" fmla="val 119726"/>
-            </a:avLst>
-          </a:prstGeom>
-          <a:noFill/>
-          <a:ln w="19050" cap="flat" cmpd="sng">
-            <a:solidFill>
-              <a:schemeClr val="tx1"/>
-            </a:solidFill>
-            <a:prstDash val="solid"/>
-            <a:round/>
-            <a:headEnd type="stealth" w="med" len="med"/>
-            <a:tailEnd type="none" w="med" len="med"/>
-          </a:ln>
-        </p:spPr>
-      </p:cxnSp>
-      <p:sp>
-        <p:nvSpPr>
-          <p:cNvPr id="23" name="Google Shape;908;p34"/>
-          <p:cNvSpPr txBox="1"/>
-          <p:nvPr/>
-        </p:nvSpPr>
-        <p:spPr>
-          <a:xfrm>
-            <a:off x="6676351" y="4523527"/>
-            <a:ext cx="1555800" cy="461635"/>
-          </a:xfrm>
-          <a:prstGeom prst="rect">
-            <a:avLst/>
-          </a:prstGeom>
-          <a:noFill/>
-          <a:ln>
-            <a:noFill/>
-          </a:ln>
-        </p:spPr>
-        <p:txBody>
-          <a:bodyPr spcFirstLastPara="1" wrap="square" lIns="91425" tIns="91425" rIns="91425" bIns="91425" anchor="t" anchorCtr="0">
-            <a:spAutoFit/>
-          </a:bodyPr>
-          <a:lstStyle/>
-          <a:p>
-            <a:pPr marL="0" lvl="0" indent="0" algn="ctr" rtl="0">
-              <a:spcBef>
-                <a:spcPts val="0"/>
-              </a:spcBef>
-              <a:spcAft>
-                <a:spcPts val="0"/>
-              </a:spcAft>
-              <a:buNone/>
-            </a:pPr>
-            <a:r>
-              <a:rPr lang="en" dirty="0">
-                <a:ln>
-                  <a:solidFill>
-                    <a:schemeClr val="tx1"/>
-                  </a:solidFill>
-                </a:ln>
-                <a:latin typeface="Roboto"/>
-                <a:ea typeface="Roboto"/>
-                <a:cs typeface="Roboto"/>
-                <a:sym typeface="Roboto"/>
-              </a:rPr>
-              <a:t>Send Data</a:t>
-            </a:r>
-            <a:endParaRPr dirty="0">
-              <a:ln>
-                <a:solidFill>
-                  <a:schemeClr val="tx1"/>
-                </a:solidFill>
-              </a:ln>
-              <a:latin typeface="Roboto"/>
-              <a:ea typeface="Roboto"/>
-              <a:cs typeface="Roboto"/>
-              <a:sym typeface="Roboto"/>
-            </a:endParaRPr>
-          </a:p>
-        </p:txBody>
-      </p:sp>
-      <p:sp>
-        <p:nvSpPr>
-          <p:cNvPr id="24" name="Google Shape;909;p34"/>
-          <p:cNvSpPr txBox="1"/>
-          <p:nvPr/>
-        </p:nvSpPr>
-        <p:spPr>
-          <a:xfrm>
-            <a:off x="4769551" y="2793939"/>
-            <a:ext cx="1555800" cy="738633"/>
-          </a:xfrm>
-          <a:prstGeom prst="rect">
-            <a:avLst/>
-          </a:prstGeom>
-          <a:noFill/>
-          <a:ln>
-            <a:noFill/>
-          </a:ln>
-        </p:spPr>
-        <p:txBody>
-          <a:bodyPr spcFirstLastPara="1" wrap="square" lIns="91425" tIns="91425" rIns="91425" bIns="91425" anchor="t" anchorCtr="0">
-            <a:spAutoFit/>
-          </a:bodyPr>
-          <a:lstStyle/>
-          <a:p>
-            <a:pPr marL="0" lvl="0" indent="0" algn="ctr" rtl="0">
-              <a:spcBef>
-                <a:spcPts val="0"/>
-              </a:spcBef>
-              <a:spcAft>
-                <a:spcPts val="0"/>
-              </a:spcAft>
-              <a:buNone/>
-            </a:pPr>
-            <a:r>
-              <a:rPr lang="en" dirty="0">
-                <a:ln>
-                  <a:solidFill>
-                    <a:schemeClr val="tx1"/>
-                  </a:solidFill>
-                </a:ln>
-                <a:latin typeface="Roboto"/>
-                <a:ea typeface="Roboto"/>
-                <a:cs typeface="Roboto"/>
-                <a:sym typeface="Roboto"/>
-              </a:rPr>
-              <a:t>JSON Response</a:t>
-            </a:r>
-            <a:endParaRPr dirty="0">
-              <a:ln>
-                <a:solidFill>
-                  <a:schemeClr val="tx1"/>
-                </a:solidFill>
-              </a:ln>
-              <a:latin typeface="Roboto"/>
-              <a:ea typeface="Roboto"/>
-              <a:cs typeface="Roboto"/>
-              <a:sym typeface="Roboto"/>
-            </a:endParaRPr>
-          </a:p>
-        </p:txBody>
-      </p:sp>
-      <p:sp>
-        <p:nvSpPr>
-          <p:cNvPr id="25" name="Google Shape;907;p34"/>
-          <p:cNvSpPr txBox="1"/>
-          <p:nvPr/>
-        </p:nvSpPr>
-        <p:spPr>
-          <a:xfrm>
-            <a:off x="7609326" y="3858764"/>
-            <a:ext cx="1245600" cy="461635"/>
-          </a:xfrm>
-          <a:prstGeom prst="rect">
-            <a:avLst/>
-          </a:prstGeom>
-          <a:noFill/>
-          <a:ln>
-            <a:noFill/>
-          </a:ln>
-        </p:spPr>
-        <p:txBody>
-          <a:bodyPr spcFirstLastPara="1" wrap="square" lIns="91425" tIns="91425" rIns="91425" bIns="91425" anchor="t" anchorCtr="0">
-            <a:spAutoFit/>
-          </a:bodyPr>
-          <a:lstStyle/>
-          <a:p>
-            <a:pPr marL="0" lvl="0" indent="0" algn="ctr" rtl="0">
-              <a:spcBef>
-                <a:spcPts val="0"/>
-              </a:spcBef>
-              <a:spcAft>
-                <a:spcPts val="0"/>
-              </a:spcAft>
-              <a:buNone/>
-            </a:pPr>
-            <a:r>
-              <a:rPr lang="en" dirty="0" smtClean="0">
-                <a:ln>
-                  <a:solidFill>
-                    <a:schemeClr val="tx1"/>
-                  </a:solidFill>
-                </a:ln>
-                <a:latin typeface="Roboto"/>
-                <a:ea typeface="Roboto"/>
-                <a:cs typeface="Roboto"/>
-                <a:sym typeface="Roboto"/>
-              </a:rPr>
-              <a:t>Database</a:t>
-            </a:r>
-            <a:endParaRPr dirty="0">
-              <a:ln>
-                <a:solidFill>
-                  <a:schemeClr val="tx1"/>
-                </a:solidFill>
-              </a:ln>
-              <a:latin typeface="Roboto"/>
-              <a:ea typeface="Roboto"/>
-              <a:cs typeface="Roboto"/>
-              <a:sym typeface="Roboto"/>
-            </a:endParaRPr>
-          </a:p>
-        </p:txBody>
-      </p:sp>
-      <p:cxnSp>
-        <p:nvCxnSpPr>
-          <p:cNvPr id="26" name="Google Shape;910;p34"/>
-          <p:cNvCxnSpPr>
-            <a:stCxn id="17" idx="1"/>
-            <a:endCxn id="27" idx="3"/>
-          </p:cNvCxnSpPr>
-          <p:nvPr/>
-        </p:nvCxnSpPr>
-        <p:spPr>
-          <a:xfrm rot="10800000">
-            <a:off x="4517251" y="2794602"/>
-            <a:ext cx="2060400" cy="21300"/>
-          </a:xfrm>
-          <a:prstGeom prst="straightConnector1">
-            <a:avLst/>
-          </a:prstGeom>
-          <a:noFill/>
-          <a:ln w="19050" cap="flat" cmpd="sng">
-            <a:solidFill>
-              <a:schemeClr val="tx1"/>
-            </a:solidFill>
-            <a:prstDash val="solid"/>
-            <a:round/>
-            <a:headEnd type="none" w="med" len="med"/>
-            <a:tailEnd type="stealth" w="med" len="med"/>
-          </a:ln>
-        </p:spPr>
-      </p:cxnSp>
-      <p:pic>
-        <p:nvPicPr>
-          <p:cNvPr id="27" name="Google Shape;902;p34"/>
-          <p:cNvPicPr preferRelativeResize="0"/>
-          <p:nvPr/>
-        </p:nvPicPr>
-        <p:blipFill>
-          <a:blip r:embed="rId6">
-            <a:alphaModFix/>
-            <a:biLevel thresh="75000"/>
-          </a:blip>
-          <a:stretch>
-            <a:fillRect/>
-          </a:stretch>
-        </p:blipFill>
-        <p:spPr>
-          <a:xfrm>
-            <a:off x="4024726" y="2548276"/>
-            <a:ext cx="492600" cy="492600"/>
-          </a:xfrm>
-          <a:prstGeom prst="rect">
-            <a:avLst/>
-          </a:prstGeom>
-          <a:noFill/>
-          <a:ln>
-            <a:noFill/>
-          </a:ln>
-        </p:spPr>
-      </p:pic>
-      <p:pic>
-        <p:nvPicPr>
-          <p:cNvPr id="28" name="Google Shape;911;p34"/>
-          <p:cNvPicPr preferRelativeResize="0"/>
-          <p:nvPr/>
-        </p:nvPicPr>
-        <p:blipFill>
-          <a:blip r:embed="rId7">
-            <a:alphaModFix/>
-            <a:duotone>
-              <a:prstClr val="black"/>
-              <a:schemeClr val="tx2">
-                <a:tint val="45000"/>
-                <a:satMod val="400000"/>
-              </a:schemeClr>
-            </a:duotone>
-          </a:blip>
-          <a:stretch>
-            <a:fillRect/>
-          </a:stretch>
-        </p:blipFill>
-        <p:spPr>
-          <a:xfrm>
-            <a:off x="4063591" y="3907927"/>
-            <a:ext cx="615600" cy="615600"/>
-          </a:xfrm>
-          <a:prstGeom prst="rect">
-            <a:avLst/>
-          </a:prstGeom>
-          <a:noFill/>
-          <a:ln>
-            <a:noFill/>
-          </a:ln>
-        </p:spPr>
-      </p:pic>
-      <p:sp>
-        <p:nvSpPr>
-          <p:cNvPr id="29" name="Google Shape;912;p34"/>
-          <p:cNvSpPr txBox="1"/>
-          <p:nvPr/>
-        </p:nvSpPr>
-        <p:spPr>
-          <a:xfrm>
-            <a:off x="3338176" y="4413527"/>
-            <a:ext cx="1865700" cy="738633"/>
-          </a:xfrm>
-          <a:prstGeom prst="rect">
-            <a:avLst/>
-          </a:prstGeom>
-          <a:noFill/>
-          <a:ln>
-            <a:noFill/>
-          </a:ln>
-        </p:spPr>
-        <p:txBody>
-          <a:bodyPr spcFirstLastPara="1" wrap="square" lIns="91425" tIns="91425" rIns="91425" bIns="91425" anchor="t" anchorCtr="0">
-            <a:spAutoFit/>
-          </a:bodyPr>
-          <a:lstStyle/>
-          <a:p>
-            <a:pPr marL="0" lvl="0" indent="0" algn="ctr" rtl="0">
-              <a:spcBef>
-                <a:spcPts val="0"/>
-              </a:spcBef>
-              <a:spcAft>
-                <a:spcPts val="0"/>
-              </a:spcAft>
-              <a:buNone/>
-            </a:pPr>
-            <a:r>
-              <a:rPr lang="en">
-                <a:ln>
-                  <a:solidFill>
-                    <a:schemeClr val="tx1"/>
-                  </a:solidFill>
-                </a:ln>
-                <a:latin typeface="Roboto"/>
-                <a:ea typeface="Roboto"/>
-                <a:cs typeface="Roboto"/>
-                <a:sym typeface="Roboto"/>
-              </a:rPr>
-              <a:t>Notification Service</a:t>
-            </a:r>
-            <a:endParaRPr>
-              <a:ln>
-                <a:solidFill>
-                  <a:schemeClr val="tx1"/>
-                </a:solidFill>
-              </a:ln>
-              <a:latin typeface="Roboto"/>
-              <a:ea typeface="Roboto"/>
-              <a:cs typeface="Roboto"/>
-              <a:sym typeface="Roboto"/>
-            </a:endParaRPr>
-          </a:p>
-        </p:txBody>
-      </p:sp>
-      <p:cxnSp>
-        <p:nvCxnSpPr>
-          <p:cNvPr id="30" name="Google Shape;913;p34"/>
-          <p:cNvCxnSpPr>
-            <a:endCxn id="29" idx="2"/>
-          </p:cNvCxnSpPr>
-          <p:nvPr/>
-        </p:nvCxnSpPr>
-        <p:spPr>
-          <a:xfrm>
-            <a:off x="669426" y="4523527"/>
-            <a:ext cx="3601600" cy="628633"/>
-          </a:xfrm>
-          <a:prstGeom prst="bentConnector4">
-            <a:avLst>
-              <a:gd name="adj1" fmla="val -271"/>
-              <a:gd name="adj2" fmla="val 175639"/>
-            </a:avLst>
-          </a:prstGeom>
-          <a:noFill/>
-          <a:ln w="19050" cap="flat" cmpd="sng">
-            <a:solidFill>
-              <a:schemeClr val="tx1"/>
-            </a:solidFill>
-            <a:prstDash val="solid"/>
-            <a:round/>
-            <a:headEnd type="stealth" w="med" len="med"/>
-            <a:tailEnd type="none" w="med" len="med"/>
-          </a:ln>
-        </p:spPr>
-      </p:cxnSp>
-      <p:sp>
-        <p:nvSpPr>
-          <p:cNvPr id="31" name="Google Shape;914;p34"/>
-          <p:cNvSpPr txBox="1"/>
-          <p:nvPr/>
-        </p:nvSpPr>
-        <p:spPr>
-          <a:xfrm>
-            <a:off x="943584" y="4825946"/>
-            <a:ext cx="1555800" cy="738633"/>
-          </a:xfrm>
-          <a:prstGeom prst="rect">
-            <a:avLst/>
-          </a:prstGeom>
-          <a:noFill/>
-          <a:ln>
-            <a:noFill/>
-          </a:ln>
-        </p:spPr>
-        <p:txBody>
-          <a:bodyPr spcFirstLastPara="1" wrap="square" lIns="91425" tIns="91425" rIns="91425" bIns="91425" anchor="t" anchorCtr="0">
-            <a:spAutoFit/>
-          </a:bodyPr>
-          <a:lstStyle/>
-          <a:p>
-            <a:pPr marL="0" lvl="0" indent="0" algn="ctr" rtl="0">
-              <a:spcBef>
-                <a:spcPts val="0"/>
-              </a:spcBef>
-              <a:spcAft>
-                <a:spcPts val="0"/>
-              </a:spcAft>
-              <a:buNone/>
-            </a:pPr>
-            <a:r>
-              <a:rPr lang="en" dirty="0">
-                <a:ln>
-                  <a:solidFill>
-                    <a:schemeClr val="tx1"/>
-                  </a:solidFill>
-                </a:ln>
-                <a:latin typeface="Roboto"/>
-                <a:ea typeface="Roboto"/>
-                <a:cs typeface="Roboto"/>
-                <a:sym typeface="Roboto"/>
-              </a:rPr>
-              <a:t>Send Notification</a:t>
-            </a:r>
-            <a:endParaRPr dirty="0">
-              <a:ln>
-                <a:solidFill>
-                  <a:schemeClr val="tx1"/>
-                </a:solidFill>
-              </a:ln>
-              <a:latin typeface="Roboto"/>
-              <a:ea typeface="Roboto"/>
-              <a:cs typeface="Roboto"/>
-              <a:sym typeface="Roboto"/>
-            </a:endParaRPr>
-          </a:p>
-        </p:txBody>
-      </p:sp>
-      <p:cxnSp>
-        <p:nvCxnSpPr>
-          <p:cNvPr id="32" name="Google Shape;915;p34"/>
-          <p:cNvCxnSpPr>
-            <a:endCxn id="10" idx="1"/>
-          </p:cNvCxnSpPr>
-          <p:nvPr/>
-        </p:nvCxnSpPr>
-        <p:spPr>
-          <a:xfrm rot="10800000" flipH="1">
-            <a:off x="4675326" y="3539614"/>
-            <a:ext cx="3211200" cy="745800"/>
-          </a:xfrm>
-          <a:prstGeom prst="bentConnector3">
-            <a:avLst>
-              <a:gd name="adj1" fmla="val 50000"/>
-            </a:avLst>
-          </a:prstGeom>
-          <a:noFill/>
-          <a:ln w="19050" cap="flat" cmpd="sng">
-            <a:solidFill>
-              <a:schemeClr val="tx1"/>
-            </a:solidFill>
-            <a:prstDash val="solid"/>
-            <a:round/>
-            <a:headEnd type="none" w="med" len="med"/>
-            <a:tailEnd type="stealth" w="med" len="med"/>
-          </a:ln>
-        </p:spPr>
-      </p:cxnSp>
-      <p:sp>
-        <p:nvSpPr>
-          <p:cNvPr id="33" name="Google Shape;916;p34"/>
-          <p:cNvSpPr txBox="1"/>
-          <p:nvPr/>
-        </p:nvSpPr>
-        <p:spPr>
-          <a:xfrm>
-            <a:off x="4648039" y="3833902"/>
-            <a:ext cx="1555800" cy="461635"/>
-          </a:xfrm>
-          <a:prstGeom prst="rect">
-            <a:avLst/>
-          </a:prstGeom>
-          <a:noFill/>
-          <a:ln>
-            <a:noFill/>
-          </a:ln>
-        </p:spPr>
-        <p:txBody>
-          <a:bodyPr spcFirstLastPara="1" wrap="square" lIns="91425" tIns="91425" rIns="91425" bIns="91425" anchor="t" anchorCtr="0">
-            <a:spAutoFit/>
-          </a:bodyPr>
-          <a:lstStyle/>
-          <a:p>
-            <a:pPr marL="0" lvl="0" indent="0" algn="ctr" rtl="0">
-              <a:spcBef>
-                <a:spcPts val="0"/>
-              </a:spcBef>
-              <a:spcAft>
-                <a:spcPts val="0"/>
-              </a:spcAft>
-              <a:buNone/>
-            </a:pPr>
-            <a:r>
-              <a:rPr lang="en">
-                <a:ln>
-                  <a:solidFill>
-                    <a:schemeClr val="tx1"/>
-                  </a:solidFill>
-                </a:ln>
-                <a:latin typeface="Roboto"/>
-                <a:ea typeface="Roboto"/>
-                <a:cs typeface="Roboto"/>
-                <a:sym typeface="Roboto"/>
-              </a:rPr>
-              <a:t>Store Action</a:t>
-            </a:r>
-            <a:endParaRPr>
-              <a:ln>
-                <a:solidFill>
-                  <a:schemeClr val="tx1"/>
-                </a:solidFill>
-              </a:ln>
-              <a:latin typeface="Roboto"/>
-              <a:ea typeface="Roboto"/>
-              <a:cs typeface="Roboto"/>
-              <a:sym typeface="Roboto"/>
-            </a:endParaRPr>
-          </a:p>
-        </p:txBody>
-      </p:sp>
-      <p:cxnSp>
-        <p:nvCxnSpPr>
-          <p:cNvPr id="34" name="Google Shape;917;p34"/>
-          <p:cNvCxnSpPr>
-            <a:endCxn id="28" idx="0"/>
-          </p:cNvCxnSpPr>
-          <p:nvPr/>
-        </p:nvCxnSpPr>
-        <p:spPr>
-          <a:xfrm flipV="1">
-            <a:off x="1295400" y="3907927"/>
-            <a:ext cx="3075991" cy="136587"/>
-          </a:xfrm>
-          <a:prstGeom prst="bentConnector4">
-            <a:avLst>
-              <a:gd name="adj1" fmla="val 44997"/>
-              <a:gd name="adj2" fmla="val 267366"/>
-            </a:avLst>
-          </a:prstGeom>
-          <a:noFill/>
-          <a:ln w="19050" cap="flat" cmpd="sng">
-            <a:solidFill>
-              <a:schemeClr val="tx1"/>
-            </a:solidFill>
-            <a:prstDash val="solid"/>
-            <a:round/>
-            <a:headEnd type="none" w="med" len="med"/>
-            <a:tailEnd type="stealth" w="med" len="med"/>
-          </a:ln>
-        </p:spPr>
-      </p:cxnSp>
-      <p:sp>
-        <p:nvSpPr>
-          <p:cNvPr id="35" name="Google Shape;918;p34"/>
-          <p:cNvSpPr txBox="1"/>
-          <p:nvPr/>
-        </p:nvSpPr>
-        <p:spPr>
-          <a:xfrm>
-            <a:off x="1295400" y="4136030"/>
-            <a:ext cx="1685100" cy="461635"/>
-          </a:xfrm>
-          <a:prstGeom prst="rect">
-            <a:avLst/>
-          </a:prstGeom>
-          <a:noFill/>
-          <a:ln>
-            <a:noFill/>
-          </a:ln>
-        </p:spPr>
-        <p:txBody>
-          <a:bodyPr spcFirstLastPara="1" wrap="square" lIns="91425" tIns="91425" rIns="91425" bIns="91425" anchor="t" anchorCtr="0">
-            <a:spAutoFit/>
-          </a:bodyPr>
-          <a:lstStyle/>
-          <a:p>
-            <a:pPr marL="0" lvl="0" indent="0" algn="ctr" rtl="0">
-              <a:spcBef>
-                <a:spcPts val="0"/>
-              </a:spcBef>
-              <a:spcAft>
-                <a:spcPts val="0"/>
-              </a:spcAft>
-              <a:buNone/>
-            </a:pPr>
-            <a:r>
-              <a:rPr lang="en" dirty="0">
-                <a:ln>
-                  <a:solidFill>
-                    <a:schemeClr val="tx1"/>
-                  </a:solidFill>
-                </a:ln>
-                <a:latin typeface="Roboto"/>
-                <a:ea typeface="Roboto"/>
-                <a:cs typeface="Roboto"/>
-                <a:sym typeface="Roboto"/>
-              </a:rPr>
-              <a:t>Action Trigger</a:t>
-            </a:r>
-            <a:endParaRPr dirty="0">
-              <a:ln>
-                <a:solidFill>
-                  <a:schemeClr val="tx1"/>
-                </a:solidFill>
-              </a:ln>
-              <a:latin typeface="Roboto"/>
-              <a:ea typeface="Roboto"/>
-              <a:cs typeface="Roboto"/>
-              <a:sym typeface="Roboto"/>
-            </a:endParaRPr>
-          </a:p>
-        </p:txBody>
-      </p:sp>
-    </p:spTree>
-    <p:extLst>
-      <p:ext uri="{BB962C8B-B14F-4D97-AF65-F5344CB8AC3E}">
-        <p14:creationId xmlns:p14="http://schemas.microsoft.com/office/powerpoint/2010/main" val="2794924764"/>
       </p:ext>
     </p:extLst>
   </p:cSld>

</xml_diff>

<commit_message>
[DOCS] Forgot to save I guess :)
</commit_message>
<xml_diff>
--- a/system-design/TechShoppers - System Architecture.pptx
+++ b/system-design/TechShoppers - System Architecture.pptx
@@ -13,7 +13,6 @@
     <p:sldId id="263" r:id="rId7"/>
     <p:sldId id="264" r:id="rId8"/>
     <p:sldId id="265" r:id="rId9"/>
-    <p:sldId id="258" r:id="rId10"/>
   </p:sldIdLst>
   <p:sldSz cx="9144000" cy="6858000" type="screen4x3"/>
   <p:notesSz cx="6858000" cy="9144000"/>
@@ -3789,18 +3788,724 @@
           </a:p>
         </p:txBody>
       </p:sp>
+      <p:cxnSp>
+        <p:nvCxnSpPr>
+          <p:cNvPr id="33" name="Google Shape;887;p34"/>
+          <p:cNvCxnSpPr/>
+          <p:nvPr/>
+        </p:nvCxnSpPr>
+        <p:spPr>
+          <a:xfrm flipH="1">
+            <a:off x="3494268" y="1728099"/>
+            <a:ext cx="8250" cy="4156254"/>
+          </a:xfrm>
+          <a:prstGeom prst="straightConnector1">
+            <a:avLst/>
+          </a:prstGeom>
+          <a:noFill/>
+          <a:ln w="19050" cap="flat" cmpd="sng">
+            <a:solidFill>
+              <a:schemeClr val="tx1"/>
+            </a:solidFill>
+            <a:prstDash val="dash"/>
+            <a:round/>
+            <a:headEnd type="none" w="med" len="med"/>
+            <a:tailEnd type="none" w="med" len="med"/>
+          </a:ln>
+        </p:spPr>
+      </p:cxnSp>
+      <p:cxnSp>
+        <p:nvCxnSpPr>
+          <p:cNvPr id="34" name="Google Shape;888;p34"/>
+          <p:cNvCxnSpPr/>
+          <p:nvPr/>
+        </p:nvCxnSpPr>
+        <p:spPr>
+          <a:xfrm>
+            <a:off x="6436332" y="1728099"/>
+            <a:ext cx="7500" cy="4156254"/>
+          </a:xfrm>
+          <a:prstGeom prst="straightConnector1">
+            <a:avLst/>
+          </a:prstGeom>
+          <a:noFill/>
+          <a:ln w="19050" cap="flat" cmpd="sng">
+            <a:solidFill>
+              <a:schemeClr val="tx1"/>
+            </a:solidFill>
+            <a:prstDash val="dash"/>
+            <a:round/>
+            <a:headEnd type="none" w="med" len="med"/>
+            <a:tailEnd type="none" w="med" len="med"/>
+          </a:ln>
+        </p:spPr>
+      </p:cxnSp>
+      <p:sp>
+        <p:nvSpPr>
+          <p:cNvPr id="35" name="Google Shape;892;p34"/>
+          <p:cNvSpPr txBox="1"/>
+          <p:nvPr/>
+        </p:nvSpPr>
+        <p:spPr>
+          <a:xfrm>
+            <a:off x="69081" y="4688735"/>
+            <a:ext cx="1555800" cy="738633"/>
+          </a:xfrm>
+          <a:prstGeom prst="rect">
+            <a:avLst/>
+          </a:prstGeom>
+          <a:noFill/>
+          <a:ln>
+            <a:noFill/>
+          </a:ln>
+        </p:spPr>
+        <p:txBody>
+          <a:bodyPr spcFirstLastPara="1" wrap="square" lIns="91425" tIns="91425" rIns="91425" bIns="91425" anchor="t" anchorCtr="0">
+            <a:spAutoFit/>
+          </a:bodyPr>
+          <a:lstStyle/>
+          <a:p>
+            <a:pPr marL="0" lvl="0" indent="0" algn="ctr" rtl="0">
+              <a:spcBef>
+                <a:spcPts val="0"/>
+              </a:spcBef>
+              <a:spcAft>
+                <a:spcPts val="0"/>
+              </a:spcAft>
+              <a:buNone/>
+            </a:pPr>
+            <a:r>
+              <a:rPr lang="en" dirty="0">
+                <a:ln>
+                  <a:solidFill>
+                    <a:schemeClr val="tx1"/>
+                  </a:solidFill>
+                </a:ln>
+                <a:latin typeface="Roboto"/>
+                <a:ea typeface="Roboto"/>
+                <a:cs typeface="Roboto"/>
+                <a:sym typeface="Roboto"/>
+              </a:rPr>
+              <a:t>View Request</a:t>
+            </a:r>
+            <a:endParaRPr dirty="0">
+              <a:ln>
+                <a:solidFill>
+                  <a:schemeClr val="tx1"/>
+                </a:solidFill>
+              </a:ln>
+              <a:latin typeface="Roboto"/>
+              <a:ea typeface="Roboto"/>
+              <a:cs typeface="Roboto"/>
+              <a:sym typeface="Roboto"/>
+            </a:endParaRPr>
+          </a:p>
+        </p:txBody>
+      </p:sp>
       <p:pic>
         <p:nvPicPr>
-          <p:cNvPr id="2050" name="Picture 2"/>
-          <p:cNvPicPr>
-            <a:picLocks noGrp="1" noChangeAspect="1" noChangeArrowheads="1"/>
-          </p:cNvPicPr>
-          <p:nvPr>
-            <p:ph idx="1"/>
-          </p:nvPr>
+          <p:cNvPr id="36" name="Google Shape;891;p34"/>
+          <p:cNvPicPr preferRelativeResize="0"/>
+          <p:nvPr/>
         </p:nvPicPr>
         <p:blipFill>
           <a:blip r:embed="rId2">
+            <a:alphaModFix/>
+            <a:biLevel thresh="75000"/>
+          </a:blip>
+          <a:stretch>
+            <a:fillRect/>
+          </a:stretch>
+        </p:blipFill>
+        <p:spPr>
+          <a:xfrm>
+            <a:off x="1560458" y="4485352"/>
+            <a:ext cx="572700" cy="572700"/>
+          </a:xfrm>
+          <a:prstGeom prst="rect">
+            <a:avLst/>
+          </a:prstGeom>
+          <a:noFill/>
+          <a:ln>
+            <a:noFill/>
+          </a:ln>
+        </p:spPr>
+      </p:pic>
+      <p:sp>
+        <p:nvSpPr>
+          <p:cNvPr id="37" name="Google Shape;896;p34"/>
+          <p:cNvSpPr txBox="1"/>
+          <p:nvPr/>
+        </p:nvSpPr>
+        <p:spPr>
+          <a:xfrm>
+            <a:off x="1262316" y="2642835"/>
+            <a:ext cx="1685100" cy="461635"/>
+          </a:xfrm>
+          <a:prstGeom prst="rect">
+            <a:avLst/>
+          </a:prstGeom>
+          <a:noFill/>
+          <a:ln>
+            <a:noFill/>
+          </a:ln>
+        </p:spPr>
+        <p:txBody>
+          <a:bodyPr spcFirstLastPara="1" wrap="square" lIns="91425" tIns="91425" rIns="91425" bIns="91425" anchor="t" anchorCtr="0">
+            <a:spAutoFit/>
+          </a:bodyPr>
+          <a:lstStyle/>
+          <a:p>
+            <a:pPr marL="0" lvl="0" indent="0" algn="ctr" rtl="0">
+              <a:spcBef>
+                <a:spcPts val="0"/>
+              </a:spcBef>
+              <a:spcAft>
+                <a:spcPts val="0"/>
+              </a:spcAft>
+              <a:buNone/>
+            </a:pPr>
+            <a:r>
+              <a:rPr lang="en" dirty="0">
+                <a:ln>
+                  <a:solidFill>
+                    <a:schemeClr val="tx1"/>
+                  </a:solidFill>
+                </a:ln>
+                <a:latin typeface="Roboto"/>
+                <a:ea typeface="Roboto"/>
+                <a:cs typeface="Roboto"/>
+                <a:sym typeface="Roboto"/>
+              </a:rPr>
+              <a:t>Update View</a:t>
+            </a:r>
+            <a:endParaRPr dirty="0">
+              <a:ln>
+                <a:solidFill>
+                  <a:schemeClr val="tx1"/>
+                </a:solidFill>
+              </a:ln>
+              <a:latin typeface="Roboto"/>
+              <a:ea typeface="Roboto"/>
+              <a:cs typeface="Roboto"/>
+              <a:sym typeface="Roboto"/>
+            </a:endParaRPr>
+          </a:p>
+        </p:txBody>
+      </p:sp>
+      <p:sp>
+        <p:nvSpPr>
+          <p:cNvPr id="38" name="Google Shape;897;p34"/>
+          <p:cNvSpPr txBox="1">
+            <a:spLocks/>
+          </p:cNvSpPr>
+          <p:nvPr/>
+        </p:nvSpPr>
+        <p:spPr>
+          <a:xfrm>
+            <a:off x="818907" y="5503353"/>
+            <a:ext cx="1685100" cy="572700"/>
+          </a:xfrm>
+          <a:prstGeom prst="rect">
+            <a:avLst/>
+          </a:prstGeom>
+          <a:ln>
+            <a:noFill/>
+          </a:ln>
+        </p:spPr>
+        <p:txBody>
+          <a:bodyPr spcFirstLastPara="1" vert="horz" wrap="square" lIns="91425" tIns="91425" rIns="91425" bIns="91425" rtlCol="0" anchor="t" anchorCtr="0">
+            <a:noAutofit/>
+          </a:bodyPr>
+          <a:lstStyle>
+            <a:lvl1pPr algn="l" defTabSz="914400" rtl="0" eaLnBrk="1" latinLnBrk="0" hangingPunct="1">
+              <a:spcBef>
+                <a:spcPct val="0"/>
+              </a:spcBef>
+              <a:buNone/>
+              <a:defRPr sz="4000" kern="1200" spc="-100" baseline="0">
+                <a:solidFill>
+                  <a:schemeClr val="tx2"/>
+                </a:solidFill>
+                <a:latin typeface="+mj-lt"/>
+                <a:ea typeface="+mj-ea"/>
+                <a:cs typeface="+mj-cs"/>
+              </a:defRPr>
+            </a:lvl1pPr>
+          </a:lstStyle>
+          <a:p>
+            <a:pPr algn="ctr">
+              <a:spcBef>
+                <a:spcPts val="0"/>
+              </a:spcBef>
+            </a:pPr>
+            <a:r>
+              <a:rPr lang="en-US" sz="2800" dirty="0" smtClean="0">
+                <a:ln>
+                  <a:solidFill>
+                    <a:schemeClr val="tx1"/>
+                  </a:solidFill>
+                </a:ln>
+                <a:solidFill>
+                  <a:srgbClr val="FF0000"/>
+                </a:solidFill>
+              </a:rPr>
+              <a:t>View</a:t>
+            </a:r>
+            <a:endParaRPr lang="en-US" dirty="0">
+              <a:ln>
+                <a:solidFill>
+                  <a:schemeClr val="tx1"/>
+                </a:solidFill>
+              </a:ln>
+              <a:solidFill>
+                <a:srgbClr val="FF0000"/>
+              </a:solidFill>
+            </a:endParaRPr>
+          </a:p>
+        </p:txBody>
+      </p:sp>
+      <p:sp>
+        <p:nvSpPr>
+          <p:cNvPr id="39" name="Google Shape;898;p34"/>
+          <p:cNvSpPr txBox="1">
+            <a:spLocks/>
+          </p:cNvSpPr>
+          <p:nvPr/>
+        </p:nvSpPr>
+        <p:spPr>
+          <a:xfrm>
+            <a:off x="4161027" y="5495891"/>
+            <a:ext cx="1685100" cy="572700"/>
+          </a:xfrm>
+          <a:prstGeom prst="rect">
+            <a:avLst/>
+          </a:prstGeom>
+          <a:ln>
+            <a:noFill/>
+          </a:ln>
+        </p:spPr>
+        <p:txBody>
+          <a:bodyPr spcFirstLastPara="1" vert="horz" wrap="square" lIns="91425" tIns="91425" rIns="91425" bIns="91425" rtlCol="0" anchor="t" anchorCtr="0">
+            <a:noAutofit/>
+          </a:bodyPr>
+          <a:lstStyle>
+            <a:lvl1pPr algn="l" defTabSz="914400" rtl="0" eaLnBrk="1" latinLnBrk="0" hangingPunct="1">
+              <a:spcBef>
+                <a:spcPct val="0"/>
+              </a:spcBef>
+              <a:buNone/>
+              <a:defRPr sz="4000" kern="1200" spc="-100" baseline="0">
+                <a:solidFill>
+                  <a:schemeClr val="tx2"/>
+                </a:solidFill>
+                <a:latin typeface="+mj-lt"/>
+                <a:ea typeface="+mj-ea"/>
+                <a:cs typeface="+mj-cs"/>
+              </a:defRPr>
+            </a:lvl1pPr>
+          </a:lstStyle>
+          <a:p>
+            <a:pPr algn="ctr">
+              <a:spcBef>
+                <a:spcPts val="0"/>
+              </a:spcBef>
+            </a:pPr>
+            <a:r>
+              <a:rPr lang="en-US" sz="2800" dirty="0" smtClean="0">
+                <a:ln>
+                  <a:solidFill>
+                    <a:schemeClr val="tx1"/>
+                  </a:solidFill>
+                </a:ln>
+                <a:solidFill>
+                  <a:srgbClr val="FF0000"/>
+                </a:solidFill>
+              </a:rPr>
+              <a:t>Controller</a:t>
+            </a:r>
+            <a:endParaRPr lang="en-US" dirty="0">
+              <a:ln>
+                <a:solidFill>
+                  <a:schemeClr val="tx1"/>
+                </a:solidFill>
+              </a:ln>
+              <a:solidFill>
+                <a:srgbClr val="FF0000"/>
+              </a:solidFill>
+            </a:endParaRPr>
+          </a:p>
+        </p:txBody>
+      </p:sp>
+      <p:sp>
+        <p:nvSpPr>
+          <p:cNvPr id="40" name="Google Shape;899;p34"/>
+          <p:cNvSpPr txBox="1">
+            <a:spLocks/>
+          </p:cNvSpPr>
+          <p:nvPr/>
+        </p:nvSpPr>
+        <p:spPr>
+          <a:xfrm>
+            <a:off x="6898807" y="5480520"/>
+            <a:ext cx="1685100" cy="572700"/>
+          </a:xfrm>
+          <a:prstGeom prst="rect">
+            <a:avLst/>
+          </a:prstGeom>
+          <a:ln>
+            <a:noFill/>
+          </a:ln>
+        </p:spPr>
+        <p:txBody>
+          <a:bodyPr spcFirstLastPara="1" vert="horz" wrap="square" lIns="91425" tIns="91425" rIns="91425" bIns="91425" rtlCol="0" anchor="t" anchorCtr="0">
+            <a:noAutofit/>
+          </a:bodyPr>
+          <a:lstStyle>
+            <a:lvl1pPr algn="l" defTabSz="914400" rtl="0" eaLnBrk="1" latinLnBrk="0" hangingPunct="1">
+              <a:spcBef>
+                <a:spcPct val="0"/>
+              </a:spcBef>
+              <a:buNone/>
+              <a:defRPr sz="4000" kern="1200" spc="-100" baseline="0">
+                <a:solidFill>
+                  <a:schemeClr val="tx2"/>
+                </a:solidFill>
+                <a:latin typeface="+mj-lt"/>
+                <a:ea typeface="+mj-ea"/>
+                <a:cs typeface="+mj-cs"/>
+              </a:defRPr>
+            </a:lvl1pPr>
+          </a:lstStyle>
+          <a:p>
+            <a:pPr algn="ctr">
+              <a:spcBef>
+                <a:spcPts val="0"/>
+              </a:spcBef>
+            </a:pPr>
+            <a:r>
+              <a:rPr lang="en-US" sz="2800" dirty="0" smtClean="0">
+                <a:ln>
+                  <a:solidFill>
+                    <a:schemeClr val="tx1"/>
+                  </a:solidFill>
+                </a:ln>
+                <a:solidFill>
+                  <a:srgbClr val="FF0000"/>
+                </a:solidFill>
+              </a:rPr>
+              <a:t>Model</a:t>
+            </a:r>
+            <a:endParaRPr lang="en-US" dirty="0">
+              <a:ln>
+                <a:solidFill>
+                  <a:schemeClr val="tx1"/>
+                </a:solidFill>
+              </a:ln>
+              <a:solidFill>
+                <a:srgbClr val="FF0000"/>
+              </a:solidFill>
+            </a:endParaRPr>
+          </a:p>
+        </p:txBody>
+      </p:sp>
+      <p:pic>
+        <p:nvPicPr>
+          <p:cNvPr id="41" name="Google Shape;900;p34"/>
+          <p:cNvPicPr preferRelativeResize="0"/>
+          <p:nvPr/>
+        </p:nvPicPr>
+        <p:blipFill>
+          <a:blip r:embed="rId3">
+            <a:alphaModFix/>
+            <a:biLevel thresh="75000"/>
+            <a:extLst>
+              <a:ext uri="{BEBA8EAE-BF5A-486C-A8C5-ECC9F3942E4B}">
+                <a14:imgProps xmlns:a14="http://schemas.microsoft.com/office/drawing/2010/main">
+                  <a14:imgLayer r:embed="rId4">
+                    <a14:imgEffect>
+                      <a14:saturation sat="0"/>
+                    </a14:imgEffect>
+                  </a14:imgLayer>
+                </a14:imgProps>
+              </a:ext>
+            </a:extLst>
+          </a:blip>
+          <a:stretch>
+            <a:fillRect/>
+          </a:stretch>
+        </p:blipFill>
+        <p:spPr>
+          <a:xfrm>
+            <a:off x="6568507" y="2182455"/>
+            <a:ext cx="691200" cy="691200"/>
+          </a:xfrm>
+          <a:prstGeom prst="rect">
+            <a:avLst/>
+          </a:prstGeom>
+          <a:noFill/>
+          <a:ln>
+            <a:noFill/>
+          </a:ln>
+        </p:spPr>
+      </p:pic>
+      <p:cxnSp>
+        <p:nvCxnSpPr>
+          <p:cNvPr id="42" name="Google Shape;901;p34"/>
+          <p:cNvCxnSpPr>
+            <a:endCxn id="41" idx="0"/>
+          </p:cNvCxnSpPr>
+          <p:nvPr/>
+        </p:nvCxnSpPr>
+        <p:spPr>
+          <a:xfrm flipV="1">
+            <a:off x="4261882" y="2182455"/>
+            <a:ext cx="2652225" cy="1559013"/>
+          </a:xfrm>
+          <a:prstGeom prst="bentConnector4">
+            <a:avLst>
+              <a:gd name="adj1" fmla="val 44"/>
+              <a:gd name="adj2" fmla="val 114663"/>
+            </a:avLst>
+          </a:prstGeom>
+          <a:noFill/>
+          <a:ln w="28575" cap="flat" cmpd="sng">
+            <a:solidFill>
+              <a:schemeClr val="tx1"/>
+            </a:solidFill>
+            <a:prstDash val="solid"/>
+            <a:round/>
+            <a:headEnd type="none" w="med" len="med"/>
+            <a:tailEnd type="stealth" w="med" len="med"/>
+          </a:ln>
+        </p:spPr>
+      </p:cxnSp>
+      <p:sp>
+        <p:nvSpPr>
+          <p:cNvPr id="43" name="Google Shape;903;p34"/>
+          <p:cNvSpPr txBox="1"/>
+          <p:nvPr/>
+        </p:nvSpPr>
+        <p:spPr>
+          <a:xfrm>
+            <a:off x="751866" y="1973923"/>
+            <a:ext cx="2706000" cy="461635"/>
+          </a:xfrm>
+          <a:prstGeom prst="rect">
+            <a:avLst/>
+          </a:prstGeom>
+          <a:noFill/>
+          <a:ln>
+            <a:noFill/>
+          </a:ln>
+        </p:spPr>
+        <p:txBody>
+          <a:bodyPr spcFirstLastPara="1" wrap="square" lIns="91425" tIns="91425" rIns="91425" bIns="91425" anchor="t" anchorCtr="0">
+            <a:spAutoFit/>
+          </a:bodyPr>
+          <a:lstStyle/>
+          <a:p>
+            <a:pPr marL="0" lvl="0" indent="0" algn="ctr" rtl="0">
+              <a:spcBef>
+                <a:spcPts val="0"/>
+              </a:spcBef>
+              <a:spcAft>
+                <a:spcPts val="0"/>
+              </a:spcAft>
+              <a:buNone/>
+            </a:pPr>
+            <a:r>
+              <a:rPr lang="en" dirty="0" smtClean="0">
+                <a:ln>
+                  <a:solidFill>
+                    <a:schemeClr val="tx1"/>
+                  </a:solidFill>
+                </a:ln>
+                <a:latin typeface="Roboto"/>
+                <a:ea typeface="Roboto"/>
+                <a:cs typeface="Roboto"/>
+                <a:sym typeface="Roboto"/>
+              </a:rPr>
+              <a:t>HTTP Fetch Request</a:t>
+            </a:r>
+            <a:endParaRPr dirty="0">
+              <a:ln>
+                <a:solidFill>
+                  <a:schemeClr val="tx1"/>
+                </a:solidFill>
+              </a:ln>
+              <a:latin typeface="Roboto"/>
+              <a:ea typeface="Roboto"/>
+              <a:cs typeface="Roboto"/>
+              <a:sym typeface="Roboto"/>
+            </a:endParaRPr>
+          </a:p>
+        </p:txBody>
+      </p:sp>
+      <p:cxnSp>
+        <p:nvCxnSpPr>
+          <p:cNvPr id="44" name="Google Shape;906;p34"/>
+          <p:cNvCxnSpPr>
+            <a:stCxn id="41" idx="2"/>
+          </p:cNvCxnSpPr>
+          <p:nvPr/>
+        </p:nvCxnSpPr>
+        <p:spPr>
+          <a:xfrm rot="16200000" flipH="1">
+            <a:off x="6989096" y="2798665"/>
+            <a:ext cx="1158897" cy="1308875"/>
+          </a:xfrm>
+          <a:prstGeom prst="bentConnector3">
+            <a:avLst>
+              <a:gd name="adj1" fmla="val 119726"/>
+            </a:avLst>
+          </a:prstGeom>
+          <a:noFill/>
+          <a:ln w="19050" cap="flat" cmpd="sng">
+            <a:solidFill>
+              <a:schemeClr val="tx1"/>
+            </a:solidFill>
+            <a:prstDash val="solid"/>
+            <a:round/>
+            <a:headEnd type="stealth" w="med" len="med"/>
+            <a:tailEnd type="none" w="med" len="med"/>
+          </a:ln>
+        </p:spPr>
+      </p:cxnSp>
+      <p:sp>
+        <p:nvSpPr>
+          <p:cNvPr id="45" name="Google Shape;908;p34"/>
+          <p:cNvSpPr txBox="1"/>
+          <p:nvPr/>
+        </p:nvSpPr>
+        <p:spPr>
+          <a:xfrm>
+            <a:off x="6667207" y="4235680"/>
+            <a:ext cx="1555800" cy="461635"/>
+          </a:xfrm>
+          <a:prstGeom prst="rect">
+            <a:avLst/>
+          </a:prstGeom>
+          <a:noFill/>
+          <a:ln>
+            <a:noFill/>
+          </a:ln>
+        </p:spPr>
+        <p:txBody>
+          <a:bodyPr spcFirstLastPara="1" wrap="square" lIns="91425" tIns="91425" rIns="91425" bIns="91425" anchor="t" anchorCtr="0">
+            <a:spAutoFit/>
+          </a:bodyPr>
+          <a:lstStyle/>
+          <a:p>
+            <a:pPr marL="0" lvl="0" indent="0" algn="ctr" rtl="0">
+              <a:spcBef>
+                <a:spcPts val="0"/>
+              </a:spcBef>
+              <a:spcAft>
+                <a:spcPts val="0"/>
+              </a:spcAft>
+              <a:buNone/>
+            </a:pPr>
+            <a:r>
+              <a:rPr lang="en" dirty="0">
+                <a:ln>
+                  <a:solidFill>
+                    <a:schemeClr val="tx1"/>
+                  </a:solidFill>
+                </a:ln>
+                <a:latin typeface="Roboto"/>
+                <a:ea typeface="Roboto"/>
+                <a:cs typeface="Roboto"/>
+                <a:sym typeface="Roboto"/>
+              </a:rPr>
+              <a:t>Send Data</a:t>
+            </a:r>
+            <a:endParaRPr dirty="0">
+              <a:ln>
+                <a:solidFill>
+                  <a:schemeClr val="tx1"/>
+                </a:solidFill>
+              </a:ln>
+              <a:latin typeface="Roboto"/>
+              <a:ea typeface="Roboto"/>
+              <a:cs typeface="Roboto"/>
+              <a:sym typeface="Roboto"/>
+            </a:endParaRPr>
+          </a:p>
+        </p:txBody>
+      </p:sp>
+      <p:sp>
+        <p:nvSpPr>
+          <p:cNvPr id="46" name="Google Shape;909;p34"/>
+          <p:cNvSpPr txBox="1"/>
+          <p:nvPr/>
+        </p:nvSpPr>
+        <p:spPr>
+          <a:xfrm>
+            <a:off x="4443940" y="4116035"/>
+            <a:ext cx="1555800" cy="738633"/>
+          </a:xfrm>
+          <a:prstGeom prst="rect">
+            <a:avLst/>
+          </a:prstGeom>
+          <a:noFill/>
+          <a:ln>
+            <a:noFill/>
+          </a:ln>
+        </p:spPr>
+        <p:txBody>
+          <a:bodyPr spcFirstLastPara="1" wrap="square" lIns="91425" tIns="91425" rIns="91425" bIns="91425" anchor="t" anchorCtr="0">
+            <a:spAutoFit/>
+          </a:bodyPr>
+          <a:lstStyle/>
+          <a:p>
+            <a:pPr marL="0" lvl="0" indent="0" algn="ctr" rtl="0">
+              <a:spcBef>
+                <a:spcPts val="0"/>
+              </a:spcBef>
+              <a:spcAft>
+                <a:spcPts val="0"/>
+              </a:spcAft>
+              <a:buNone/>
+            </a:pPr>
+            <a:r>
+              <a:rPr lang="en" dirty="0">
+                <a:ln>
+                  <a:solidFill>
+                    <a:schemeClr val="tx1"/>
+                  </a:solidFill>
+                </a:ln>
+                <a:latin typeface="Roboto"/>
+                <a:ea typeface="Roboto"/>
+                <a:cs typeface="Roboto"/>
+                <a:sym typeface="Roboto"/>
+              </a:rPr>
+              <a:t>JSON Response</a:t>
+            </a:r>
+            <a:endParaRPr dirty="0">
+              <a:ln>
+                <a:solidFill>
+                  <a:schemeClr val="tx1"/>
+                </a:solidFill>
+              </a:ln>
+              <a:latin typeface="Roboto"/>
+              <a:ea typeface="Roboto"/>
+              <a:cs typeface="Roboto"/>
+              <a:sym typeface="Roboto"/>
+            </a:endParaRPr>
+          </a:p>
+        </p:txBody>
+      </p:sp>
+      <p:pic>
+        <p:nvPicPr>
+          <p:cNvPr id="47" name="Picture 10" descr="Express.js Node.js JavaScript MongoDB, node js, text, trademark, logo png |  PNGWing"/>
+          <p:cNvPicPr>
+            <a:picLocks noChangeAspect="1" noChangeArrowheads="1"/>
+          </p:cNvPicPr>
+          <p:nvPr/>
+        </p:nvPicPr>
+        <p:blipFill>
+          <a:blip r:embed="rId5" cstate="print">
             <a:extLst>
               <a:ext uri="{28A0092B-C50C-407E-A947-70E740481C1C}">
                 <a14:useLocalDpi xmlns:a14="http://schemas.microsoft.com/office/drawing/2010/main" val="0"/>
@@ -3814,8 +4519,100 @@
         </p:blipFill>
         <p:spPr bwMode="auto">
           <a:xfrm>
-            <a:off x="457200" y="1794164"/>
-            <a:ext cx="8229600" cy="4488872"/>
+            <a:off x="3788674" y="3754532"/>
+            <a:ext cx="565827" cy="565827"/>
+          </a:xfrm>
+          <a:prstGeom prst="rect">
+            <a:avLst/>
+          </a:prstGeom>
+          <a:noFill/>
+          <a:extLst>
+            <a:ext uri="{909E8E84-426E-40DD-AFC4-6F175D3DCCD1}">
+              <a14:hiddenFill xmlns:a14="http://schemas.microsoft.com/office/drawing/2010/main">
+                <a:solidFill>
+                  <a:srgbClr val="FFFFFF"/>
+                </a:solidFill>
+              </a14:hiddenFill>
+            </a:ext>
+          </a:extLst>
+        </p:spPr>
+      </p:pic>
+      <p:sp>
+        <p:nvSpPr>
+          <p:cNvPr id="48" name="Google Shape;892;p34"/>
+          <p:cNvSpPr txBox="1"/>
+          <p:nvPr/>
+        </p:nvSpPr>
+        <p:spPr>
+          <a:xfrm>
+            <a:off x="4105385" y="1497282"/>
+            <a:ext cx="2042511" cy="461635"/>
+          </a:xfrm>
+          <a:prstGeom prst="rect">
+            <a:avLst/>
+          </a:prstGeom>
+          <a:noFill/>
+          <a:ln>
+            <a:noFill/>
+          </a:ln>
+        </p:spPr>
+        <p:txBody>
+          <a:bodyPr spcFirstLastPara="1" wrap="square" lIns="91425" tIns="91425" rIns="91425" bIns="91425" anchor="t" anchorCtr="0">
+            <a:spAutoFit/>
+          </a:bodyPr>
+          <a:lstStyle/>
+          <a:p>
+            <a:pPr marL="0" lvl="0" indent="0" algn="ctr" rtl="0">
+              <a:spcBef>
+                <a:spcPts val="0"/>
+              </a:spcBef>
+              <a:spcAft>
+                <a:spcPts val="0"/>
+              </a:spcAft>
+              <a:buNone/>
+            </a:pPr>
+            <a:r>
+              <a:rPr lang="en" dirty="0" smtClean="0">
+                <a:ln>
+                  <a:solidFill>
+                    <a:schemeClr val="tx1"/>
+                  </a:solidFill>
+                </a:ln>
+                <a:latin typeface="Roboto"/>
+                <a:ea typeface="Roboto"/>
+                <a:cs typeface="Roboto"/>
+                <a:sym typeface="Roboto"/>
+              </a:rPr>
+              <a:t>Route Handler</a:t>
+            </a:r>
+          </a:p>
+        </p:txBody>
+      </p:sp>
+      <p:pic>
+        <p:nvPicPr>
+          <p:cNvPr id="49" name="Picture 2"/>
+          <p:cNvPicPr>
+            <a:picLocks noChangeAspect="1" noChangeArrowheads="1"/>
+          </p:cNvPicPr>
+          <p:nvPr/>
+        </p:nvPicPr>
+        <p:blipFill>
+          <a:blip r:embed="rId6" cstate="print">
+            <a:extLst>
+              <a:ext uri="{28A0092B-C50C-407E-A947-70E740481C1C}">
+                <a14:useLocalDpi xmlns:a14="http://schemas.microsoft.com/office/drawing/2010/main" val="0"/>
+              </a:ext>
+            </a:extLst>
+          </a:blip>
+          <a:srcRect/>
+          <a:stretch>
+            <a:fillRect/>
+          </a:stretch>
+        </p:blipFill>
+        <p:spPr bwMode="auto">
+          <a:xfrm>
+            <a:off x="7537375" y="3147110"/>
+            <a:ext cx="1188720" cy="1188720"/>
           </a:xfrm>
           <a:prstGeom prst="rect">
             <a:avLst/>
@@ -3855,6 +4652,478 @@
           </a:extLst>
         </p:spPr>
       </p:pic>
+      <p:pic>
+        <p:nvPicPr>
+          <p:cNvPr id="50" name="Content Placeholder 42"/>
+          <p:cNvPicPr>
+            <a:picLocks noGrp="1" noChangeAspect="1"/>
+          </p:cNvPicPr>
+          <p:nvPr>
+            <p:ph idx="1"/>
+          </p:nvPr>
+        </p:nvPicPr>
+        <p:blipFill>
+          <a:blip r:embed="rId7" cstate="print">
+            <a:extLst>
+              <a:ext uri="{28A0092B-C50C-407E-A947-70E740481C1C}">
+                <a14:useLocalDpi xmlns:a14="http://schemas.microsoft.com/office/drawing/2010/main" val="0"/>
+              </a:ext>
+            </a:extLst>
+          </a:blip>
+          <a:stretch>
+            <a:fillRect/>
+          </a:stretch>
+        </p:blipFill>
+        <p:spPr>
+          <a:xfrm>
+            <a:off x="7141855" y="2829763"/>
+            <a:ext cx="1027651" cy="488607"/>
+          </a:xfrm>
+          <a:prstGeom prst="rect">
+            <a:avLst/>
+          </a:prstGeom>
+        </p:spPr>
+      </p:pic>
+      <p:cxnSp>
+        <p:nvCxnSpPr>
+          <p:cNvPr id="51" name="Google Shape;904;p34"/>
+          <p:cNvCxnSpPr>
+            <a:stCxn id="41" idx="3"/>
+          </p:cNvCxnSpPr>
+          <p:nvPr/>
+        </p:nvCxnSpPr>
+        <p:spPr>
+          <a:xfrm>
+            <a:off x="7259707" y="2528055"/>
+            <a:ext cx="963300" cy="1092025"/>
+          </a:xfrm>
+          <a:prstGeom prst="bentConnector2">
+            <a:avLst/>
+          </a:prstGeom>
+          <a:noFill/>
+          <a:ln w="19050" cap="flat" cmpd="sng">
+            <a:solidFill>
+              <a:schemeClr val="tx1"/>
+            </a:solidFill>
+            <a:prstDash val="solid"/>
+            <a:round/>
+            <a:headEnd type="none" w="med" len="med"/>
+            <a:tailEnd type="stealth" w="med" len="med"/>
+          </a:ln>
+        </p:spPr>
+      </p:cxnSp>
+      <p:sp>
+        <p:nvSpPr>
+          <p:cNvPr id="52" name="Google Shape;905;p34"/>
+          <p:cNvSpPr txBox="1"/>
+          <p:nvPr/>
+        </p:nvSpPr>
+        <p:spPr>
+          <a:xfrm>
+            <a:off x="7077456" y="1813111"/>
+            <a:ext cx="1555800" cy="738633"/>
+          </a:xfrm>
+          <a:prstGeom prst="rect">
+            <a:avLst/>
+          </a:prstGeom>
+          <a:noFill/>
+          <a:ln>
+            <a:noFill/>
+          </a:ln>
+        </p:spPr>
+        <p:txBody>
+          <a:bodyPr spcFirstLastPara="1" wrap="square" lIns="91425" tIns="91425" rIns="91425" bIns="91425" anchor="t" anchorCtr="0">
+            <a:spAutoFit/>
+          </a:bodyPr>
+          <a:lstStyle/>
+          <a:p>
+            <a:pPr marL="0" lvl="0" indent="0" algn="ctr" rtl="0">
+              <a:spcBef>
+                <a:spcPts val="0"/>
+              </a:spcBef>
+              <a:spcAft>
+                <a:spcPts val="0"/>
+              </a:spcAft>
+              <a:buNone/>
+            </a:pPr>
+            <a:r>
+              <a:rPr lang="en" dirty="0" smtClean="0">
+                <a:ln>
+                  <a:solidFill>
+                    <a:schemeClr val="tx1"/>
+                  </a:solidFill>
+                </a:ln>
+                <a:latin typeface="Roboto"/>
+                <a:ea typeface="Roboto"/>
+                <a:cs typeface="Roboto"/>
+                <a:sym typeface="Roboto"/>
+              </a:rPr>
+              <a:t>Query for data</a:t>
+            </a:r>
+            <a:endParaRPr dirty="0">
+              <a:ln>
+                <a:solidFill>
+                  <a:schemeClr val="tx1"/>
+                </a:solidFill>
+              </a:ln>
+              <a:latin typeface="Roboto"/>
+              <a:ea typeface="Roboto"/>
+              <a:cs typeface="Roboto"/>
+              <a:sym typeface="Roboto"/>
+            </a:endParaRPr>
+          </a:p>
+        </p:txBody>
+      </p:sp>
+      <p:pic>
+        <p:nvPicPr>
+          <p:cNvPr id="53" name="Picture 52"/>
+          <p:cNvPicPr>
+            <a:picLocks noChangeAspect="1"/>
+          </p:cNvPicPr>
+          <p:nvPr/>
+        </p:nvPicPr>
+        <p:blipFill>
+          <a:blip r:embed="rId8" cstate="print">
+            <a:extLst>
+              <a:ext uri="{28A0092B-C50C-407E-A947-70E740481C1C}">
+                <a14:useLocalDpi xmlns:a14="http://schemas.microsoft.com/office/drawing/2010/main" val="0"/>
+              </a:ext>
+            </a:extLst>
+          </a:blip>
+          <a:stretch>
+            <a:fillRect/>
+          </a:stretch>
+        </p:blipFill>
+        <p:spPr>
+          <a:xfrm>
+            <a:off x="360676" y="2847473"/>
+            <a:ext cx="893995" cy="893995"/>
+          </a:xfrm>
+          <a:prstGeom prst="rect">
+            <a:avLst/>
+          </a:prstGeom>
+        </p:spPr>
+      </p:pic>
+      <p:cxnSp>
+        <p:nvCxnSpPr>
+          <p:cNvPr id="54" name="Elbow Connector 53"/>
+          <p:cNvCxnSpPr/>
+          <p:nvPr/>
+        </p:nvCxnSpPr>
+        <p:spPr>
+          <a:xfrm rot="16200000" flipV="1">
+            <a:off x="679391" y="3938049"/>
+            <a:ext cx="887548" cy="630983"/>
+          </a:xfrm>
+          <a:prstGeom prst="bentConnector3">
+            <a:avLst>
+              <a:gd name="adj1" fmla="val -482"/>
+            </a:avLst>
+          </a:prstGeom>
+          <a:ln w="28575">
+            <a:solidFill>
+              <a:schemeClr val="tx1"/>
+            </a:solidFill>
+            <a:tailEnd type="arrow"/>
+          </a:ln>
+        </p:spPr>
+        <p:style>
+          <a:lnRef idx="1">
+            <a:schemeClr val="accent1"/>
+          </a:lnRef>
+          <a:fillRef idx="0">
+            <a:schemeClr val="accent1"/>
+          </a:fillRef>
+          <a:effectRef idx="0">
+            <a:schemeClr val="accent1"/>
+          </a:effectRef>
+          <a:fontRef idx="minor">
+            <a:schemeClr val="tx1"/>
+          </a:fontRef>
+        </p:style>
+      </p:cxnSp>
+      <p:cxnSp>
+        <p:nvCxnSpPr>
+          <p:cNvPr id="55" name="Elbow Connector 54"/>
+          <p:cNvCxnSpPr/>
+          <p:nvPr/>
+        </p:nvCxnSpPr>
+        <p:spPr>
+          <a:xfrm rot="16200000" flipH="1">
+            <a:off x="1147724" y="3636745"/>
+            <a:ext cx="813677" cy="584492"/>
+          </a:xfrm>
+          <a:prstGeom prst="bentConnector3">
+            <a:avLst>
+              <a:gd name="adj1" fmla="val -1694"/>
+            </a:avLst>
+          </a:prstGeom>
+          <a:ln w="28575">
+            <a:solidFill>
+              <a:schemeClr val="tx1"/>
+            </a:solidFill>
+            <a:tailEnd type="arrow"/>
+          </a:ln>
+        </p:spPr>
+        <p:style>
+          <a:lnRef idx="1">
+            <a:schemeClr val="accent1"/>
+          </a:lnRef>
+          <a:fillRef idx="0">
+            <a:schemeClr val="accent1"/>
+          </a:fillRef>
+          <a:effectRef idx="0">
+            <a:schemeClr val="accent1"/>
+          </a:effectRef>
+          <a:fontRef idx="minor">
+            <a:schemeClr val="tx1"/>
+          </a:fontRef>
+        </p:style>
+      </p:cxnSp>
+      <p:sp>
+        <p:nvSpPr>
+          <p:cNvPr id="56" name="Google Shape;896;p34"/>
+          <p:cNvSpPr txBox="1"/>
+          <p:nvPr/>
+        </p:nvSpPr>
+        <p:spPr>
+          <a:xfrm>
+            <a:off x="1838388" y="3612099"/>
+            <a:ext cx="1685100" cy="738633"/>
+          </a:xfrm>
+          <a:prstGeom prst="rect">
+            <a:avLst/>
+          </a:prstGeom>
+          <a:noFill/>
+          <a:ln>
+            <a:noFill/>
+          </a:ln>
+        </p:spPr>
+        <p:txBody>
+          <a:bodyPr spcFirstLastPara="1" wrap="square" lIns="91425" tIns="91425" rIns="91425" bIns="91425" anchor="t" anchorCtr="0">
+            <a:spAutoFit/>
+          </a:bodyPr>
+          <a:lstStyle/>
+          <a:p>
+            <a:pPr marL="0" lvl="0" indent="0" algn="ctr" rtl="0">
+              <a:spcBef>
+                <a:spcPts val="0"/>
+              </a:spcBef>
+              <a:spcAft>
+                <a:spcPts val="0"/>
+              </a:spcAft>
+              <a:buNone/>
+            </a:pPr>
+            <a:r>
+              <a:rPr lang="en" dirty="0" smtClean="0">
+                <a:ln>
+                  <a:solidFill>
+                    <a:schemeClr val="tx1"/>
+                  </a:solidFill>
+                </a:ln>
+                <a:latin typeface="Roboto"/>
+                <a:ea typeface="Roboto"/>
+                <a:cs typeface="Roboto"/>
+                <a:sym typeface="Roboto"/>
+              </a:rPr>
+              <a:t>Render Updated View</a:t>
+            </a:r>
+            <a:endParaRPr dirty="0">
+              <a:ln>
+                <a:solidFill>
+                  <a:schemeClr val="tx1"/>
+                </a:solidFill>
+              </a:ln>
+              <a:latin typeface="Roboto"/>
+              <a:ea typeface="Roboto"/>
+              <a:cs typeface="Roboto"/>
+              <a:sym typeface="Roboto"/>
+            </a:endParaRPr>
+          </a:p>
+        </p:txBody>
+      </p:sp>
+      <p:pic>
+        <p:nvPicPr>
+          <p:cNvPr id="57" name="Picture 2"/>
+          <p:cNvPicPr>
+            <a:picLocks noChangeAspect="1" noChangeArrowheads="1"/>
+          </p:cNvPicPr>
+          <p:nvPr/>
+        </p:nvPicPr>
+        <p:blipFill>
+          <a:blip r:embed="rId9" cstate="print">
+            <a:extLst>
+              <a:ext uri="{28A0092B-C50C-407E-A947-70E740481C1C}">
+                <a14:useLocalDpi xmlns:a14="http://schemas.microsoft.com/office/drawing/2010/main" val="0"/>
+              </a:ext>
+            </a:extLst>
+          </a:blip>
+          <a:srcRect/>
+          <a:stretch>
+            <a:fillRect/>
+          </a:stretch>
+        </p:blipFill>
+        <p:spPr bwMode="auto">
+          <a:xfrm>
+            <a:off x="2211474" y="4817553"/>
+            <a:ext cx="685800" cy="685800"/>
+          </a:xfrm>
+          <a:prstGeom prst="rect">
+            <a:avLst/>
+          </a:prstGeom>
+          <a:noFill/>
+          <a:ln>
+            <a:noFill/>
+          </a:ln>
+          <a:effectLst/>
+          <a:extLst>
+            <a:ext uri="{909E8E84-426E-40DD-AFC4-6F175D3DCCD1}">
+              <a14:hiddenFill xmlns:a14="http://schemas.microsoft.com/office/drawing/2010/main">
+                <a:solidFill>
+                  <a:schemeClr val="accent1"/>
+                </a:solidFill>
+              </a14:hiddenFill>
+            </a:ext>
+            <a:ext uri="{91240B29-F687-4F45-9708-019B960494DF}">
+              <a14:hiddenLine xmlns:a14="http://schemas.microsoft.com/office/drawing/2010/main" w="9525">
+                <a:solidFill>
+                  <a:schemeClr val="tx1"/>
+                </a:solidFill>
+                <a:miter lim="800000"/>
+                <a:headEnd/>
+                <a:tailEnd/>
+              </a14:hiddenLine>
+            </a:ext>
+            <a:ext uri="{AF507438-7753-43E0-B8FC-AC1667EBCBE1}">
+              <a14:hiddenEffects xmlns:a14="http://schemas.microsoft.com/office/drawing/2010/main">
+                <a:effectLst>
+                  <a:outerShdw dist="35921" dir="2700000" algn="ctr" rotWithShape="0">
+                    <a:schemeClr val="bg2"/>
+                  </a:outerShdw>
+                </a:effectLst>
+              </a14:hiddenEffects>
+            </a:ext>
+          </a:extLst>
+        </p:spPr>
+      </p:pic>
+      <p:cxnSp>
+        <p:nvCxnSpPr>
+          <p:cNvPr id="58" name="Elbow Connector 57"/>
+          <p:cNvCxnSpPr>
+            <a:stCxn id="41" idx="1"/>
+            <a:endCxn id="47" idx="3"/>
+          </p:cNvCxnSpPr>
+          <p:nvPr/>
+        </p:nvCxnSpPr>
+        <p:spPr>
+          <a:xfrm rot="10800000" flipV="1">
+            <a:off x="4354501" y="2528054"/>
+            <a:ext cx="2214006" cy="1509391"/>
+          </a:xfrm>
+          <a:prstGeom prst="bentConnector3">
+            <a:avLst/>
+          </a:prstGeom>
+          <a:ln w="28575">
+            <a:solidFill>
+              <a:schemeClr val="tx1"/>
+            </a:solidFill>
+            <a:tailEnd type="arrow"/>
+          </a:ln>
+        </p:spPr>
+        <p:style>
+          <a:lnRef idx="1">
+            <a:schemeClr val="accent1"/>
+          </a:lnRef>
+          <a:fillRef idx="0">
+            <a:schemeClr val="accent1"/>
+          </a:fillRef>
+          <a:effectRef idx="0">
+            <a:schemeClr val="accent1"/>
+          </a:effectRef>
+          <a:fontRef idx="minor">
+            <a:schemeClr val="tx1"/>
+          </a:fontRef>
+        </p:style>
+      </p:cxnSp>
+      <p:cxnSp>
+        <p:nvCxnSpPr>
+          <p:cNvPr id="59" name="Elbow Connector 58"/>
+          <p:cNvCxnSpPr/>
+          <p:nvPr/>
+        </p:nvCxnSpPr>
+        <p:spPr>
+          <a:xfrm rot="10800000">
+            <a:off x="1254672" y="3147110"/>
+            <a:ext cx="2698585" cy="594358"/>
+          </a:xfrm>
+          <a:prstGeom prst="bentConnector3">
+            <a:avLst>
+              <a:gd name="adj1" fmla="val 190"/>
+            </a:avLst>
+          </a:prstGeom>
+          <a:ln w="28575">
+            <a:solidFill>
+              <a:schemeClr val="tx1"/>
+            </a:solidFill>
+            <a:tailEnd type="arrow"/>
+          </a:ln>
+        </p:spPr>
+        <p:style>
+          <a:lnRef idx="1">
+            <a:schemeClr val="accent1"/>
+          </a:lnRef>
+          <a:fillRef idx="0">
+            <a:schemeClr val="accent1"/>
+          </a:fillRef>
+          <a:effectRef idx="0">
+            <a:schemeClr val="accent1"/>
+          </a:effectRef>
+          <a:fontRef idx="minor">
+            <a:schemeClr val="tx1"/>
+          </a:fontRef>
+        </p:style>
+      </p:cxnSp>
+      <p:cxnSp>
+        <p:nvCxnSpPr>
+          <p:cNvPr id="60" name="Elbow Connector 59"/>
+          <p:cNvCxnSpPr>
+            <a:stCxn id="53" idx="0"/>
+            <a:endCxn id="47" idx="0"/>
+          </p:cNvCxnSpPr>
+          <p:nvPr/>
+        </p:nvCxnSpPr>
+        <p:spPr>
+          <a:xfrm rot="16200000" flipH="1">
+            <a:off x="1986101" y="1669045"/>
+            <a:ext cx="907059" cy="3263914"/>
+          </a:xfrm>
+          <a:prstGeom prst="bentConnector3">
+            <a:avLst>
+              <a:gd name="adj1" fmla="val -40323"/>
+            </a:avLst>
+          </a:prstGeom>
+          <a:ln w="28575">
+            <a:solidFill>
+              <a:schemeClr val="tx1"/>
+            </a:solidFill>
+            <a:tailEnd type="arrow"/>
+          </a:ln>
+        </p:spPr>
+        <p:style>
+          <a:lnRef idx="1">
+            <a:schemeClr val="accent1"/>
+          </a:lnRef>
+          <a:fillRef idx="0">
+            <a:schemeClr val="accent1"/>
+          </a:fillRef>
+          <a:effectRef idx="0">
+            <a:schemeClr val="accent1"/>
+          </a:effectRef>
+          <a:fontRef idx="minor">
+            <a:schemeClr val="tx1"/>
+          </a:fontRef>
+        </p:style>
+      </p:cxnSp>
     </p:spTree>
     <p:extLst>
       <p:ext uri="{BB962C8B-B14F-4D97-AF65-F5344CB8AC3E}">
@@ -3964,7 +5233,6 @@
               <a:rPr lang="en-US" dirty="0" smtClean="0"/>
               <a:t>.</a:t>
             </a:r>
-            <a:endParaRPr lang="en-US" dirty="0" smtClean="0"/>
           </a:p>
           <a:p>
             <a:pPr>
@@ -4020,7 +5288,6 @@
               <a:rPr lang="en-US" dirty="0" smtClean="0"/>
               <a:t>the components.</a:t>
             </a:r>
-            <a:endParaRPr lang="en-US" dirty="0" smtClean="0"/>
           </a:p>
         </p:txBody>
       </p:sp>
@@ -4772,1625 +6039,6 @@
     <p:extLst>
       <p:ext uri="{BB962C8B-B14F-4D97-AF65-F5344CB8AC3E}">
         <p14:creationId xmlns:p14="http://schemas.microsoft.com/office/powerpoint/2010/main" val="1122042934"/>
-      </p:ext>
-    </p:extLst>
-  </p:cSld>
-  <p:clrMapOvr>
-    <a:masterClrMapping/>
-  </p:clrMapOvr>
-</p:sld>
-</file>
-
-<file path=ppt/slides/slide9.xml><?xml version="1.0" encoding="utf-8"?>
-<p:sld xmlns:a="http://schemas.openxmlformats.org/drawingml/2006/main" xmlns:r="http://schemas.openxmlformats.org/officeDocument/2006/relationships" xmlns:p="http://schemas.openxmlformats.org/presentationml/2006/main">
-  <p:cSld>
-    <p:spTree>
-      <p:nvGrpSpPr>
-        <p:cNvPr id="1" name=""/>
-        <p:cNvGrpSpPr/>
-        <p:nvPr/>
-      </p:nvGrpSpPr>
-      <p:grpSpPr>
-        <a:xfrm>
-          <a:off x="0" y="0"/>
-          <a:ext cx="0" cy="0"/>
-          <a:chOff x="0" y="0"/>
-          <a:chExt cx="0" cy="0"/>
-        </a:xfrm>
-      </p:grpSpPr>
-      <p:sp>
-        <p:nvSpPr>
-          <p:cNvPr id="2" name="Title 1"/>
-          <p:cNvSpPr>
-            <a:spLocks noGrp="1"/>
-          </p:cNvSpPr>
-          <p:nvPr>
-            <p:ph type="title"/>
-          </p:nvPr>
-        </p:nvSpPr>
-        <p:spPr/>
-        <p:txBody>
-          <a:bodyPr>
-            <a:noAutofit/>
-          </a:bodyPr>
-          <a:lstStyle/>
-          <a:p>
-            <a:r>
-              <a:rPr lang="en-US" sz="3200" dirty="0" smtClean="0"/>
-              <a:t>Spare Slide – Modify the Diagram Here if Needed and then Copy at Appropriate Slide</a:t>
-            </a:r>
-            <a:endParaRPr lang="en-US" sz="3200" dirty="0"/>
-          </a:p>
-        </p:txBody>
-      </p:sp>
-      <p:sp>
-        <p:nvSpPr>
-          <p:cNvPr id="3" name="Content Placeholder 2"/>
-          <p:cNvSpPr>
-            <a:spLocks noGrp="1"/>
-          </p:cNvSpPr>
-          <p:nvPr>
-            <p:ph idx="1"/>
-          </p:nvPr>
-        </p:nvSpPr>
-        <p:spPr/>
-        <p:txBody>
-          <a:bodyPr/>
-          <a:lstStyle/>
-          <a:p>
-            <a:pPr marL="0" indent="0">
-              <a:buNone/>
-            </a:pPr>
-            <a:endParaRPr lang="en-US" dirty="0"/>
-          </a:p>
-        </p:txBody>
-      </p:sp>
-      <p:cxnSp>
-        <p:nvCxnSpPr>
-          <p:cNvPr id="4" name="Google Shape;887;p34"/>
-          <p:cNvCxnSpPr/>
-          <p:nvPr/>
-        </p:nvCxnSpPr>
-        <p:spPr>
-          <a:xfrm flipH="1">
-            <a:off x="2971800" y="2246764"/>
-            <a:ext cx="16500" cy="3701700"/>
-          </a:xfrm>
-          <a:prstGeom prst="straightConnector1">
-            <a:avLst/>
-          </a:prstGeom>
-          <a:noFill/>
-          <a:ln w="19050" cap="flat" cmpd="sng">
-            <a:solidFill>
-              <a:schemeClr val="tx1"/>
-            </a:solidFill>
-            <a:prstDash val="dash"/>
-            <a:round/>
-            <a:headEnd type="none" w="med" len="med"/>
-            <a:tailEnd type="none" w="med" len="med"/>
-          </a:ln>
-        </p:spPr>
-      </p:cxnSp>
-      <p:cxnSp>
-        <p:nvCxnSpPr>
-          <p:cNvPr id="5" name="Google Shape;888;p34"/>
-          <p:cNvCxnSpPr/>
-          <p:nvPr/>
-        </p:nvCxnSpPr>
-        <p:spPr>
-          <a:xfrm>
-            <a:off x="6445476" y="2153314"/>
-            <a:ext cx="7500" cy="3782400"/>
-          </a:xfrm>
-          <a:prstGeom prst="straightConnector1">
-            <a:avLst/>
-          </a:prstGeom>
-          <a:noFill/>
-          <a:ln w="19050" cap="flat" cmpd="sng">
-            <a:solidFill>
-              <a:schemeClr val="tx1"/>
-            </a:solidFill>
-            <a:prstDash val="dash"/>
-            <a:round/>
-            <a:headEnd type="none" w="med" len="med"/>
-            <a:tailEnd type="none" w="med" len="med"/>
-          </a:ln>
-        </p:spPr>
-      </p:cxnSp>
-      <p:sp>
-        <p:nvSpPr>
-          <p:cNvPr id="6" name="Google Shape;889;p34"/>
-          <p:cNvSpPr txBox="1"/>
-          <p:nvPr/>
-        </p:nvSpPr>
-        <p:spPr>
-          <a:xfrm>
-            <a:off x="397740" y="3766714"/>
-            <a:ext cx="1446900" cy="738633"/>
-          </a:xfrm>
-          <a:prstGeom prst="rect">
-            <a:avLst/>
-          </a:prstGeom>
-          <a:noFill/>
-          <a:ln>
-            <a:noFill/>
-          </a:ln>
-        </p:spPr>
-        <p:txBody>
-          <a:bodyPr spcFirstLastPara="1" wrap="square" lIns="91425" tIns="91425" rIns="91425" bIns="91425" anchor="t" anchorCtr="0">
-            <a:spAutoFit/>
-          </a:bodyPr>
-          <a:lstStyle/>
-          <a:p>
-            <a:pPr marL="0" lvl="0" indent="0" algn="l" rtl="0">
-              <a:spcBef>
-                <a:spcPts val="0"/>
-              </a:spcBef>
-              <a:spcAft>
-                <a:spcPts val="0"/>
-              </a:spcAft>
-              <a:buNone/>
-            </a:pPr>
-            <a:r>
-              <a:rPr lang="en" dirty="0">
-                <a:ln>
-                  <a:solidFill>
-                    <a:schemeClr val="tx1"/>
-                  </a:solidFill>
-                </a:ln>
-                <a:latin typeface="Roboto"/>
-                <a:ea typeface="Roboto"/>
-                <a:cs typeface="Roboto"/>
-                <a:sym typeface="Roboto"/>
-              </a:rPr>
-              <a:t>React</a:t>
-            </a:r>
-            <a:endParaRPr dirty="0">
-              <a:ln>
-                <a:solidFill>
-                  <a:schemeClr val="tx1"/>
-                </a:solidFill>
-              </a:ln>
-              <a:latin typeface="Roboto"/>
-              <a:ea typeface="Roboto"/>
-              <a:cs typeface="Roboto"/>
-              <a:sym typeface="Roboto"/>
-            </a:endParaRPr>
-          </a:p>
-          <a:p>
-            <a:pPr marL="0" lvl="0" indent="0" algn="l" rtl="0">
-              <a:spcBef>
-                <a:spcPts val="0"/>
-              </a:spcBef>
-              <a:spcAft>
-                <a:spcPts val="0"/>
-              </a:spcAft>
-              <a:buNone/>
-            </a:pPr>
-            <a:r>
-              <a:rPr lang="en" dirty="0">
-                <a:ln>
-                  <a:solidFill>
-                    <a:schemeClr val="tx1"/>
-                  </a:solidFill>
-                </a:ln>
-                <a:latin typeface="Roboto"/>
-                <a:ea typeface="Roboto"/>
-                <a:cs typeface="Roboto"/>
-                <a:sym typeface="Roboto"/>
-              </a:rPr>
-              <a:t>Pages</a:t>
-            </a:r>
-            <a:endParaRPr dirty="0">
-              <a:ln>
-                <a:solidFill>
-                  <a:schemeClr val="tx1"/>
-                </a:solidFill>
-              </a:ln>
-              <a:latin typeface="Roboto"/>
-              <a:ea typeface="Roboto"/>
-              <a:cs typeface="Roboto"/>
-              <a:sym typeface="Roboto"/>
-            </a:endParaRPr>
-          </a:p>
-        </p:txBody>
-      </p:sp>
-      <p:cxnSp>
-        <p:nvCxnSpPr>
-          <p:cNvPr id="7" name="Google Shape;890;p34"/>
-          <p:cNvCxnSpPr>
-            <a:stCxn id="11" idx="0"/>
-          </p:cNvCxnSpPr>
-          <p:nvPr/>
-        </p:nvCxnSpPr>
-        <p:spPr>
-          <a:xfrm rot="16200000">
-            <a:off x="2246166" y="1393614"/>
-            <a:ext cx="400500" cy="3259200"/>
-          </a:xfrm>
-          <a:prstGeom prst="bentConnector2">
-            <a:avLst/>
-          </a:prstGeom>
-          <a:noFill/>
-          <a:ln w="19050" cap="flat" cmpd="sng">
-            <a:solidFill>
-              <a:schemeClr val="tx1"/>
-            </a:solidFill>
-            <a:prstDash val="solid"/>
-            <a:round/>
-            <a:headEnd type="none" w="med" len="med"/>
-            <a:tailEnd type="stealth" w="med" len="med"/>
-          </a:ln>
-        </p:spPr>
-      </p:cxnSp>
-      <p:sp>
-        <p:nvSpPr>
-          <p:cNvPr id="8" name="Google Shape;892;p34"/>
-          <p:cNvSpPr txBox="1"/>
-          <p:nvPr/>
-        </p:nvSpPr>
-        <p:spPr>
-          <a:xfrm>
-            <a:off x="1106624" y="2139958"/>
-            <a:ext cx="1555800" cy="738633"/>
-          </a:xfrm>
-          <a:prstGeom prst="rect">
-            <a:avLst/>
-          </a:prstGeom>
-          <a:noFill/>
-          <a:ln>
-            <a:noFill/>
-          </a:ln>
-        </p:spPr>
-        <p:txBody>
-          <a:bodyPr spcFirstLastPara="1" wrap="square" lIns="91425" tIns="91425" rIns="91425" bIns="91425" anchor="t" anchorCtr="0">
-            <a:spAutoFit/>
-          </a:bodyPr>
-          <a:lstStyle/>
-          <a:p>
-            <a:pPr marL="0" lvl="0" indent="0" algn="ctr" rtl="0">
-              <a:spcBef>
-                <a:spcPts val="0"/>
-              </a:spcBef>
-              <a:spcAft>
-                <a:spcPts val="0"/>
-              </a:spcAft>
-              <a:buNone/>
-            </a:pPr>
-            <a:r>
-              <a:rPr lang="en" dirty="0">
-                <a:ln>
-                  <a:solidFill>
-                    <a:schemeClr val="tx1"/>
-                  </a:solidFill>
-                </a:ln>
-                <a:latin typeface="Roboto"/>
-                <a:ea typeface="Roboto"/>
-                <a:cs typeface="Roboto"/>
-                <a:sym typeface="Roboto"/>
-              </a:rPr>
-              <a:t>View Request</a:t>
-            </a:r>
-            <a:endParaRPr dirty="0">
-              <a:ln>
-                <a:solidFill>
-                  <a:schemeClr val="tx1"/>
-                </a:solidFill>
-              </a:ln>
-              <a:latin typeface="Roboto"/>
-              <a:ea typeface="Roboto"/>
-              <a:cs typeface="Roboto"/>
-              <a:sym typeface="Roboto"/>
-            </a:endParaRPr>
-          </a:p>
-        </p:txBody>
-      </p:sp>
-      <p:sp>
-        <p:nvSpPr>
-          <p:cNvPr id="9" name="Google Shape;893;p34"/>
-          <p:cNvSpPr txBox="1"/>
-          <p:nvPr/>
-        </p:nvSpPr>
-        <p:spPr>
-          <a:xfrm>
-            <a:off x="3849126" y="2966414"/>
-            <a:ext cx="951474" cy="461635"/>
-          </a:xfrm>
-          <a:prstGeom prst="rect">
-            <a:avLst/>
-          </a:prstGeom>
-          <a:noFill/>
-          <a:ln>
-            <a:noFill/>
-          </a:ln>
-        </p:spPr>
-        <p:txBody>
-          <a:bodyPr spcFirstLastPara="1" wrap="square" lIns="91425" tIns="91425" rIns="91425" bIns="91425" anchor="t" anchorCtr="0">
-            <a:spAutoFit/>
-          </a:bodyPr>
-          <a:lstStyle/>
-          <a:p>
-            <a:pPr marL="0" lvl="0" indent="0" algn="ctr" rtl="0">
-              <a:spcBef>
-                <a:spcPts val="0"/>
-              </a:spcBef>
-              <a:spcAft>
-                <a:spcPts val="0"/>
-              </a:spcAft>
-              <a:buNone/>
-            </a:pPr>
-            <a:r>
-              <a:rPr lang="en" dirty="0">
-                <a:ln>
-                  <a:solidFill>
-                    <a:schemeClr val="tx1"/>
-                  </a:solidFill>
-                </a:ln>
-                <a:latin typeface="Roboto"/>
-                <a:ea typeface="Roboto"/>
-                <a:cs typeface="Roboto"/>
-                <a:sym typeface="Roboto"/>
-              </a:rPr>
-              <a:t>Server</a:t>
-            </a:r>
-            <a:endParaRPr dirty="0">
-              <a:ln>
-                <a:solidFill>
-                  <a:schemeClr val="tx1"/>
-                </a:solidFill>
-              </a:ln>
-              <a:latin typeface="Roboto"/>
-              <a:ea typeface="Roboto"/>
-              <a:cs typeface="Roboto"/>
-              <a:sym typeface="Roboto"/>
-            </a:endParaRPr>
-          </a:p>
-        </p:txBody>
-      </p:sp>
-      <p:pic>
-        <p:nvPicPr>
-          <p:cNvPr id="10" name="Google Shape;894;p34"/>
-          <p:cNvPicPr preferRelativeResize="0"/>
-          <p:nvPr/>
-        </p:nvPicPr>
-        <p:blipFill>
-          <a:blip r:embed="rId2">
-            <a:alphaModFix/>
-            <a:biLevel thresh="75000"/>
-          </a:blip>
-          <a:stretch>
-            <a:fillRect/>
-          </a:stretch>
-        </p:blipFill>
-        <p:spPr>
-          <a:xfrm>
-            <a:off x="7886526" y="3194014"/>
-            <a:ext cx="691200" cy="691200"/>
-          </a:xfrm>
-          <a:prstGeom prst="rect">
-            <a:avLst/>
-          </a:prstGeom>
-          <a:noFill/>
-          <a:ln>
-            <a:noFill/>
-          </a:ln>
-        </p:spPr>
-      </p:pic>
-      <p:pic>
-        <p:nvPicPr>
-          <p:cNvPr id="11" name="Google Shape;891;p34"/>
-          <p:cNvPicPr preferRelativeResize="0"/>
-          <p:nvPr/>
-        </p:nvPicPr>
-        <p:blipFill>
-          <a:blip r:embed="rId3">
-            <a:alphaModFix/>
-            <a:biLevel thresh="75000"/>
-          </a:blip>
-          <a:stretch>
-            <a:fillRect/>
-          </a:stretch>
-        </p:blipFill>
-        <p:spPr>
-          <a:xfrm>
-            <a:off x="530466" y="3223464"/>
-            <a:ext cx="572700" cy="572700"/>
-          </a:xfrm>
-          <a:prstGeom prst="rect">
-            <a:avLst/>
-          </a:prstGeom>
-          <a:noFill/>
-          <a:ln>
-            <a:noFill/>
-          </a:ln>
-        </p:spPr>
-      </p:pic>
-      <p:cxnSp>
-        <p:nvCxnSpPr>
-          <p:cNvPr id="12" name="Google Shape;895;p34"/>
-          <p:cNvCxnSpPr>
-            <a:endCxn id="9" idx="1"/>
-          </p:cNvCxnSpPr>
-          <p:nvPr/>
-        </p:nvCxnSpPr>
-        <p:spPr>
-          <a:xfrm flipV="1">
-            <a:off x="1271460" y="3197232"/>
-            <a:ext cx="2577666" cy="289749"/>
-          </a:xfrm>
-          <a:prstGeom prst="bentConnector3">
-            <a:avLst>
-              <a:gd name="adj1" fmla="val 72703"/>
-            </a:avLst>
-          </a:prstGeom>
-          <a:noFill/>
-          <a:ln w="19050" cap="flat" cmpd="sng">
-            <a:solidFill>
-              <a:schemeClr val="tx1"/>
-            </a:solidFill>
-            <a:prstDash val="solid"/>
-            <a:round/>
-            <a:headEnd type="stealth" w="med" len="med"/>
-            <a:tailEnd type="none" w="med" len="med"/>
-          </a:ln>
-        </p:spPr>
-      </p:cxnSp>
-      <p:sp>
-        <p:nvSpPr>
-          <p:cNvPr id="13" name="Google Shape;896;p34"/>
-          <p:cNvSpPr txBox="1"/>
-          <p:nvPr/>
-        </p:nvSpPr>
-        <p:spPr>
-          <a:xfrm>
-            <a:off x="1271460" y="2930682"/>
-            <a:ext cx="1685100" cy="461635"/>
-          </a:xfrm>
-          <a:prstGeom prst="rect">
-            <a:avLst/>
-          </a:prstGeom>
-          <a:noFill/>
-          <a:ln>
-            <a:noFill/>
-          </a:ln>
-        </p:spPr>
-        <p:txBody>
-          <a:bodyPr spcFirstLastPara="1" wrap="square" lIns="91425" tIns="91425" rIns="91425" bIns="91425" anchor="t" anchorCtr="0">
-            <a:spAutoFit/>
-          </a:bodyPr>
-          <a:lstStyle/>
-          <a:p>
-            <a:pPr marL="0" lvl="0" indent="0" algn="ctr" rtl="0">
-              <a:spcBef>
-                <a:spcPts val="0"/>
-              </a:spcBef>
-              <a:spcAft>
-                <a:spcPts val="0"/>
-              </a:spcAft>
-              <a:buNone/>
-            </a:pPr>
-            <a:r>
-              <a:rPr lang="en" dirty="0">
-                <a:ln>
-                  <a:solidFill>
-                    <a:schemeClr val="tx1"/>
-                  </a:solidFill>
-                </a:ln>
-                <a:latin typeface="Roboto"/>
-                <a:ea typeface="Roboto"/>
-                <a:cs typeface="Roboto"/>
-                <a:sym typeface="Roboto"/>
-              </a:rPr>
-              <a:t>Update View</a:t>
-            </a:r>
-            <a:endParaRPr dirty="0">
-              <a:ln>
-                <a:solidFill>
-                  <a:schemeClr val="tx1"/>
-                </a:solidFill>
-              </a:ln>
-              <a:latin typeface="Roboto"/>
-              <a:ea typeface="Roboto"/>
-              <a:cs typeface="Roboto"/>
-              <a:sym typeface="Roboto"/>
-            </a:endParaRPr>
-          </a:p>
-        </p:txBody>
-      </p:sp>
-      <p:sp>
-        <p:nvSpPr>
-          <p:cNvPr id="14" name="Google Shape;897;p34"/>
-          <p:cNvSpPr txBox="1">
-            <a:spLocks/>
-          </p:cNvSpPr>
-          <p:nvPr/>
-        </p:nvSpPr>
-        <p:spPr>
-          <a:xfrm>
-            <a:off x="828051" y="5791200"/>
-            <a:ext cx="1685100" cy="572700"/>
-          </a:xfrm>
-          <a:prstGeom prst="rect">
-            <a:avLst/>
-          </a:prstGeom>
-          <a:ln>
-            <a:noFill/>
-          </a:ln>
-        </p:spPr>
-        <p:txBody>
-          <a:bodyPr spcFirstLastPara="1" vert="horz" wrap="square" lIns="91425" tIns="91425" rIns="91425" bIns="91425" rtlCol="0" anchor="t" anchorCtr="0">
-            <a:noAutofit/>
-          </a:bodyPr>
-          <a:lstStyle>
-            <a:lvl1pPr algn="l" defTabSz="914400" rtl="0" eaLnBrk="1" latinLnBrk="0" hangingPunct="1">
-              <a:spcBef>
-                <a:spcPct val="0"/>
-              </a:spcBef>
-              <a:buNone/>
-              <a:defRPr sz="4000" kern="1200" spc="-100" baseline="0">
-                <a:solidFill>
-                  <a:schemeClr val="tx2"/>
-                </a:solidFill>
-                <a:latin typeface="+mj-lt"/>
-                <a:ea typeface="+mj-ea"/>
-                <a:cs typeface="+mj-cs"/>
-              </a:defRPr>
-            </a:lvl1pPr>
-          </a:lstStyle>
-          <a:p>
-            <a:pPr algn="ctr">
-              <a:spcBef>
-                <a:spcPts val="0"/>
-              </a:spcBef>
-            </a:pPr>
-            <a:r>
-              <a:rPr lang="en-US" sz="2800" dirty="0" smtClean="0">
-                <a:ln>
-                  <a:solidFill>
-                    <a:schemeClr val="tx1"/>
-                  </a:solidFill>
-                </a:ln>
-                <a:solidFill>
-                  <a:schemeClr val="tx1"/>
-                </a:solidFill>
-              </a:rPr>
-              <a:t>View</a:t>
-            </a:r>
-            <a:endParaRPr lang="en-US" dirty="0">
-              <a:ln>
-                <a:solidFill>
-                  <a:schemeClr val="tx1"/>
-                </a:solidFill>
-              </a:ln>
-              <a:solidFill>
-                <a:schemeClr val="tx1"/>
-              </a:solidFill>
-            </a:endParaRPr>
-          </a:p>
-        </p:txBody>
-      </p:sp>
-      <p:sp>
-        <p:nvSpPr>
-          <p:cNvPr id="15" name="Google Shape;898;p34"/>
-          <p:cNvSpPr txBox="1">
-            <a:spLocks/>
-          </p:cNvSpPr>
-          <p:nvPr/>
-        </p:nvSpPr>
-        <p:spPr>
-          <a:xfrm>
-            <a:off x="3824742" y="5791200"/>
-            <a:ext cx="1685100" cy="572700"/>
-          </a:xfrm>
-          <a:prstGeom prst="rect">
-            <a:avLst/>
-          </a:prstGeom>
-          <a:ln>
-            <a:noFill/>
-          </a:ln>
-        </p:spPr>
-        <p:txBody>
-          <a:bodyPr spcFirstLastPara="1" vert="horz" wrap="square" lIns="91425" tIns="91425" rIns="91425" bIns="91425" rtlCol="0" anchor="t" anchorCtr="0">
-            <a:noAutofit/>
-          </a:bodyPr>
-          <a:lstStyle>
-            <a:lvl1pPr algn="l" defTabSz="914400" rtl="0" eaLnBrk="1" latinLnBrk="0" hangingPunct="1">
-              <a:spcBef>
-                <a:spcPct val="0"/>
-              </a:spcBef>
-              <a:buNone/>
-              <a:defRPr sz="4000" kern="1200" spc="-100" baseline="0">
-                <a:solidFill>
-                  <a:schemeClr val="tx2"/>
-                </a:solidFill>
-                <a:latin typeface="+mj-lt"/>
-                <a:ea typeface="+mj-ea"/>
-                <a:cs typeface="+mj-cs"/>
-              </a:defRPr>
-            </a:lvl1pPr>
-          </a:lstStyle>
-          <a:p>
-            <a:pPr algn="ctr">
-              <a:spcBef>
-                <a:spcPts val="0"/>
-              </a:spcBef>
-            </a:pPr>
-            <a:r>
-              <a:rPr lang="en-US" sz="2800" dirty="0" smtClean="0">
-                <a:ln>
-                  <a:solidFill>
-                    <a:schemeClr val="tx1"/>
-                  </a:solidFill>
-                </a:ln>
-                <a:solidFill>
-                  <a:schemeClr val="tx1"/>
-                </a:solidFill>
-              </a:rPr>
-              <a:t>Controller</a:t>
-            </a:r>
-            <a:endParaRPr lang="en-US" dirty="0">
-              <a:ln>
-                <a:solidFill>
-                  <a:schemeClr val="tx1"/>
-                </a:solidFill>
-              </a:ln>
-              <a:solidFill>
-                <a:schemeClr val="tx1"/>
-              </a:solidFill>
-            </a:endParaRPr>
-          </a:p>
-        </p:txBody>
-      </p:sp>
-      <p:sp>
-        <p:nvSpPr>
-          <p:cNvPr id="16" name="Google Shape;899;p34"/>
-          <p:cNvSpPr txBox="1">
-            <a:spLocks/>
-          </p:cNvSpPr>
-          <p:nvPr/>
-        </p:nvSpPr>
-        <p:spPr>
-          <a:xfrm>
-            <a:off x="6766776" y="5791200"/>
-            <a:ext cx="1685100" cy="572700"/>
-          </a:xfrm>
-          <a:prstGeom prst="rect">
-            <a:avLst/>
-          </a:prstGeom>
-          <a:ln>
-            <a:noFill/>
-          </a:ln>
-        </p:spPr>
-        <p:txBody>
-          <a:bodyPr spcFirstLastPara="1" vert="horz" wrap="square" lIns="91425" tIns="91425" rIns="91425" bIns="91425" rtlCol="0" anchor="t" anchorCtr="0">
-            <a:noAutofit/>
-          </a:bodyPr>
-          <a:lstStyle>
-            <a:lvl1pPr algn="l" defTabSz="914400" rtl="0" eaLnBrk="1" latinLnBrk="0" hangingPunct="1">
-              <a:spcBef>
-                <a:spcPct val="0"/>
-              </a:spcBef>
-              <a:buNone/>
-              <a:defRPr sz="4000" kern="1200" spc="-100" baseline="0">
-                <a:solidFill>
-                  <a:schemeClr val="tx2"/>
-                </a:solidFill>
-                <a:latin typeface="+mj-lt"/>
-                <a:ea typeface="+mj-ea"/>
-                <a:cs typeface="+mj-cs"/>
-              </a:defRPr>
-            </a:lvl1pPr>
-          </a:lstStyle>
-          <a:p>
-            <a:pPr algn="ctr">
-              <a:spcBef>
-                <a:spcPts val="0"/>
-              </a:spcBef>
-            </a:pPr>
-            <a:r>
-              <a:rPr lang="en-US" sz="2800" dirty="0" smtClean="0">
-                <a:ln>
-                  <a:solidFill>
-                    <a:schemeClr val="tx1"/>
-                  </a:solidFill>
-                </a:ln>
-                <a:solidFill>
-                  <a:schemeClr val="tx1"/>
-                </a:solidFill>
-              </a:rPr>
-              <a:t>Model</a:t>
-            </a:r>
-            <a:endParaRPr lang="en-US" dirty="0">
-              <a:ln>
-                <a:solidFill>
-                  <a:schemeClr val="tx1"/>
-                </a:solidFill>
-              </a:ln>
-              <a:solidFill>
-                <a:schemeClr val="tx1"/>
-              </a:solidFill>
-            </a:endParaRPr>
-          </a:p>
-        </p:txBody>
-      </p:sp>
-      <p:pic>
-        <p:nvPicPr>
-          <p:cNvPr id="17" name="Google Shape;900;p34"/>
-          <p:cNvPicPr preferRelativeResize="0"/>
-          <p:nvPr/>
-        </p:nvPicPr>
-        <p:blipFill>
-          <a:blip r:embed="rId4">
-            <a:alphaModFix/>
-            <a:biLevel thresh="75000"/>
-            <a:extLst>
-              <a:ext uri="{BEBA8EAE-BF5A-486C-A8C5-ECC9F3942E4B}">
-                <a14:imgProps xmlns:a14="http://schemas.microsoft.com/office/drawing/2010/main">
-                  <a14:imgLayer r:embed="rId5">
-                    <a14:imgEffect>
-                      <a14:saturation sat="0"/>
-                    </a14:imgEffect>
-                  </a14:imgLayer>
-                </a14:imgProps>
-              </a:ext>
-            </a:extLst>
-          </a:blip>
-          <a:stretch>
-            <a:fillRect/>
-          </a:stretch>
-        </p:blipFill>
-        <p:spPr>
-          <a:xfrm>
-            <a:off x="6577651" y="2470302"/>
-            <a:ext cx="691200" cy="691200"/>
-          </a:xfrm>
-          <a:prstGeom prst="rect">
-            <a:avLst/>
-          </a:prstGeom>
-          <a:noFill/>
-          <a:ln>
-            <a:noFill/>
-          </a:ln>
-        </p:spPr>
-      </p:pic>
-      <p:cxnSp>
-        <p:nvCxnSpPr>
-          <p:cNvPr id="18" name="Google Shape;901;p34"/>
-          <p:cNvCxnSpPr>
-            <a:stCxn id="27" idx="0"/>
-            <a:endCxn id="17" idx="0"/>
-          </p:cNvCxnSpPr>
-          <p:nvPr/>
-        </p:nvCxnSpPr>
-        <p:spPr>
-          <a:xfrm rot="16200000">
-            <a:off x="5558176" y="1183126"/>
-            <a:ext cx="78000" cy="2652300"/>
-          </a:xfrm>
-          <a:prstGeom prst="bentConnector3">
-            <a:avLst>
-              <a:gd name="adj1" fmla="val 405256"/>
-            </a:avLst>
-          </a:prstGeom>
-          <a:noFill/>
-          <a:ln w="19050" cap="flat" cmpd="sng">
-            <a:solidFill>
-              <a:schemeClr val="tx1"/>
-            </a:solidFill>
-            <a:prstDash val="solid"/>
-            <a:round/>
-            <a:headEnd type="none" w="med" len="med"/>
-            <a:tailEnd type="stealth" w="med" len="med"/>
-          </a:ln>
-        </p:spPr>
-      </p:cxnSp>
-      <p:sp>
-        <p:nvSpPr>
-          <p:cNvPr id="19" name="Google Shape;903;p34"/>
-          <p:cNvSpPr txBox="1"/>
-          <p:nvPr/>
-        </p:nvSpPr>
-        <p:spPr>
-          <a:xfrm>
-            <a:off x="3743226" y="1806560"/>
-            <a:ext cx="2706000" cy="461635"/>
-          </a:xfrm>
-          <a:prstGeom prst="rect">
-            <a:avLst/>
-          </a:prstGeom>
-          <a:noFill/>
-          <a:ln>
-            <a:noFill/>
-          </a:ln>
-        </p:spPr>
-        <p:txBody>
-          <a:bodyPr spcFirstLastPara="1" wrap="square" lIns="91425" tIns="91425" rIns="91425" bIns="91425" anchor="t" anchorCtr="0">
-            <a:spAutoFit/>
-          </a:bodyPr>
-          <a:lstStyle/>
-          <a:p>
-            <a:pPr marL="0" lvl="0" indent="0" algn="ctr" rtl="0">
-              <a:spcBef>
-                <a:spcPts val="0"/>
-              </a:spcBef>
-              <a:spcAft>
-                <a:spcPts val="0"/>
-              </a:spcAft>
-              <a:buNone/>
-            </a:pPr>
-            <a:r>
-              <a:rPr lang="en" dirty="0">
-                <a:ln>
-                  <a:solidFill>
-                    <a:schemeClr val="tx1"/>
-                  </a:solidFill>
-                </a:ln>
-                <a:latin typeface="Roboto"/>
-                <a:ea typeface="Roboto"/>
-                <a:cs typeface="Roboto"/>
-                <a:sym typeface="Roboto"/>
-              </a:rPr>
-              <a:t>CRUD API Request</a:t>
-            </a:r>
-            <a:endParaRPr dirty="0">
-              <a:ln>
-                <a:solidFill>
-                  <a:schemeClr val="tx1"/>
-                </a:solidFill>
-              </a:ln>
-              <a:latin typeface="Roboto"/>
-              <a:ea typeface="Roboto"/>
-              <a:cs typeface="Roboto"/>
-              <a:sym typeface="Roboto"/>
-            </a:endParaRPr>
-          </a:p>
-        </p:txBody>
-      </p:sp>
-      <p:cxnSp>
-        <p:nvCxnSpPr>
-          <p:cNvPr id="20" name="Google Shape;904;p34"/>
-          <p:cNvCxnSpPr>
-            <a:stCxn id="17" idx="3"/>
-            <a:endCxn id="10" idx="0"/>
-          </p:cNvCxnSpPr>
-          <p:nvPr/>
-        </p:nvCxnSpPr>
-        <p:spPr>
-          <a:xfrm>
-            <a:off x="7268851" y="2815902"/>
-            <a:ext cx="963300" cy="378000"/>
-          </a:xfrm>
-          <a:prstGeom prst="bentConnector2">
-            <a:avLst/>
-          </a:prstGeom>
-          <a:noFill/>
-          <a:ln w="19050" cap="flat" cmpd="sng">
-            <a:solidFill>
-              <a:schemeClr val="tx1"/>
-            </a:solidFill>
-            <a:prstDash val="solid"/>
-            <a:round/>
-            <a:headEnd type="none" w="med" len="med"/>
-            <a:tailEnd type="stealth" w="med" len="med"/>
-          </a:ln>
-        </p:spPr>
-      </p:cxnSp>
-      <p:sp>
-        <p:nvSpPr>
-          <p:cNvPr id="21" name="Google Shape;905;p34"/>
-          <p:cNvSpPr txBox="1"/>
-          <p:nvPr/>
-        </p:nvSpPr>
-        <p:spPr>
-          <a:xfrm>
-            <a:off x="7268851" y="2139957"/>
-            <a:ext cx="1555800" cy="738633"/>
-          </a:xfrm>
-          <a:prstGeom prst="rect">
-            <a:avLst/>
-          </a:prstGeom>
-          <a:noFill/>
-          <a:ln>
-            <a:noFill/>
-          </a:ln>
-        </p:spPr>
-        <p:txBody>
-          <a:bodyPr spcFirstLastPara="1" wrap="square" lIns="91425" tIns="91425" rIns="91425" bIns="91425" anchor="t" anchorCtr="0">
-            <a:spAutoFit/>
-          </a:bodyPr>
-          <a:lstStyle/>
-          <a:p>
-            <a:pPr marL="0" lvl="0" indent="0" algn="ctr" rtl="0">
-              <a:spcBef>
-                <a:spcPts val="0"/>
-              </a:spcBef>
-              <a:spcAft>
-                <a:spcPts val="0"/>
-              </a:spcAft>
-              <a:buNone/>
-            </a:pPr>
-            <a:r>
-              <a:rPr lang="en" dirty="0">
-                <a:ln>
-                  <a:solidFill>
-                    <a:schemeClr val="tx1"/>
-                  </a:solidFill>
-                </a:ln>
-                <a:latin typeface="Roboto"/>
-                <a:ea typeface="Roboto"/>
-                <a:cs typeface="Roboto"/>
-                <a:sym typeface="Roboto"/>
-              </a:rPr>
-              <a:t>Fetch/Update  Data</a:t>
-            </a:r>
-            <a:endParaRPr dirty="0">
-              <a:ln>
-                <a:solidFill>
-                  <a:schemeClr val="tx1"/>
-                </a:solidFill>
-              </a:ln>
-              <a:latin typeface="Roboto"/>
-              <a:ea typeface="Roboto"/>
-              <a:cs typeface="Roboto"/>
-              <a:sym typeface="Roboto"/>
-            </a:endParaRPr>
-          </a:p>
-        </p:txBody>
-      </p:sp>
-      <p:cxnSp>
-        <p:nvCxnSpPr>
-          <p:cNvPr id="22" name="Google Shape;906;p34"/>
-          <p:cNvCxnSpPr>
-            <a:stCxn id="17" idx="2"/>
-            <a:endCxn id="25" idx="2"/>
-          </p:cNvCxnSpPr>
-          <p:nvPr/>
-        </p:nvCxnSpPr>
-        <p:spPr>
-          <a:xfrm rot="16200000" flipH="1">
-            <a:off x="6998240" y="3086512"/>
-            <a:ext cx="1158897" cy="1308875"/>
-          </a:xfrm>
-          <a:prstGeom prst="bentConnector3">
-            <a:avLst>
-              <a:gd name="adj1" fmla="val 119726"/>
-            </a:avLst>
-          </a:prstGeom>
-          <a:noFill/>
-          <a:ln w="19050" cap="flat" cmpd="sng">
-            <a:solidFill>
-              <a:schemeClr val="tx1"/>
-            </a:solidFill>
-            <a:prstDash val="solid"/>
-            <a:round/>
-            <a:headEnd type="stealth" w="med" len="med"/>
-            <a:tailEnd type="none" w="med" len="med"/>
-          </a:ln>
-        </p:spPr>
-      </p:cxnSp>
-      <p:sp>
-        <p:nvSpPr>
-          <p:cNvPr id="23" name="Google Shape;908;p34"/>
-          <p:cNvSpPr txBox="1"/>
-          <p:nvPr/>
-        </p:nvSpPr>
-        <p:spPr>
-          <a:xfrm>
-            <a:off x="6676351" y="4523527"/>
-            <a:ext cx="1555800" cy="461635"/>
-          </a:xfrm>
-          <a:prstGeom prst="rect">
-            <a:avLst/>
-          </a:prstGeom>
-          <a:noFill/>
-          <a:ln>
-            <a:noFill/>
-          </a:ln>
-        </p:spPr>
-        <p:txBody>
-          <a:bodyPr spcFirstLastPara="1" wrap="square" lIns="91425" tIns="91425" rIns="91425" bIns="91425" anchor="t" anchorCtr="0">
-            <a:spAutoFit/>
-          </a:bodyPr>
-          <a:lstStyle/>
-          <a:p>
-            <a:pPr marL="0" lvl="0" indent="0" algn="ctr" rtl="0">
-              <a:spcBef>
-                <a:spcPts val="0"/>
-              </a:spcBef>
-              <a:spcAft>
-                <a:spcPts val="0"/>
-              </a:spcAft>
-              <a:buNone/>
-            </a:pPr>
-            <a:r>
-              <a:rPr lang="en" dirty="0">
-                <a:ln>
-                  <a:solidFill>
-                    <a:schemeClr val="tx1"/>
-                  </a:solidFill>
-                </a:ln>
-                <a:latin typeface="Roboto"/>
-                <a:ea typeface="Roboto"/>
-                <a:cs typeface="Roboto"/>
-                <a:sym typeface="Roboto"/>
-              </a:rPr>
-              <a:t>Send Data</a:t>
-            </a:r>
-            <a:endParaRPr dirty="0">
-              <a:ln>
-                <a:solidFill>
-                  <a:schemeClr val="tx1"/>
-                </a:solidFill>
-              </a:ln>
-              <a:latin typeface="Roboto"/>
-              <a:ea typeface="Roboto"/>
-              <a:cs typeface="Roboto"/>
-              <a:sym typeface="Roboto"/>
-            </a:endParaRPr>
-          </a:p>
-        </p:txBody>
-      </p:sp>
-      <p:sp>
-        <p:nvSpPr>
-          <p:cNvPr id="24" name="Google Shape;909;p34"/>
-          <p:cNvSpPr txBox="1"/>
-          <p:nvPr/>
-        </p:nvSpPr>
-        <p:spPr>
-          <a:xfrm>
-            <a:off x="4769551" y="2793939"/>
-            <a:ext cx="1555800" cy="738633"/>
-          </a:xfrm>
-          <a:prstGeom prst="rect">
-            <a:avLst/>
-          </a:prstGeom>
-          <a:noFill/>
-          <a:ln>
-            <a:noFill/>
-          </a:ln>
-        </p:spPr>
-        <p:txBody>
-          <a:bodyPr spcFirstLastPara="1" wrap="square" lIns="91425" tIns="91425" rIns="91425" bIns="91425" anchor="t" anchorCtr="0">
-            <a:spAutoFit/>
-          </a:bodyPr>
-          <a:lstStyle/>
-          <a:p>
-            <a:pPr marL="0" lvl="0" indent="0" algn="ctr" rtl="0">
-              <a:spcBef>
-                <a:spcPts val="0"/>
-              </a:spcBef>
-              <a:spcAft>
-                <a:spcPts val="0"/>
-              </a:spcAft>
-              <a:buNone/>
-            </a:pPr>
-            <a:r>
-              <a:rPr lang="en" dirty="0">
-                <a:ln>
-                  <a:solidFill>
-                    <a:schemeClr val="tx1"/>
-                  </a:solidFill>
-                </a:ln>
-                <a:latin typeface="Roboto"/>
-                <a:ea typeface="Roboto"/>
-                <a:cs typeface="Roboto"/>
-                <a:sym typeface="Roboto"/>
-              </a:rPr>
-              <a:t>JSON Response</a:t>
-            </a:r>
-            <a:endParaRPr dirty="0">
-              <a:ln>
-                <a:solidFill>
-                  <a:schemeClr val="tx1"/>
-                </a:solidFill>
-              </a:ln>
-              <a:latin typeface="Roboto"/>
-              <a:ea typeface="Roboto"/>
-              <a:cs typeface="Roboto"/>
-              <a:sym typeface="Roboto"/>
-            </a:endParaRPr>
-          </a:p>
-        </p:txBody>
-      </p:sp>
-      <p:sp>
-        <p:nvSpPr>
-          <p:cNvPr id="25" name="Google Shape;907;p34"/>
-          <p:cNvSpPr txBox="1"/>
-          <p:nvPr/>
-        </p:nvSpPr>
-        <p:spPr>
-          <a:xfrm>
-            <a:off x="7609326" y="3858764"/>
-            <a:ext cx="1245600" cy="461635"/>
-          </a:xfrm>
-          <a:prstGeom prst="rect">
-            <a:avLst/>
-          </a:prstGeom>
-          <a:noFill/>
-          <a:ln>
-            <a:noFill/>
-          </a:ln>
-        </p:spPr>
-        <p:txBody>
-          <a:bodyPr spcFirstLastPara="1" wrap="square" lIns="91425" tIns="91425" rIns="91425" bIns="91425" anchor="t" anchorCtr="0">
-            <a:spAutoFit/>
-          </a:bodyPr>
-          <a:lstStyle/>
-          <a:p>
-            <a:pPr marL="0" lvl="0" indent="0" algn="ctr" rtl="0">
-              <a:spcBef>
-                <a:spcPts val="0"/>
-              </a:spcBef>
-              <a:spcAft>
-                <a:spcPts val="0"/>
-              </a:spcAft>
-              <a:buNone/>
-            </a:pPr>
-            <a:r>
-              <a:rPr lang="en" dirty="0" smtClean="0">
-                <a:ln>
-                  <a:solidFill>
-                    <a:schemeClr val="tx1"/>
-                  </a:solidFill>
-                </a:ln>
-                <a:latin typeface="Roboto"/>
-                <a:ea typeface="Roboto"/>
-                <a:cs typeface="Roboto"/>
-                <a:sym typeface="Roboto"/>
-              </a:rPr>
-              <a:t>Database</a:t>
-            </a:r>
-            <a:endParaRPr dirty="0">
-              <a:ln>
-                <a:solidFill>
-                  <a:schemeClr val="tx1"/>
-                </a:solidFill>
-              </a:ln>
-              <a:latin typeface="Roboto"/>
-              <a:ea typeface="Roboto"/>
-              <a:cs typeface="Roboto"/>
-              <a:sym typeface="Roboto"/>
-            </a:endParaRPr>
-          </a:p>
-        </p:txBody>
-      </p:sp>
-      <p:cxnSp>
-        <p:nvCxnSpPr>
-          <p:cNvPr id="26" name="Google Shape;910;p34"/>
-          <p:cNvCxnSpPr>
-            <a:stCxn id="17" idx="1"/>
-            <a:endCxn id="27" idx="3"/>
-          </p:cNvCxnSpPr>
-          <p:nvPr/>
-        </p:nvCxnSpPr>
-        <p:spPr>
-          <a:xfrm rot="10800000">
-            <a:off x="4517251" y="2794602"/>
-            <a:ext cx="2060400" cy="21300"/>
-          </a:xfrm>
-          <a:prstGeom prst="straightConnector1">
-            <a:avLst/>
-          </a:prstGeom>
-          <a:noFill/>
-          <a:ln w="19050" cap="flat" cmpd="sng">
-            <a:solidFill>
-              <a:schemeClr val="tx1"/>
-            </a:solidFill>
-            <a:prstDash val="solid"/>
-            <a:round/>
-            <a:headEnd type="none" w="med" len="med"/>
-            <a:tailEnd type="stealth" w="med" len="med"/>
-          </a:ln>
-        </p:spPr>
-      </p:cxnSp>
-      <p:pic>
-        <p:nvPicPr>
-          <p:cNvPr id="27" name="Google Shape;902;p34"/>
-          <p:cNvPicPr preferRelativeResize="0"/>
-          <p:nvPr/>
-        </p:nvPicPr>
-        <p:blipFill>
-          <a:blip r:embed="rId6">
-            <a:alphaModFix/>
-            <a:biLevel thresh="75000"/>
-          </a:blip>
-          <a:stretch>
-            <a:fillRect/>
-          </a:stretch>
-        </p:blipFill>
-        <p:spPr>
-          <a:xfrm>
-            <a:off x="4024726" y="2548276"/>
-            <a:ext cx="492600" cy="492600"/>
-          </a:xfrm>
-          <a:prstGeom prst="rect">
-            <a:avLst/>
-          </a:prstGeom>
-          <a:noFill/>
-          <a:ln>
-            <a:noFill/>
-          </a:ln>
-        </p:spPr>
-      </p:pic>
-      <p:pic>
-        <p:nvPicPr>
-          <p:cNvPr id="28" name="Google Shape;911;p34"/>
-          <p:cNvPicPr preferRelativeResize="0"/>
-          <p:nvPr/>
-        </p:nvPicPr>
-        <p:blipFill>
-          <a:blip r:embed="rId7">
-            <a:alphaModFix/>
-            <a:duotone>
-              <a:prstClr val="black"/>
-              <a:schemeClr val="tx2">
-                <a:tint val="45000"/>
-                <a:satMod val="400000"/>
-              </a:schemeClr>
-            </a:duotone>
-          </a:blip>
-          <a:stretch>
-            <a:fillRect/>
-          </a:stretch>
-        </p:blipFill>
-        <p:spPr>
-          <a:xfrm>
-            <a:off x="4063591" y="3907927"/>
-            <a:ext cx="615600" cy="615600"/>
-          </a:xfrm>
-          <a:prstGeom prst="rect">
-            <a:avLst/>
-          </a:prstGeom>
-          <a:noFill/>
-          <a:ln>
-            <a:noFill/>
-          </a:ln>
-        </p:spPr>
-      </p:pic>
-      <p:sp>
-        <p:nvSpPr>
-          <p:cNvPr id="29" name="Google Shape;912;p34"/>
-          <p:cNvSpPr txBox="1"/>
-          <p:nvPr/>
-        </p:nvSpPr>
-        <p:spPr>
-          <a:xfrm>
-            <a:off x="3338176" y="4413527"/>
-            <a:ext cx="1865700" cy="738633"/>
-          </a:xfrm>
-          <a:prstGeom prst="rect">
-            <a:avLst/>
-          </a:prstGeom>
-          <a:noFill/>
-          <a:ln>
-            <a:noFill/>
-          </a:ln>
-        </p:spPr>
-        <p:txBody>
-          <a:bodyPr spcFirstLastPara="1" wrap="square" lIns="91425" tIns="91425" rIns="91425" bIns="91425" anchor="t" anchorCtr="0">
-            <a:spAutoFit/>
-          </a:bodyPr>
-          <a:lstStyle/>
-          <a:p>
-            <a:pPr marL="0" lvl="0" indent="0" algn="ctr" rtl="0">
-              <a:spcBef>
-                <a:spcPts val="0"/>
-              </a:spcBef>
-              <a:spcAft>
-                <a:spcPts val="0"/>
-              </a:spcAft>
-              <a:buNone/>
-            </a:pPr>
-            <a:r>
-              <a:rPr lang="en">
-                <a:ln>
-                  <a:solidFill>
-                    <a:schemeClr val="tx1"/>
-                  </a:solidFill>
-                </a:ln>
-                <a:latin typeface="Roboto"/>
-                <a:ea typeface="Roboto"/>
-                <a:cs typeface="Roboto"/>
-                <a:sym typeface="Roboto"/>
-              </a:rPr>
-              <a:t>Notification Service</a:t>
-            </a:r>
-            <a:endParaRPr>
-              <a:ln>
-                <a:solidFill>
-                  <a:schemeClr val="tx1"/>
-                </a:solidFill>
-              </a:ln>
-              <a:latin typeface="Roboto"/>
-              <a:ea typeface="Roboto"/>
-              <a:cs typeface="Roboto"/>
-              <a:sym typeface="Roboto"/>
-            </a:endParaRPr>
-          </a:p>
-        </p:txBody>
-      </p:sp>
-      <p:cxnSp>
-        <p:nvCxnSpPr>
-          <p:cNvPr id="30" name="Google Shape;913;p34"/>
-          <p:cNvCxnSpPr>
-            <a:endCxn id="29" idx="2"/>
-          </p:cNvCxnSpPr>
-          <p:nvPr/>
-        </p:nvCxnSpPr>
-        <p:spPr>
-          <a:xfrm>
-            <a:off x="669426" y="4523527"/>
-            <a:ext cx="3601600" cy="628633"/>
-          </a:xfrm>
-          <a:prstGeom prst="bentConnector4">
-            <a:avLst>
-              <a:gd name="adj1" fmla="val -271"/>
-              <a:gd name="adj2" fmla="val 175639"/>
-            </a:avLst>
-          </a:prstGeom>
-          <a:noFill/>
-          <a:ln w="19050" cap="flat" cmpd="sng">
-            <a:solidFill>
-              <a:schemeClr val="tx1"/>
-            </a:solidFill>
-            <a:prstDash val="solid"/>
-            <a:round/>
-            <a:headEnd type="stealth" w="med" len="med"/>
-            <a:tailEnd type="none" w="med" len="med"/>
-          </a:ln>
-        </p:spPr>
-      </p:cxnSp>
-      <p:sp>
-        <p:nvSpPr>
-          <p:cNvPr id="31" name="Google Shape;914;p34"/>
-          <p:cNvSpPr txBox="1"/>
-          <p:nvPr/>
-        </p:nvSpPr>
-        <p:spPr>
-          <a:xfrm>
-            <a:off x="943584" y="4825946"/>
-            <a:ext cx="1555800" cy="738633"/>
-          </a:xfrm>
-          <a:prstGeom prst="rect">
-            <a:avLst/>
-          </a:prstGeom>
-          <a:noFill/>
-          <a:ln>
-            <a:noFill/>
-          </a:ln>
-        </p:spPr>
-        <p:txBody>
-          <a:bodyPr spcFirstLastPara="1" wrap="square" lIns="91425" tIns="91425" rIns="91425" bIns="91425" anchor="t" anchorCtr="0">
-            <a:spAutoFit/>
-          </a:bodyPr>
-          <a:lstStyle/>
-          <a:p>
-            <a:pPr marL="0" lvl="0" indent="0" algn="ctr" rtl="0">
-              <a:spcBef>
-                <a:spcPts val="0"/>
-              </a:spcBef>
-              <a:spcAft>
-                <a:spcPts val="0"/>
-              </a:spcAft>
-              <a:buNone/>
-            </a:pPr>
-            <a:r>
-              <a:rPr lang="en" dirty="0">
-                <a:ln>
-                  <a:solidFill>
-                    <a:schemeClr val="tx1"/>
-                  </a:solidFill>
-                </a:ln>
-                <a:latin typeface="Roboto"/>
-                <a:ea typeface="Roboto"/>
-                <a:cs typeface="Roboto"/>
-                <a:sym typeface="Roboto"/>
-              </a:rPr>
-              <a:t>Send Notification</a:t>
-            </a:r>
-            <a:endParaRPr dirty="0">
-              <a:ln>
-                <a:solidFill>
-                  <a:schemeClr val="tx1"/>
-                </a:solidFill>
-              </a:ln>
-              <a:latin typeface="Roboto"/>
-              <a:ea typeface="Roboto"/>
-              <a:cs typeface="Roboto"/>
-              <a:sym typeface="Roboto"/>
-            </a:endParaRPr>
-          </a:p>
-        </p:txBody>
-      </p:sp>
-      <p:cxnSp>
-        <p:nvCxnSpPr>
-          <p:cNvPr id="32" name="Google Shape;915;p34"/>
-          <p:cNvCxnSpPr>
-            <a:endCxn id="10" idx="1"/>
-          </p:cNvCxnSpPr>
-          <p:nvPr/>
-        </p:nvCxnSpPr>
-        <p:spPr>
-          <a:xfrm rot="10800000" flipH="1">
-            <a:off x="4675326" y="3539614"/>
-            <a:ext cx="3211200" cy="745800"/>
-          </a:xfrm>
-          <a:prstGeom prst="bentConnector3">
-            <a:avLst>
-              <a:gd name="adj1" fmla="val 50000"/>
-            </a:avLst>
-          </a:prstGeom>
-          <a:noFill/>
-          <a:ln w="19050" cap="flat" cmpd="sng">
-            <a:solidFill>
-              <a:schemeClr val="tx1"/>
-            </a:solidFill>
-            <a:prstDash val="solid"/>
-            <a:round/>
-            <a:headEnd type="none" w="med" len="med"/>
-            <a:tailEnd type="stealth" w="med" len="med"/>
-          </a:ln>
-        </p:spPr>
-      </p:cxnSp>
-      <p:sp>
-        <p:nvSpPr>
-          <p:cNvPr id="33" name="Google Shape;916;p34"/>
-          <p:cNvSpPr txBox="1"/>
-          <p:nvPr/>
-        </p:nvSpPr>
-        <p:spPr>
-          <a:xfrm>
-            <a:off x="4648039" y="3833902"/>
-            <a:ext cx="1555800" cy="461635"/>
-          </a:xfrm>
-          <a:prstGeom prst="rect">
-            <a:avLst/>
-          </a:prstGeom>
-          <a:noFill/>
-          <a:ln>
-            <a:noFill/>
-          </a:ln>
-        </p:spPr>
-        <p:txBody>
-          <a:bodyPr spcFirstLastPara="1" wrap="square" lIns="91425" tIns="91425" rIns="91425" bIns="91425" anchor="t" anchorCtr="0">
-            <a:spAutoFit/>
-          </a:bodyPr>
-          <a:lstStyle/>
-          <a:p>
-            <a:pPr marL="0" lvl="0" indent="0" algn="ctr" rtl="0">
-              <a:spcBef>
-                <a:spcPts val="0"/>
-              </a:spcBef>
-              <a:spcAft>
-                <a:spcPts val="0"/>
-              </a:spcAft>
-              <a:buNone/>
-            </a:pPr>
-            <a:r>
-              <a:rPr lang="en">
-                <a:ln>
-                  <a:solidFill>
-                    <a:schemeClr val="tx1"/>
-                  </a:solidFill>
-                </a:ln>
-                <a:latin typeface="Roboto"/>
-                <a:ea typeface="Roboto"/>
-                <a:cs typeface="Roboto"/>
-                <a:sym typeface="Roboto"/>
-              </a:rPr>
-              <a:t>Store Action</a:t>
-            </a:r>
-            <a:endParaRPr>
-              <a:ln>
-                <a:solidFill>
-                  <a:schemeClr val="tx1"/>
-                </a:solidFill>
-              </a:ln>
-              <a:latin typeface="Roboto"/>
-              <a:ea typeface="Roboto"/>
-              <a:cs typeface="Roboto"/>
-              <a:sym typeface="Roboto"/>
-            </a:endParaRPr>
-          </a:p>
-        </p:txBody>
-      </p:sp>
-      <p:cxnSp>
-        <p:nvCxnSpPr>
-          <p:cNvPr id="34" name="Google Shape;917;p34"/>
-          <p:cNvCxnSpPr>
-            <a:endCxn id="28" idx="0"/>
-          </p:cNvCxnSpPr>
-          <p:nvPr/>
-        </p:nvCxnSpPr>
-        <p:spPr>
-          <a:xfrm flipV="1">
-            <a:off x="1295400" y="3907927"/>
-            <a:ext cx="3075991" cy="136587"/>
-          </a:xfrm>
-          <a:prstGeom prst="bentConnector4">
-            <a:avLst>
-              <a:gd name="adj1" fmla="val 44997"/>
-              <a:gd name="adj2" fmla="val 267366"/>
-            </a:avLst>
-          </a:prstGeom>
-          <a:noFill/>
-          <a:ln w="19050" cap="flat" cmpd="sng">
-            <a:solidFill>
-              <a:schemeClr val="tx1"/>
-            </a:solidFill>
-            <a:prstDash val="solid"/>
-            <a:round/>
-            <a:headEnd type="none" w="med" len="med"/>
-            <a:tailEnd type="stealth" w="med" len="med"/>
-          </a:ln>
-        </p:spPr>
-      </p:cxnSp>
-      <p:sp>
-        <p:nvSpPr>
-          <p:cNvPr id="35" name="Google Shape;918;p34"/>
-          <p:cNvSpPr txBox="1"/>
-          <p:nvPr/>
-        </p:nvSpPr>
-        <p:spPr>
-          <a:xfrm>
-            <a:off x="1295400" y="4136030"/>
-            <a:ext cx="1685100" cy="461635"/>
-          </a:xfrm>
-          <a:prstGeom prst="rect">
-            <a:avLst/>
-          </a:prstGeom>
-          <a:noFill/>
-          <a:ln>
-            <a:noFill/>
-          </a:ln>
-        </p:spPr>
-        <p:txBody>
-          <a:bodyPr spcFirstLastPara="1" wrap="square" lIns="91425" tIns="91425" rIns="91425" bIns="91425" anchor="t" anchorCtr="0">
-            <a:spAutoFit/>
-          </a:bodyPr>
-          <a:lstStyle/>
-          <a:p>
-            <a:pPr marL="0" lvl="0" indent="0" algn="ctr" rtl="0">
-              <a:spcBef>
-                <a:spcPts val="0"/>
-              </a:spcBef>
-              <a:spcAft>
-                <a:spcPts val="0"/>
-              </a:spcAft>
-              <a:buNone/>
-            </a:pPr>
-            <a:r>
-              <a:rPr lang="en" dirty="0">
-                <a:ln>
-                  <a:solidFill>
-                    <a:schemeClr val="tx1"/>
-                  </a:solidFill>
-                </a:ln>
-                <a:latin typeface="Roboto"/>
-                <a:ea typeface="Roboto"/>
-                <a:cs typeface="Roboto"/>
-                <a:sym typeface="Roboto"/>
-              </a:rPr>
-              <a:t>Action Trigger</a:t>
-            </a:r>
-            <a:endParaRPr dirty="0">
-              <a:ln>
-                <a:solidFill>
-                  <a:schemeClr val="tx1"/>
-                </a:solidFill>
-              </a:ln>
-              <a:latin typeface="Roboto"/>
-              <a:ea typeface="Roboto"/>
-              <a:cs typeface="Roboto"/>
-              <a:sym typeface="Roboto"/>
-            </a:endParaRPr>
-          </a:p>
-        </p:txBody>
-      </p:sp>
-    </p:spTree>
-    <p:extLst>
-      <p:ext uri="{BB962C8B-B14F-4D97-AF65-F5344CB8AC3E}">
-        <p14:creationId xmlns:p14="http://schemas.microsoft.com/office/powerpoint/2010/main" val="2794924764"/>
       </p:ext>
     </p:extLst>
   </p:cSld>

</xml_diff>

<commit_message>
[DOCS] Added API Docs link at the last slide
</commit_message>
<xml_diff>
--- a/system-design/TechShoppers - System Architecture.pptx
+++ b/system-design/TechShoppers - System Architecture.pptx
@@ -12,7 +12,8 @@
     <p:sldId id="262" r:id="rId6"/>
     <p:sldId id="263" r:id="rId7"/>
     <p:sldId id="264" r:id="rId8"/>
-    <p:sldId id="265" r:id="rId9"/>
+    <p:sldId id="266" r:id="rId9"/>
+    <p:sldId id="265" r:id="rId10"/>
   </p:sldIdLst>
   <p:sldSz cx="9144000" cy="6858000" type="screen4x3"/>
   <p:notesSz cx="6858000" cy="9144000"/>
@@ -303,7 +304,7 @@
             <a:fld id="{1D8BD707-D9CF-40AE-B4C6-C98DA3205C09}" type="datetimeFigureOut">
               <a:rPr lang="en-US" smtClean="0"/>
               <a:pPr/>
-              <a:t>1/13/2024</a:t>
+              <a:t>1/14/2024</a:t>
             </a:fld>
             <a:endParaRPr lang="en-US"/>
           </a:p>
@@ -505,7 +506,7 @@
             <a:fld id="{1D8BD707-D9CF-40AE-B4C6-C98DA3205C09}" type="datetimeFigureOut">
               <a:rPr lang="en-US" smtClean="0"/>
               <a:pPr/>
-              <a:t>1/13/2024</a:t>
+              <a:t>1/14/2024</a:t>
             </a:fld>
             <a:endParaRPr lang="en-US"/>
           </a:p>
@@ -682,7 +683,7 @@
             <a:fld id="{1D8BD707-D9CF-40AE-B4C6-C98DA3205C09}" type="datetimeFigureOut">
               <a:rPr lang="en-US" smtClean="0"/>
               <a:pPr/>
-              <a:t>1/13/2024</a:t>
+              <a:t>1/14/2024</a:t>
             </a:fld>
             <a:endParaRPr lang="en-US"/>
           </a:p>
@@ -849,7 +850,7 @@
             <a:fld id="{1D8BD707-D9CF-40AE-B4C6-C98DA3205C09}" type="datetimeFigureOut">
               <a:rPr lang="en-US" smtClean="0"/>
               <a:pPr/>
-              <a:t>1/13/2024</a:t>
+              <a:t>1/14/2024</a:t>
             </a:fld>
             <a:endParaRPr lang="en-US"/>
           </a:p>
@@ -1099,7 +1100,7 @@
             <a:fld id="{1D8BD707-D9CF-40AE-B4C6-C98DA3205C09}" type="datetimeFigureOut">
               <a:rPr lang="en-US" smtClean="0"/>
               <a:pPr/>
-              <a:t>1/13/2024</a:t>
+              <a:t>1/14/2024</a:t>
             </a:fld>
             <a:endParaRPr lang="en-US"/>
           </a:p>
@@ -1419,7 +1420,7 @@
             <a:fld id="{1D8BD707-D9CF-40AE-B4C6-C98DA3205C09}" type="datetimeFigureOut">
               <a:rPr lang="en-US" smtClean="0"/>
               <a:pPr/>
-              <a:t>1/13/2024</a:t>
+              <a:t>1/14/2024</a:t>
             </a:fld>
             <a:endParaRPr lang="en-US"/>
           </a:p>
@@ -1887,7 +1888,7 @@
             <a:fld id="{1D8BD707-D9CF-40AE-B4C6-C98DA3205C09}" type="datetimeFigureOut">
               <a:rPr lang="en-US" smtClean="0"/>
               <a:pPr/>
-              <a:t>1/13/2024</a:t>
+              <a:t>1/14/2024</a:t>
             </a:fld>
             <a:endParaRPr lang="en-US"/>
           </a:p>
@@ -2037,7 +2038,7 @@
             <a:fld id="{1D8BD707-D9CF-40AE-B4C6-C98DA3205C09}" type="datetimeFigureOut">
               <a:rPr lang="en-US" smtClean="0"/>
               <a:pPr/>
-              <a:t>1/13/2024</a:t>
+              <a:t>1/14/2024</a:t>
             </a:fld>
             <a:endParaRPr lang="en-US"/>
           </a:p>
@@ -2129,7 +2130,7 @@
             <a:fld id="{1D8BD707-D9CF-40AE-B4C6-C98DA3205C09}" type="datetimeFigureOut">
               <a:rPr lang="en-US" smtClean="0"/>
               <a:pPr/>
-              <a:t>1/13/2024</a:t>
+              <a:t>1/14/2024</a:t>
             </a:fld>
             <a:endParaRPr lang="en-US"/>
           </a:p>
@@ -2405,7 +2406,7 @@
             <a:fld id="{1D8BD707-D9CF-40AE-B4C6-C98DA3205C09}" type="datetimeFigureOut">
               <a:rPr lang="en-US" smtClean="0"/>
               <a:pPr/>
-              <a:t>1/13/2024</a:t>
+              <a:t>1/14/2024</a:t>
             </a:fld>
             <a:endParaRPr lang="en-US"/>
           </a:p>
@@ -2712,7 +2713,7 @@
             <a:fld id="{1D8BD707-D9CF-40AE-B4C6-C98DA3205C09}" type="datetimeFigureOut">
               <a:rPr lang="en-US" smtClean="0"/>
               <a:pPr/>
-              <a:t>1/13/2024</a:t>
+              <a:t>1/14/2024</a:t>
             </a:fld>
             <a:endParaRPr lang="en-US"/>
           </a:p>
@@ -3012,7 +3013,7 @@
             <a:fld id="{1D8BD707-D9CF-40AE-B4C6-C98DA3205C09}" type="datetimeFigureOut">
               <a:rPr lang="en-US" smtClean="0"/>
               <a:pPr/>
-              <a:t>1/13/2024</a:t>
+              <a:t>1/14/2024</a:t>
             </a:fld>
             <a:endParaRPr lang="en-US"/>
           </a:p>
@@ -5992,6 +5993,86 @@
           <a:chExt cx="0" cy="0"/>
         </a:xfrm>
       </p:grpSpPr>
+      <p:sp>
+        <p:nvSpPr>
+          <p:cNvPr id="2" name="Title 1"/>
+          <p:cNvSpPr>
+            <a:spLocks noGrp="1"/>
+          </p:cNvSpPr>
+          <p:nvPr>
+            <p:ph type="title"/>
+          </p:nvPr>
+        </p:nvSpPr>
+        <p:spPr/>
+        <p:txBody>
+          <a:bodyPr>
+            <a:normAutofit/>
+          </a:bodyPr>
+          <a:lstStyle/>
+          <a:p>
+            <a:r>
+              <a:rPr lang="en-US" dirty="0" smtClean="0"/>
+              <a:t>API Documentation - Postman</a:t>
+            </a:r>
+            <a:endParaRPr lang="en-US" dirty="0"/>
+          </a:p>
+        </p:txBody>
+      </p:sp>
+      <p:sp>
+        <p:nvSpPr>
+          <p:cNvPr id="3" name="Content Placeholder 2"/>
+          <p:cNvSpPr>
+            <a:spLocks noGrp="1"/>
+          </p:cNvSpPr>
+          <p:nvPr>
+            <p:ph idx="1"/>
+          </p:nvPr>
+        </p:nvSpPr>
+        <p:spPr/>
+        <p:txBody>
+          <a:bodyPr/>
+          <a:lstStyle/>
+          <a:p>
+            <a:r>
+              <a:rPr lang="en-US" dirty="0" smtClean="0">
+                <a:hlinkClick r:id="rId2"/>
+              </a:rPr>
+              <a:t>Documentation Link</a:t>
+            </a:r>
+            <a:endParaRPr lang="en-US" b="1" dirty="0" smtClean="0"/>
+          </a:p>
+        </p:txBody>
+      </p:sp>
+    </p:spTree>
+    <p:extLst>
+      <p:ext uri="{BB962C8B-B14F-4D97-AF65-F5344CB8AC3E}">
+        <p14:creationId xmlns:p14="http://schemas.microsoft.com/office/powerpoint/2010/main" val="1942359079"/>
+      </p:ext>
+    </p:extLst>
+  </p:cSld>
+  <p:clrMapOvr>
+    <a:masterClrMapping/>
+  </p:clrMapOvr>
+</p:sld>
+</file>
+
+<file path=ppt/slides/slide9.xml><?xml version="1.0" encoding="utf-8"?>
+<p:sld xmlns:a="http://schemas.openxmlformats.org/drawingml/2006/main" xmlns:r="http://schemas.openxmlformats.org/officeDocument/2006/relationships" xmlns:p="http://schemas.openxmlformats.org/presentationml/2006/main">
+  <p:cSld>
+    <p:spTree>
+      <p:nvGrpSpPr>
+        <p:cNvPr id="1" name=""/>
+        <p:cNvGrpSpPr/>
+        <p:nvPr/>
+      </p:nvGrpSpPr>
+      <p:grpSpPr>
+        <a:xfrm>
+          <a:off x="0" y="0"/>
+          <a:ext cx="0" cy="0"/>
+          <a:chOff x="0" y="0"/>
+          <a:chExt cx="0" cy="0"/>
+        </a:xfrm>
+      </p:grpSpPr>
       <p:pic>
         <p:nvPicPr>
           <p:cNvPr id="4" name="Picture 2" descr="C:\Users\HP\AppData\Local\Microsoft\Windows\INetCache\IE\4FA5Y4LK\thank-you-1428147_960_720[1].png"/>

</xml_diff>